<commit_message>
rename: DG's image and pptx into product
</commit_message>
<xml_diff>
--- a/docs/diagrams/HighLevelSequenceDiagrams.pptx
+++ b/docs/diagrams/HighLevelSequenceDiagrams.pptx
@@ -107,6 +107,22 @@
       </a:defRPr>
     </a:lvl9pPr>
   </p:defaultTextStyle>
+  <p:extLst>
+    <p:ext uri="{EFAFB233-063F-42B5-8137-9DF3F51BA10A}">
+      <p15:sldGuideLst xmlns:p15="http://schemas.microsoft.com/office/powerpoint/2012/main">
+        <p15:guide id="1" orient="horz" pos="1488">
+          <p15:clr>
+            <a:srgbClr val="A4A3A4"/>
+          </p15:clr>
+        </p15:guide>
+        <p15:guide id="2" pos="2880">
+          <p15:clr>
+            <a:srgbClr val="A4A3A4"/>
+          </p15:clr>
+        </p15:guide>
+      </p15:sldGuideLst>
+    </p:ext>
+  </p:extLst>
 </p:presentation>
 </file>
 
@@ -192,7 +208,7 @@
           <a:p>
             <a:fld id="{F5CC4B3F-88C1-4FFA-B1B6-F41C21DC6924}" type="datetimeFigureOut">
               <a:rPr lang="en-US" smtClean="0"/>
-              <a:t>10/16/2016</a:t>
+              <a:t>10/22/2018</a:t>
             </a:fld>
             <a:endParaRPr lang="en-US"/>
           </a:p>
@@ -256,38 +272,37 @@
           <a:p>
             <a:pPr lvl="0"/>
             <a:r>
-              <a:rPr lang="en-US" smtClean="0"/>
+              <a:rPr lang="en-US"/>
               <a:t>Click to edit Master text styles</a:t>
             </a:r>
           </a:p>
           <a:p>
             <a:pPr lvl="1"/>
             <a:r>
-              <a:rPr lang="en-US" smtClean="0"/>
+              <a:rPr lang="en-US"/>
               <a:t>Second level</a:t>
             </a:r>
           </a:p>
           <a:p>
             <a:pPr lvl="2"/>
             <a:r>
-              <a:rPr lang="en-US" smtClean="0"/>
+              <a:rPr lang="en-US"/>
               <a:t>Third level</a:t>
             </a:r>
           </a:p>
           <a:p>
             <a:pPr lvl="3"/>
             <a:r>
-              <a:rPr lang="en-US" smtClean="0"/>
+              <a:rPr lang="en-US"/>
               <a:t>Fourth level</a:t>
             </a:r>
           </a:p>
           <a:p>
             <a:pPr lvl="4"/>
             <a:r>
-              <a:rPr lang="en-US" smtClean="0"/>
+              <a:rPr lang="en-US"/>
               <a:t>Fifth level</a:t>
             </a:r>
-            <a:endParaRPr lang="en-US"/>
           </a:p>
         </p:txBody>
       </p:sp>
@@ -498,10 +513,9 @@
           <a:lstStyle/>
           <a:p>
             <a:r>
-              <a:rPr lang="en-US" smtClean="0"/>
+              <a:rPr lang="en-US"/>
               <a:t>Click to edit Master title style</a:t>
             </a:r>
-            <a:endParaRPr lang="en-US"/>
           </a:p>
         </p:txBody>
       </p:sp>
@@ -617,10 +631,9 @@
           </a:lstStyle>
           <a:p>
             <a:r>
-              <a:rPr lang="en-US" smtClean="0"/>
+              <a:rPr lang="en-US"/>
               <a:t>Click to edit Master subtitle style</a:t>
             </a:r>
-            <a:endParaRPr lang="en-US"/>
           </a:p>
         </p:txBody>
       </p:sp>
@@ -641,7 +654,7 @@
           <a:p>
             <a:fld id="{78C97017-6FC3-485B-9764-EAC9E56C1D49}" type="datetimeFigureOut">
               <a:rPr lang="en-US" smtClean="0"/>
-              <a:t>10/16/2016</a:t>
+              <a:t>10/22/2018</a:t>
             </a:fld>
             <a:endParaRPr lang="en-US"/>
           </a:p>
@@ -735,10 +748,9 @@
           <a:lstStyle/>
           <a:p>
             <a:r>
-              <a:rPr lang="en-US" smtClean="0"/>
+              <a:rPr lang="en-US"/>
               <a:t>Click to edit Master title style</a:t>
             </a:r>
-            <a:endParaRPr lang="en-US"/>
           </a:p>
         </p:txBody>
       </p:sp>
@@ -759,38 +771,37 @@
           <a:p>
             <a:pPr lvl="0"/>
             <a:r>
-              <a:rPr lang="en-US" smtClean="0"/>
+              <a:rPr lang="en-US"/>
               <a:t>Click to edit Master text styles</a:t>
             </a:r>
           </a:p>
           <a:p>
             <a:pPr lvl="1"/>
             <a:r>
-              <a:rPr lang="en-US" smtClean="0"/>
+              <a:rPr lang="en-US"/>
               <a:t>Second level</a:t>
             </a:r>
           </a:p>
           <a:p>
             <a:pPr lvl="2"/>
             <a:r>
-              <a:rPr lang="en-US" smtClean="0"/>
+              <a:rPr lang="en-US"/>
               <a:t>Third level</a:t>
             </a:r>
           </a:p>
           <a:p>
             <a:pPr lvl="3"/>
             <a:r>
-              <a:rPr lang="en-US" smtClean="0"/>
+              <a:rPr lang="en-US"/>
               <a:t>Fourth level</a:t>
             </a:r>
           </a:p>
           <a:p>
             <a:pPr lvl="4"/>
             <a:r>
-              <a:rPr lang="en-US" smtClean="0"/>
+              <a:rPr lang="en-US"/>
               <a:t>Fifth level</a:t>
             </a:r>
-            <a:endParaRPr lang="en-US"/>
           </a:p>
         </p:txBody>
       </p:sp>
@@ -811,7 +822,7 @@
           <a:p>
             <a:fld id="{78C97017-6FC3-485B-9764-EAC9E56C1D49}" type="datetimeFigureOut">
               <a:rPr lang="en-US" smtClean="0"/>
-              <a:t>10/16/2016</a:t>
+              <a:t>10/22/2018</a:t>
             </a:fld>
             <a:endParaRPr lang="en-US"/>
           </a:p>
@@ -910,10 +921,9 @@
           <a:lstStyle/>
           <a:p>
             <a:r>
-              <a:rPr lang="en-US" smtClean="0"/>
+              <a:rPr lang="en-US"/>
               <a:t>Click to edit Master title style</a:t>
             </a:r>
-            <a:endParaRPr lang="en-US"/>
           </a:p>
         </p:txBody>
       </p:sp>
@@ -939,38 +949,37 @@
           <a:p>
             <a:pPr lvl="0"/>
             <a:r>
-              <a:rPr lang="en-US" smtClean="0"/>
+              <a:rPr lang="en-US"/>
               <a:t>Click to edit Master text styles</a:t>
             </a:r>
           </a:p>
           <a:p>
             <a:pPr lvl="1"/>
             <a:r>
-              <a:rPr lang="en-US" smtClean="0"/>
+              <a:rPr lang="en-US"/>
               <a:t>Second level</a:t>
             </a:r>
           </a:p>
           <a:p>
             <a:pPr lvl="2"/>
             <a:r>
-              <a:rPr lang="en-US" smtClean="0"/>
+              <a:rPr lang="en-US"/>
               <a:t>Third level</a:t>
             </a:r>
           </a:p>
           <a:p>
             <a:pPr lvl="3"/>
             <a:r>
-              <a:rPr lang="en-US" smtClean="0"/>
+              <a:rPr lang="en-US"/>
               <a:t>Fourth level</a:t>
             </a:r>
           </a:p>
           <a:p>
             <a:pPr lvl="4"/>
             <a:r>
-              <a:rPr lang="en-US" smtClean="0"/>
+              <a:rPr lang="en-US"/>
               <a:t>Fifth level</a:t>
             </a:r>
-            <a:endParaRPr lang="en-US"/>
           </a:p>
         </p:txBody>
       </p:sp>
@@ -991,7 +1000,7 @@
           <a:p>
             <a:fld id="{78C97017-6FC3-485B-9764-EAC9E56C1D49}" type="datetimeFigureOut">
               <a:rPr lang="en-US" smtClean="0"/>
-              <a:t>10/16/2016</a:t>
+              <a:t>10/22/2018</a:t>
             </a:fld>
             <a:endParaRPr lang="en-US"/>
           </a:p>
@@ -1085,10 +1094,9 @@
           <a:lstStyle/>
           <a:p>
             <a:r>
-              <a:rPr lang="en-US" smtClean="0"/>
+              <a:rPr lang="en-US"/>
               <a:t>Click to edit Master title style</a:t>
             </a:r>
-            <a:endParaRPr lang="en-US"/>
           </a:p>
         </p:txBody>
       </p:sp>
@@ -1109,38 +1117,37 @@
           <a:p>
             <a:pPr lvl="0"/>
             <a:r>
-              <a:rPr lang="en-US" smtClean="0"/>
+              <a:rPr lang="en-US"/>
               <a:t>Click to edit Master text styles</a:t>
             </a:r>
           </a:p>
           <a:p>
             <a:pPr lvl="1"/>
             <a:r>
-              <a:rPr lang="en-US" smtClean="0"/>
+              <a:rPr lang="en-US"/>
               <a:t>Second level</a:t>
             </a:r>
           </a:p>
           <a:p>
             <a:pPr lvl="2"/>
             <a:r>
-              <a:rPr lang="en-US" smtClean="0"/>
+              <a:rPr lang="en-US"/>
               <a:t>Third level</a:t>
             </a:r>
           </a:p>
           <a:p>
             <a:pPr lvl="3"/>
             <a:r>
-              <a:rPr lang="en-US" smtClean="0"/>
+              <a:rPr lang="en-US"/>
               <a:t>Fourth level</a:t>
             </a:r>
           </a:p>
           <a:p>
             <a:pPr lvl="4"/>
             <a:r>
-              <a:rPr lang="en-US" smtClean="0"/>
+              <a:rPr lang="en-US"/>
               <a:t>Fifth level</a:t>
             </a:r>
-            <a:endParaRPr lang="en-US"/>
           </a:p>
         </p:txBody>
       </p:sp>
@@ -1161,7 +1168,7 @@
           <a:p>
             <a:fld id="{78C97017-6FC3-485B-9764-EAC9E56C1D49}" type="datetimeFigureOut">
               <a:rPr lang="en-US" smtClean="0"/>
-              <a:t>10/16/2016</a:t>
+              <a:t>10/22/2018</a:t>
             </a:fld>
             <a:endParaRPr lang="en-US"/>
           </a:p>
@@ -1264,10 +1271,9 @@
           </a:lstStyle>
           <a:p>
             <a:r>
-              <a:rPr lang="en-US" smtClean="0"/>
+              <a:rPr lang="en-US"/>
               <a:t>Click to edit Master title style</a:t>
             </a:r>
-            <a:endParaRPr lang="en-US"/>
           </a:p>
         </p:txBody>
       </p:sp>
@@ -1384,7 +1390,7 @@
           <a:p>
             <a:pPr lvl="0"/>
             <a:r>
-              <a:rPr lang="en-US" smtClean="0"/>
+              <a:rPr lang="en-US"/>
               <a:t>Click to edit Master text styles</a:t>
             </a:r>
           </a:p>
@@ -1407,7 +1413,7 @@
           <a:p>
             <a:fld id="{78C97017-6FC3-485B-9764-EAC9E56C1D49}" type="datetimeFigureOut">
               <a:rPr lang="en-US" smtClean="0"/>
-              <a:t>10/16/2016</a:t>
+              <a:t>10/22/2018</a:t>
             </a:fld>
             <a:endParaRPr lang="en-US"/>
           </a:p>
@@ -1501,10 +1507,9 @@
           <a:lstStyle/>
           <a:p>
             <a:r>
-              <a:rPr lang="en-US" smtClean="0"/>
+              <a:rPr lang="en-US"/>
               <a:t>Click to edit Master title style</a:t>
             </a:r>
-            <a:endParaRPr lang="en-US"/>
           </a:p>
         </p:txBody>
       </p:sp>
@@ -1558,38 +1563,37 @@
           <a:p>
             <a:pPr lvl="0"/>
             <a:r>
-              <a:rPr lang="en-US" smtClean="0"/>
+              <a:rPr lang="en-US"/>
               <a:t>Click to edit Master text styles</a:t>
             </a:r>
           </a:p>
           <a:p>
             <a:pPr lvl="1"/>
             <a:r>
-              <a:rPr lang="en-US" smtClean="0"/>
+              <a:rPr lang="en-US"/>
               <a:t>Second level</a:t>
             </a:r>
           </a:p>
           <a:p>
             <a:pPr lvl="2"/>
             <a:r>
-              <a:rPr lang="en-US" smtClean="0"/>
+              <a:rPr lang="en-US"/>
               <a:t>Third level</a:t>
             </a:r>
           </a:p>
           <a:p>
             <a:pPr lvl="3"/>
             <a:r>
-              <a:rPr lang="en-US" smtClean="0"/>
+              <a:rPr lang="en-US"/>
               <a:t>Fourth level</a:t>
             </a:r>
           </a:p>
           <a:p>
             <a:pPr lvl="4"/>
             <a:r>
-              <a:rPr lang="en-US" smtClean="0"/>
+              <a:rPr lang="en-US"/>
               <a:t>Fifth level</a:t>
             </a:r>
-            <a:endParaRPr lang="en-US"/>
           </a:p>
         </p:txBody>
       </p:sp>
@@ -1643,38 +1647,37 @@
           <a:p>
             <a:pPr lvl="0"/>
             <a:r>
-              <a:rPr lang="en-US" smtClean="0"/>
+              <a:rPr lang="en-US"/>
               <a:t>Click to edit Master text styles</a:t>
             </a:r>
           </a:p>
           <a:p>
             <a:pPr lvl="1"/>
             <a:r>
-              <a:rPr lang="en-US" smtClean="0"/>
+              <a:rPr lang="en-US"/>
               <a:t>Second level</a:t>
             </a:r>
           </a:p>
           <a:p>
             <a:pPr lvl="2"/>
             <a:r>
-              <a:rPr lang="en-US" smtClean="0"/>
+              <a:rPr lang="en-US"/>
               <a:t>Third level</a:t>
             </a:r>
           </a:p>
           <a:p>
             <a:pPr lvl="3"/>
             <a:r>
-              <a:rPr lang="en-US" smtClean="0"/>
+              <a:rPr lang="en-US"/>
               <a:t>Fourth level</a:t>
             </a:r>
           </a:p>
           <a:p>
             <a:pPr lvl="4"/>
             <a:r>
-              <a:rPr lang="en-US" smtClean="0"/>
+              <a:rPr lang="en-US"/>
               <a:t>Fifth level</a:t>
             </a:r>
-            <a:endParaRPr lang="en-US"/>
           </a:p>
         </p:txBody>
       </p:sp>
@@ -1695,7 +1698,7 @@
           <a:p>
             <a:fld id="{78C97017-6FC3-485B-9764-EAC9E56C1D49}" type="datetimeFigureOut">
               <a:rPr lang="en-US" smtClean="0"/>
-              <a:t>10/16/2016</a:t>
+              <a:t>10/22/2018</a:t>
             </a:fld>
             <a:endParaRPr lang="en-US"/>
           </a:p>
@@ -1793,10 +1796,9 @@
           </a:lstStyle>
           <a:p>
             <a:r>
-              <a:rPr lang="en-US" smtClean="0"/>
+              <a:rPr lang="en-US"/>
               <a:t>Click to edit Master title style</a:t>
             </a:r>
-            <a:endParaRPr lang="en-US"/>
           </a:p>
         </p:txBody>
       </p:sp>
@@ -1859,7 +1861,7 @@
           <a:p>
             <a:pPr lvl="0"/>
             <a:r>
-              <a:rPr lang="en-US" smtClean="0"/>
+              <a:rPr lang="en-US"/>
               <a:t>Click to edit Master text styles</a:t>
             </a:r>
           </a:p>
@@ -1915,38 +1917,37 @@
           <a:p>
             <a:pPr lvl="0"/>
             <a:r>
-              <a:rPr lang="en-US" smtClean="0"/>
+              <a:rPr lang="en-US"/>
               <a:t>Click to edit Master text styles</a:t>
             </a:r>
           </a:p>
           <a:p>
             <a:pPr lvl="1"/>
             <a:r>
-              <a:rPr lang="en-US" smtClean="0"/>
+              <a:rPr lang="en-US"/>
               <a:t>Second level</a:t>
             </a:r>
           </a:p>
           <a:p>
             <a:pPr lvl="2"/>
             <a:r>
-              <a:rPr lang="en-US" smtClean="0"/>
+              <a:rPr lang="en-US"/>
               <a:t>Third level</a:t>
             </a:r>
           </a:p>
           <a:p>
             <a:pPr lvl="3"/>
             <a:r>
-              <a:rPr lang="en-US" smtClean="0"/>
+              <a:rPr lang="en-US"/>
               <a:t>Fourth level</a:t>
             </a:r>
           </a:p>
           <a:p>
             <a:pPr lvl="4"/>
             <a:r>
-              <a:rPr lang="en-US" smtClean="0"/>
+              <a:rPr lang="en-US"/>
               <a:t>Fifth level</a:t>
             </a:r>
-            <a:endParaRPr lang="en-US"/>
           </a:p>
         </p:txBody>
       </p:sp>
@@ -2009,7 +2010,7 @@
           <a:p>
             <a:pPr lvl="0"/>
             <a:r>
-              <a:rPr lang="en-US" smtClean="0"/>
+              <a:rPr lang="en-US"/>
               <a:t>Click to edit Master text styles</a:t>
             </a:r>
           </a:p>
@@ -2065,38 +2066,37 @@
           <a:p>
             <a:pPr lvl="0"/>
             <a:r>
-              <a:rPr lang="en-US" smtClean="0"/>
+              <a:rPr lang="en-US"/>
               <a:t>Click to edit Master text styles</a:t>
             </a:r>
           </a:p>
           <a:p>
             <a:pPr lvl="1"/>
             <a:r>
-              <a:rPr lang="en-US" smtClean="0"/>
+              <a:rPr lang="en-US"/>
               <a:t>Second level</a:t>
             </a:r>
           </a:p>
           <a:p>
             <a:pPr lvl="2"/>
             <a:r>
-              <a:rPr lang="en-US" smtClean="0"/>
+              <a:rPr lang="en-US"/>
               <a:t>Third level</a:t>
             </a:r>
           </a:p>
           <a:p>
             <a:pPr lvl="3"/>
             <a:r>
-              <a:rPr lang="en-US" smtClean="0"/>
+              <a:rPr lang="en-US"/>
               <a:t>Fourth level</a:t>
             </a:r>
           </a:p>
           <a:p>
             <a:pPr lvl="4"/>
             <a:r>
-              <a:rPr lang="en-US" smtClean="0"/>
+              <a:rPr lang="en-US"/>
               <a:t>Fifth level</a:t>
             </a:r>
-            <a:endParaRPr lang="en-US"/>
           </a:p>
         </p:txBody>
       </p:sp>
@@ -2117,7 +2117,7 @@
           <a:p>
             <a:fld id="{78C97017-6FC3-485B-9764-EAC9E56C1D49}" type="datetimeFigureOut">
               <a:rPr lang="en-US" smtClean="0"/>
-              <a:t>10/16/2016</a:t>
+              <a:t>10/22/2018</a:t>
             </a:fld>
             <a:endParaRPr lang="en-US"/>
           </a:p>
@@ -2211,10 +2211,9 @@
           <a:lstStyle/>
           <a:p>
             <a:r>
-              <a:rPr lang="en-US" smtClean="0"/>
+              <a:rPr lang="en-US"/>
               <a:t>Click to edit Master title style</a:t>
             </a:r>
-            <a:endParaRPr lang="en-US"/>
           </a:p>
         </p:txBody>
       </p:sp>
@@ -2235,7 +2234,7 @@
           <a:p>
             <a:fld id="{78C97017-6FC3-485B-9764-EAC9E56C1D49}" type="datetimeFigureOut">
               <a:rPr lang="en-US" smtClean="0"/>
-              <a:t>10/16/2016</a:t>
+              <a:t>10/22/2018</a:t>
             </a:fld>
             <a:endParaRPr lang="en-US"/>
           </a:p>
@@ -2330,7 +2329,7 @@
           <a:p>
             <a:fld id="{78C97017-6FC3-485B-9764-EAC9E56C1D49}" type="datetimeFigureOut">
               <a:rPr lang="en-US" smtClean="0"/>
-              <a:t>10/16/2016</a:t>
+              <a:t>10/22/2018</a:t>
             </a:fld>
             <a:endParaRPr lang="en-US"/>
           </a:p>
@@ -2433,10 +2432,9 @@
           </a:lstStyle>
           <a:p>
             <a:r>
-              <a:rPr lang="en-US" smtClean="0"/>
+              <a:rPr lang="en-US"/>
               <a:t>Click to edit Master title style</a:t>
             </a:r>
-            <a:endParaRPr lang="en-US"/>
           </a:p>
         </p:txBody>
       </p:sp>
@@ -2490,38 +2488,37 @@
           <a:p>
             <a:pPr lvl="0"/>
             <a:r>
-              <a:rPr lang="en-US" smtClean="0"/>
+              <a:rPr lang="en-US"/>
               <a:t>Click to edit Master text styles</a:t>
             </a:r>
           </a:p>
           <a:p>
             <a:pPr lvl="1"/>
             <a:r>
-              <a:rPr lang="en-US" smtClean="0"/>
+              <a:rPr lang="en-US"/>
               <a:t>Second level</a:t>
             </a:r>
           </a:p>
           <a:p>
             <a:pPr lvl="2"/>
             <a:r>
-              <a:rPr lang="en-US" smtClean="0"/>
+              <a:rPr lang="en-US"/>
               <a:t>Third level</a:t>
             </a:r>
           </a:p>
           <a:p>
             <a:pPr lvl="3"/>
             <a:r>
-              <a:rPr lang="en-US" smtClean="0"/>
+              <a:rPr lang="en-US"/>
               <a:t>Fourth level</a:t>
             </a:r>
           </a:p>
           <a:p>
             <a:pPr lvl="4"/>
             <a:r>
-              <a:rPr lang="en-US" smtClean="0"/>
+              <a:rPr lang="en-US"/>
               <a:t>Fifth level</a:t>
             </a:r>
-            <a:endParaRPr lang="en-US"/>
           </a:p>
         </p:txBody>
       </p:sp>
@@ -2584,7 +2581,7 @@
           <a:p>
             <a:pPr lvl="0"/>
             <a:r>
-              <a:rPr lang="en-US" smtClean="0"/>
+              <a:rPr lang="en-US"/>
               <a:t>Click to edit Master text styles</a:t>
             </a:r>
           </a:p>
@@ -2607,7 +2604,7 @@
           <a:p>
             <a:fld id="{78C97017-6FC3-485B-9764-EAC9E56C1D49}" type="datetimeFigureOut">
               <a:rPr lang="en-US" smtClean="0"/>
-              <a:t>10/16/2016</a:t>
+              <a:t>10/22/2018</a:t>
             </a:fld>
             <a:endParaRPr lang="en-US"/>
           </a:p>
@@ -2710,10 +2707,9 @@
           </a:lstStyle>
           <a:p>
             <a:r>
-              <a:rPr lang="en-US" smtClean="0"/>
+              <a:rPr lang="en-US"/>
               <a:t>Click to edit Master title style</a:t>
             </a:r>
-            <a:endParaRPr lang="en-US"/>
           </a:p>
         </p:txBody>
       </p:sp>
@@ -2837,7 +2833,7 @@
           <a:p>
             <a:pPr lvl="0"/>
             <a:r>
-              <a:rPr lang="en-US" smtClean="0"/>
+              <a:rPr lang="en-US"/>
               <a:t>Click to edit Master text styles</a:t>
             </a:r>
           </a:p>
@@ -2860,7 +2856,7 @@
           <a:p>
             <a:fld id="{78C97017-6FC3-485B-9764-EAC9E56C1D49}" type="datetimeFigureOut">
               <a:rPr lang="en-US" smtClean="0"/>
-              <a:t>10/16/2016</a:t>
+              <a:t>10/22/2018</a:t>
             </a:fld>
             <a:endParaRPr lang="en-US"/>
           </a:p>
@@ -2969,10 +2965,9 @@
           <a:lstStyle/>
           <a:p>
             <a:r>
-              <a:rPr lang="en-US" smtClean="0"/>
+              <a:rPr lang="en-US"/>
               <a:t>Click to edit Master title style</a:t>
             </a:r>
-            <a:endParaRPr lang="en-US"/>
           </a:p>
         </p:txBody>
       </p:sp>
@@ -3003,38 +2998,37 @@
           <a:p>
             <a:pPr lvl="0"/>
             <a:r>
-              <a:rPr lang="en-US" smtClean="0"/>
+              <a:rPr lang="en-US"/>
               <a:t>Click to edit Master text styles</a:t>
             </a:r>
           </a:p>
           <a:p>
             <a:pPr lvl="1"/>
             <a:r>
-              <a:rPr lang="en-US" smtClean="0"/>
+              <a:rPr lang="en-US"/>
               <a:t>Second level</a:t>
             </a:r>
           </a:p>
           <a:p>
             <a:pPr lvl="2"/>
             <a:r>
-              <a:rPr lang="en-US" smtClean="0"/>
+              <a:rPr lang="en-US"/>
               <a:t>Third level</a:t>
             </a:r>
           </a:p>
           <a:p>
             <a:pPr lvl="3"/>
             <a:r>
-              <a:rPr lang="en-US" smtClean="0"/>
+              <a:rPr lang="en-US"/>
               <a:t>Fourth level</a:t>
             </a:r>
           </a:p>
           <a:p>
             <a:pPr lvl="4"/>
             <a:r>
-              <a:rPr lang="en-US" smtClean="0"/>
+              <a:rPr lang="en-US"/>
               <a:t>Fifth level</a:t>
             </a:r>
-            <a:endParaRPr lang="en-US"/>
           </a:p>
         </p:txBody>
       </p:sp>
@@ -3073,7 +3067,7 @@
           <a:p>
             <a:fld id="{78C97017-6FC3-485B-9764-EAC9E56C1D49}" type="datetimeFigureOut">
               <a:rPr lang="en-US" smtClean="0"/>
-              <a:t>10/16/2016</a:t>
+              <a:t>10/22/2018</a:t>
             </a:fld>
             <a:endParaRPr lang="en-US"/>
           </a:p>
@@ -3492,7 +3486,7 @@
           <a:p>
             <a:pPr algn="ctr"/>
             <a:r>
-              <a:rPr lang="en-US" sz="1600" dirty="0" smtClean="0">
+              <a:rPr lang="en-US" sz="1600" dirty="0">
                 <a:solidFill>
                   <a:schemeClr val="bg1"/>
                 </a:solidFill>
@@ -3856,7 +3850,7 @@
           <a:p>
             <a:pPr algn="ctr"/>
             <a:r>
-              <a:rPr lang="en-US" sz="1600" dirty="0" smtClean="0">
+              <a:rPr lang="en-US" sz="1600" dirty="0">
                 <a:solidFill>
                   <a:schemeClr val="bg1"/>
                 </a:solidFill>
@@ -4003,7 +3997,7 @@
           <a:p>
             <a:pPr algn="ctr"/>
             <a:r>
-              <a:rPr lang="en-US" sz="1600" dirty="0" smtClean="0">
+              <a:rPr lang="en-US" sz="1600" dirty="0">
                 <a:solidFill>
                   <a:schemeClr val="bg1"/>
                 </a:solidFill>
@@ -4165,10 +4159,9 @@
           <a:lstStyle/>
           <a:p>
             <a:r>
-              <a:rPr lang="en-US" sz="1400" dirty="0" smtClean="0"/>
+              <a:rPr lang="en-US" sz="1400" dirty="0"/>
               <a:t>delete 1</a:t>
             </a:r>
-            <a:endParaRPr lang="en-US" sz="1400" dirty="0"/>
           </a:p>
         </p:txBody>
       </p:sp>
@@ -4231,18 +4224,13 @@
           <a:lstStyle/>
           <a:p>
             <a:r>
-              <a:rPr lang="en-US" sz="1400" dirty="0" smtClean="0">
+              <a:rPr lang="en-US" sz="1400" dirty="0">
                 <a:solidFill>
                   <a:srgbClr val="0070C0"/>
                 </a:solidFill>
               </a:rPr>
               <a:t>execute(“delete 1”)</a:t>
             </a:r>
-            <a:endParaRPr lang="en-US" sz="1400" dirty="0">
-              <a:solidFill>
-                <a:srgbClr val="0070C0"/>
-              </a:solidFill>
-            </a:endParaRPr>
           </a:p>
         </p:txBody>
       </p:sp>
@@ -4305,26 +4293,21 @@
           <a:lstStyle/>
           <a:p>
             <a:r>
-              <a:rPr lang="en-US" sz="1400" dirty="0" err="1" smtClean="0">
+              <a:rPr lang="en-US" sz="1400" dirty="0" err="1">
                 <a:solidFill>
                   <a:srgbClr val="7030A0"/>
                 </a:solidFill>
               </a:rPr>
-              <a:t>deletePerson</a:t>
-            </a:r>
-            <a:r>
-              <a:rPr lang="en-US" sz="1400" dirty="0" smtClean="0">
+              <a:t>deleteTask</a:t>
+            </a:r>
+            <a:r>
+              <a:rPr lang="en-US" sz="1400" dirty="0">
                 <a:solidFill>
                   <a:srgbClr val="7030A0"/>
                 </a:solidFill>
               </a:rPr>
-              <a:t>(p)</a:t>
-            </a:r>
-            <a:endParaRPr lang="en-US" sz="1400" dirty="0">
-              <a:solidFill>
-                <a:srgbClr val="7030A0"/>
-              </a:solidFill>
-            </a:endParaRPr>
+              <a:t>(t)</a:t>
+            </a:r>
           </a:p>
         </p:txBody>
       </p:sp>
@@ -4336,8 +4319,8 @@
         </p:nvSpPr>
         <p:spPr>
           <a:xfrm>
-            <a:off x="6074030" y="1687656"/>
-            <a:ext cx="2438400" cy="215444"/>
+            <a:off x="5943991" y="1697160"/>
+            <a:ext cx="2688967" cy="215444"/>
           </a:xfrm>
           <a:prstGeom prst="rect">
             <a:avLst/>
@@ -4351,7 +4334,7 @@
           <a:lstStyle/>
           <a:p>
             <a:r>
-              <a:rPr lang="en-US" sz="1400" dirty="0" smtClean="0">
+              <a:rPr lang="en-US" sz="1400" dirty="0">
                 <a:solidFill>
                   <a:schemeClr val="accent5">
                     <a:lumMod val="75000"/>
@@ -4361,17 +4344,17 @@
               <a:t>post(</a:t>
             </a:r>
             <a:r>
-              <a:rPr lang="en-US" sz="1400" dirty="0" err="1" smtClean="0">
+              <a:rPr lang="en-US" sz="1400" dirty="0" err="1">
                 <a:solidFill>
                   <a:schemeClr val="accent5">
                     <a:lumMod val="75000"/>
                   </a:schemeClr>
                 </a:solidFill>
               </a:rPr>
-              <a:t>AddressBookChangedEvent</a:t>
-            </a:r>
-            <a:r>
-              <a:rPr lang="en-US" sz="1400" dirty="0" smtClean="0">
+              <a:t>SchedulePlannerChangedEvent</a:t>
+            </a:r>
+            <a:r>
+              <a:rPr lang="en-US" sz="1400" dirty="0">
                 <a:solidFill>
                   <a:schemeClr val="accent5">
                     <a:lumMod val="75000"/>
@@ -4380,13 +4363,6 @@
               </a:rPr>
               <a:t>)</a:t>
             </a:r>
-            <a:endParaRPr lang="en-US" sz="1400" dirty="0">
-              <a:solidFill>
-                <a:schemeClr val="accent5">
-                  <a:lumMod val="75000"/>
-                </a:schemeClr>
-              </a:solidFill>
-            </a:endParaRPr>
           </a:p>
         </p:txBody>
       </p:sp>
@@ -4552,7 +4528,7 @@
           <a:p>
             <a:pPr algn="ctr"/>
             <a:r>
-              <a:rPr lang="en-US" sz="1600" dirty="0" smtClean="0">
+              <a:rPr lang="en-US" sz="1600" dirty="0">
                 <a:solidFill>
                   <a:schemeClr val="bg1"/>
                 </a:solidFill>
@@ -4560,7 +4536,7 @@
               <a:t>:</a:t>
             </a:r>
             <a:r>
-              <a:rPr lang="en-US" sz="1600" dirty="0" err="1" smtClean="0">
+              <a:rPr lang="en-US" sz="1600" dirty="0" err="1">
                 <a:solidFill>
                   <a:schemeClr val="bg1"/>
                 </a:solidFill>
@@ -4793,7 +4769,7 @@
           <a:p>
             <a:pPr algn="ctr"/>
             <a:r>
-              <a:rPr lang="en-US" sz="1600" dirty="0" smtClean="0">
+              <a:rPr lang="en-US" sz="1600" dirty="0">
                 <a:solidFill>
                   <a:schemeClr val="bg1"/>
                 </a:solidFill>
@@ -4910,7 +4886,7 @@
         </p:nvSpPr>
         <p:spPr>
           <a:xfrm>
-            <a:off x="1810094" y="4797674"/>
+            <a:off x="1717072" y="4797284"/>
             <a:ext cx="2716635" cy="215444"/>
           </a:xfrm>
           <a:prstGeom prst="rect">
@@ -4925,7 +4901,7 @@
           <a:lstStyle/>
           <a:p>
             <a:r>
-              <a:rPr lang="en-US" sz="1400" dirty="0" smtClean="0">
+              <a:rPr lang="en-US" sz="1400" dirty="0">
                 <a:solidFill>
                   <a:schemeClr val="accent5">
                     <a:lumMod val="75000"/>
@@ -4935,17 +4911,17 @@
               <a:t>post(</a:t>
             </a:r>
             <a:r>
-              <a:rPr lang="en-US" sz="1400" dirty="0" err="1" smtClean="0">
+              <a:rPr lang="en-US" sz="1400" dirty="0" err="1">
                 <a:solidFill>
                   <a:schemeClr val="accent5">
                     <a:lumMod val="75000"/>
                   </a:schemeClr>
                 </a:solidFill>
               </a:rPr>
-              <a:t>AddressBookChangedEvent</a:t>
-            </a:r>
-            <a:r>
-              <a:rPr lang="en-US" sz="1400" dirty="0" smtClean="0">
+              <a:t>SchedulePlannerChangedEvent</a:t>
+            </a:r>
+            <a:r>
+              <a:rPr lang="en-US" sz="1400" dirty="0">
                 <a:solidFill>
                   <a:schemeClr val="accent5">
                     <a:lumMod val="75000"/>
@@ -4954,13 +4930,6 @@
               </a:rPr>
               <a:t>)</a:t>
             </a:r>
-            <a:endParaRPr lang="en-US" sz="1400" dirty="0">
-              <a:solidFill>
-                <a:schemeClr val="accent5">
-                  <a:lumMod val="75000"/>
-                </a:schemeClr>
-              </a:solidFill>
-            </a:endParaRPr>
           </a:p>
         </p:txBody>
       </p:sp>
@@ -5052,7 +5021,7 @@
           <a:p>
             <a:pPr algn="ctr"/>
             <a:r>
-              <a:rPr lang="en-US" sz="1600" dirty="0" smtClean="0">
+              <a:rPr lang="en-US" sz="1600" dirty="0">
                 <a:solidFill>
                   <a:schemeClr val="bg1"/>
                 </a:solidFill>
@@ -5060,7 +5029,7 @@
               <a:t>:</a:t>
             </a:r>
             <a:r>
-              <a:rPr lang="en-US" sz="1600" dirty="0" err="1" smtClean="0">
+              <a:rPr lang="en-US" sz="1600" dirty="0" err="1">
                 <a:solidFill>
                   <a:schemeClr val="bg1"/>
                 </a:solidFill>
@@ -5292,8 +5261,8 @@
         </p:nvSpPr>
         <p:spPr>
           <a:xfrm>
-            <a:off x="5036330" y="5065911"/>
-            <a:ext cx="2659870" cy="215444"/>
+            <a:off x="4781217" y="5065911"/>
+            <a:ext cx="2914983" cy="215444"/>
           </a:xfrm>
           <a:prstGeom prst="rect">
             <a:avLst/>
@@ -5307,17 +5276,17 @@
           <a:lstStyle/>
           <a:p>
             <a:r>
-              <a:rPr lang="en-US" sz="1400" dirty="0" err="1" smtClean="0">
+              <a:rPr lang="en-US" sz="1400" dirty="0" err="1">
                 <a:solidFill>
                   <a:schemeClr val="accent6">
                     <a:lumMod val="75000"/>
                   </a:schemeClr>
                 </a:solidFill>
               </a:rPr>
-              <a:t>handleAddresssBookChangedEvent</a:t>
-            </a:r>
-            <a:r>
-              <a:rPr lang="en-US" sz="1400" dirty="0" smtClean="0">
+              <a:t>handleSchedulePlannerChangedEvent</a:t>
+            </a:r>
+            <a:r>
+              <a:rPr lang="en-US" sz="1400" dirty="0">
                 <a:solidFill>
                   <a:schemeClr val="accent6">
                     <a:lumMod val="75000"/>
@@ -5326,13 +5295,6 @@
               </a:rPr>
               <a:t>()</a:t>
             </a:r>
-            <a:endParaRPr lang="en-US" sz="1400" dirty="0">
-              <a:solidFill>
-                <a:schemeClr val="accent6">
-                  <a:lumMod val="75000"/>
-                </a:schemeClr>
-              </a:solidFill>
-            </a:endParaRPr>
           </a:p>
         </p:txBody>
       </p:sp>
@@ -5417,7 +5379,7 @@
           <a:p>
             <a:pPr algn="ctr"/>
             <a:r>
-              <a:rPr lang="en-US" sz="1600" dirty="0" smtClean="0">
+              <a:rPr lang="en-US" sz="1600" dirty="0">
                 <a:solidFill>
                   <a:schemeClr val="bg1"/>
                 </a:solidFill>
@@ -5605,8 +5567,8 @@
         </p:nvSpPr>
         <p:spPr>
           <a:xfrm>
-            <a:off x="1416276" y="5395369"/>
-            <a:ext cx="2659870" cy="215444"/>
+            <a:off x="1346833" y="5395369"/>
+            <a:ext cx="2960068" cy="215444"/>
           </a:xfrm>
           <a:prstGeom prst="rect">
             <a:avLst/>
@@ -5620,26 +5582,21 @@
           <a:lstStyle/>
           <a:p>
             <a:r>
-              <a:rPr lang="en-US" sz="1400" dirty="0" err="1" smtClean="0">
+              <a:rPr lang="en-US" sz="1400" dirty="0" err="1">
                 <a:solidFill>
                   <a:srgbClr val="00B050"/>
                 </a:solidFill>
               </a:rPr>
-              <a:t>handleAddresssBookChangedEvent</a:t>
-            </a:r>
-            <a:r>
-              <a:rPr lang="en-US" sz="1400" dirty="0" smtClean="0">
+              <a:t>handleSchedulePlannerChangedEvent</a:t>
+            </a:r>
+            <a:r>
+              <a:rPr lang="en-US" sz="1400" dirty="0">
                 <a:solidFill>
                   <a:srgbClr val="00B050"/>
                 </a:solidFill>
               </a:rPr>
               <a:t>()</a:t>
             </a:r>
-            <a:endParaRPr lang="en-US" sz="1400" dirty="0">
-              <a:solidFill>
-                <a:srgbClr val="00B050"/>
-              </a:solidFill>
-            </a:endParaRPr>
           </a:p>
         </p:txBody>
       </p:sp>
@@ -5826,18 +5783,13 @@
           <a:p>
             <a:pPr algn="r"/>
             <a:r>
-              <a:rPr lang="en-US" sz="1400" dirty="0" smtClean="0">
+              <a:rPr lang="en-US" sz="1400" dirty="0">
                 <a:solidFill>
                   <a:srgbClr val="00B050"/>
                 </a:solidFill>
               </a:rPr>
               <a:t>Update status bar</a:t>
             </a:r>
-            <a:endParaRPr lang="en-US" sz="1400" dirty="0">
-              <a:solidFill>
-                <a:srgbClr val="00B050"/>
-              </a:solidFill>
-            </a:endParaRPr>
           </a:p>
         </p:txBody>
       </p:sp>
@@ -6027,7 +5979,7 @@
           <a:lstStyle/>
           <a:p>
             <a:r>
-              <a:rPr lang="en-US" sz="1400" dirty="0" smtClean="0">
+              <a:rPr lang="en-US" sz="1400" dirty="0">
                 <a:solidFill>
                   <a:schemeClr val="accent6">
                     <a:lumMod val="75000"/>
@@ -6037,7 +5989,7 @@
               <a:t>Save </a:t>
             </a:r>
             <a:br>
-              <a:rPr lang="en-US" sz="1400" dirty="0" smtClean="0">
+              <a:rPr lang="en-US" sz="1400" dirty="0">
                 <a:solidFill>
                   <a:schemeClr val="accent6">
                     <a:lumMod val="75000"/>
@@ -6046,7 +5998,7 @@
               </a:rPr>
             </a:br>
             <a:r>
-              <a:rPr lang="en-US" sz="1400" dirty="0" smtClean="0">
+              <a:rPr lang="en-US" sz="1400" dirty="0">
                 <a:solidFill>
                   <a:schemeClr val="accent6">
                     <a:lumMod val="75000"/>
@@ -6055,13 +6007,6 @@
               </a:rPr>
               <a:t>to file</a:t>
             </a:r>
-            <a:endParaRPr lang="en-US" sz="1400" dirty="0">
-              <a:solidFill>
-                <a:schemeClr val="accent6">
-                  <a:lumMod val="75000"/>
-                </a:schemeClr>
-              </a:solidFill>
-            </a:endParaRPr>
           </a:p>
         </p:txBody>
       </p:sp>

</xml_diff>

<commit_message>
Added sequence diagram for remark command
</commit_message>
<xml_diff>
--- a/docs/diagrams/HighLevelSequenceDiagrams.pptx
+++ b/docs/diagrams/HighLevelSequenceDiagrams.pptx
@@ -107,6 +107,22 @@
       </a:defRPr>
     </a:lvl9pPr>
   </p:defaultTextStyle>
+  <p:extLst>
+    <p:ext uri="{EFAFB233-063F-42B5-8137-9DF3F51BA10A}">
+      <p15:sldGuideLst xmlns:p15="http://schemas.microsoft.com/office/powerpoint/2012/main">
+        <p15:guide id="1" orient="horz" pos="1488">
+          <p15:clr>
+            <a:srgbClr val="A4A3A4"/>
+          </p15:clr>
+        </p15:guide>
+        <p15:guide id="2" pos="2880">
+          <p15:clr>
+            <a:srgbClr val="A4A3A4"/>
+          </p15:clr>
+        </p15:guide>
+      </p15:sldGuideLst>
+    </p:ext>
+  </p:extLst>
 </p:presentation>
 </file>
 
@@ -192,7 +208,7 @@
           <a:p>
             <a:fld id="{F5CC4B3F-88C1-4FFA-B1B6-F41C21DC6924}" type="datetimeFigureOut">
               <a:rPr lang="en-US" smtClean="0"/>
-              <a:t>10/16/2016</a:t>
+              <a:t>10/24/2018</a:t>
             </a:fld>
             <a:endParaRPr lang="en-US"/>
           </a:p>
@@ -256,38 +272,37 @@
           <a:p>
             <a:pPr lvl="0"/>
             <a:r>
-              <a:rPr lang="en-US" smtClean="0"/>
+              <a:rPr lang="en-US"/>
               <a:t>Click to edit Master text styles</a:t>
             </a:r>
           </a:p>
           <a:p>
             <a:pPr lvl="1"/>
             <a:r>
-              <a:rPr lang="en-US" smtClean="0"/>
+              <a:rPr lang="en-US"/>
               <a:t>Second level</a:t>
             </a:r>
           </a:p>
           <a:p>
             <a:pPr lvl="2"/>
             <a:r>
-              <a:rPr lang="en-US" smtClean="0"/>
+              <a:rPr lang="en-US"/>
               <a:t>Third level</a:t>
             </a:r>
           </a:p>
           <a:p>
             <a:pPr lvl="3"/>
             <a:r>
-              <a:rPr lang="en-US" smtClean="0"/>
+              <a:rPr lang="en-US"/>
               <a:t>Fourth level</a:t>
             </a:r>
           </a:p>
           <a:p>
             <a:pPr lvl="4"/>
             <a:r>
-              <a:rPr lang="en-US" smtClean="0"/>
+              <a:rPr lang="en-US"/>
               <a:t>Fifth level</a:t>
             </a:r>
-            <a:endParaRPr lang="en-US"/>
           </a:p>
         </p:txBody>
       </p:sp>
@@ -498,10 +513,9 @@
           <a:lstStyle/>
           <a:p>
             <a:r>
-              <a:rPr lang="en-US" smtClean="0"/>
+              <a:rPr lang="en-US"/>
               <a:t>Click to edit Master title style</a:t>
             </a:r>
-            <a:endParaRPr lang="en-US"/>
           </a:p>
         </p:txBody>
       </p:sp>
@@ -617,10 +631,9 @@
           </a:lstStyle>
           <a:p>
             <a:r>
-              <a:rPr lang="en-US" smtClean="0"/>
+              <a:rPr lang="en-US"/>
               <a:t>Click to edit Master subtitle style</a:t>
             </a:r>
-            <a:endParaRPr lang="en-US"/>
           </a:p>
         </p:txBody>
       </p:sp>
@@ -641,7 +654,7 @@
           <a:p>
             <a:fld id="{78C97017-6FC3-485B-9764-EAC9E56C1D49}" type="datetimeFigureOut">
               <a:rPr lang="en-US" smtClean="0"/>
-              <a:t>10/16/2016</a:t>
+              <a:t>10/24/2018</a:t>
             </a:fld>
             <a:endParaRPr lang="en-US"/>
           </a:p>
@@ -735,10 +748,9 @@
           <a:lstStyle/>
           <a:p>
             <a:r>
-              <a:rPr lang="en-US" smtClean="0"/>
+              <a:rPr lang="en-US"/>
               <a:t>Click to edit Master title style</a:t>
             </a:r>
-            <a:endParaRPr lang="en-US"/>
           </a:p>
         </p:txBody>
       </p:sp>
@@ -759,38 +771,37 @@
           <a:p>
             <a:pPr lvl="0"/>
             <a:r>
-              <a:rPr lang="en-US" smtClean="0"/>
+              <a:rPr lang="en-US"/>
               <a:t>Click to edit Master text styles</a:t>
             </a:r>
           </a:p>
           <a:p>
             <a:pPr lvl="1"/>
             <a:r>
-              <a:rPr lang="en-US" smtClean="0"/>
+              <a:rPr lang="en-US"/>
               <a:t>Second level</a:t>
             </a:r>
           </a:p>
           <a:p>
             <a:pPr lvl="2"/>
             <a:r>
-              <a:rPr lang="en-US" smtClean="0"/>
+              <a:rPr lang="en-US"/>
               <a:t>Third level</a:t>
             </a:r>
           </a:p>
           <a:p>
             <a:pPr lvl="3"/>
             <a:r>
-              <a:rPr lang="en-US" smtClean="0"/>
+              <a:rPr lang="en-US"/>
               <a:t>Fourth level</a:t>
             </a:r>
           </a:p>
           <a:p>
             <a:pPr lvl="4"/>
             <a:r>
-              <a:rPr lang="en-US" smtClean="0"/>
+              <a:rPr lang="en-US"/>
               <a:t>Fifth level</a:t>
             </a:r>
-            <a:endParaRPr lang="en-US"/>
           </a:p>
         </p:txBody>
       </p:sp>
@@ -811,7 +822,7 @@
           <a:p>
             <a:fld id="{78C97017-6FC3-485B-9764-EAC9E56C1D49}" type="datetimeFigureOut">
               <a:rPr lang="en-US" smtClean="0"/>
-              <a:t>10/16/2016</a:t>
+              <a:t>10/24/2018</a:t>
             </a:fld>
             <a:endParaRPr lang="en-US"/>
           </a:p>
@@ -910,10 +921,9 @@
           <a:lstStyle/>
           <a:p>
             <a:r>
-              <a:rPr lang="en-US" smtClean="0"/>
+              <a:rPr lang="en-US"/>
               <a:t>Click to edit Master title style</a:t>
             </a:r>
-            <a:endParaRPr lang="en-US"/>
           </a:p>
         </p:txBody>
       </p:sp>
@@ -939,38 +949,37 @@
           <a:p>
             <a:pPr lvl="0"/>
             <a:r>
-              <a:rPr lang="en-US" smtClean="0"/>
+              <a:rPr lang="en-US"/>
               <a:t>Click to edit Master text styles</a:t>
             </a:r>
           </a:p>
           <a:p>
             <a:pPr lvl="1"/>
             <a:r>
-              <a:rPr lang="en-US" smtClean="0"/>
+              <a:rPr lang="en-US"/>
               <a:t>Second level</a:t>
             </a:r>
           </a:p>
           <a:p>
             <a:pPr lvl="2"/>
             <a:r>
-              <a:rPr lang="en-US" smtClean="0"/>
+              <a:rPr lang="en-US"/>
               <a:t>Third level</a:t>
             </a:r>
           </a:p>
           <a:p>
             <a:pPr lvl="3"/>
             <a:r>
-              <a:rPr lang="en-US" smtClean="0"/>
+              <a:rPr lang="en-US"/>
               <a:t>Fourth level</a:t>
             </a:r>
           </a:p>
           <a:p>
             <a:pPr lvl="4"/>
             <a:r>
-              <a:rPr lang="en-US" smtClean="0"/>
+              <a:rPr lang="en-US"/>
               <a:t>Fifth level</a:t>
             </a:r>
-            <a:endParaRPr lang="en-US"/>
           </a:p>
         </p:txBody>
       </p:sp>
@@ -991,7 +1000,7 @@
           <a:p>
             <a:fld id="{78C97017-6FC3-485B-9764-EAC9E56C1D49}" type="datetimeFigureOut">
               <a:rPr lang="en-US" smtClean="0"/>
-              <a:t>10/16/2016</a:t>
+              <a:t>10/24/2018</a:t>
             </a:fld>
             <a:endParaRPr lang="en-US"/>
           </a:p>
@@ -1085,10 +1094,9 @@
           <a:lstStyle/>
           <a:p>
             <a:r>
-              <a:rPr lang="en-US" smtClean="0"/>
+              <a:rPr lang="en-US"/>
               <a:t>Click to edit Master title style</a:t>
             </a:r>
-            <a:endParaRPr lang="en-US"/>
           </a:p>
         </p:txBody>
       </p:sp>
@@ -1109,38 +1117,37 @@
           <a:p>
             <a:pPr lvl="0"/>
             <a:r>
-              <a:rPr lang="en-US" smtClean="0"/>
+              <a:rPr lang="en-US"/>
               <a:t>Click to edit Master text styles</a:t>
             </a:r>
           </a:p>
           <a:p>
             <a:pPr lvl="1"/>
             <a:r>
-              <a:rPr lang="en-US" smtClean="0"/>
+              <a:rPr lang="en-US"/>
               <a:t>Second level</a:t>
             </a:r>
           </a:p>
           <a:p>
             <a:pPr lvl="2"/>
             <a:r>
-              <a:rPr lang="en-US" smtClean="0"/>
+              <a:rPr lang="en-US"/>
               <a:t>Third level</a:t>
             </a:r>
           </a:p>
           <a:p>
             <a:pPr lvl="3"/>
             <a:r>
-              <a:rPr lang="en-US" smtClean="0"/>
+              <a:rPr lang="en-US"/>
               <a:t>Fourth level</a:t>
             </a:r>
           </a:p>
           <a:p>
             <a:pPr lvl="4"/>
             <a:r>
-              <a:rPr lang="en-US" smtClean="0"/>
+              <a:rPr lang="en-US"/>
               <a:t>Fifth level</a:t>
             </a:r>
-            <a:endParaRPr lang="en-US"/>
           </a:p>
         </p:txBody>
       </p:sp>
@@ -1161,7 +1168,7 @@
           <a:p>
             <a:fld id="{78C97017-6FC3-485B-9764-EAC9E56C1D49}" type="datetimeFigureOut">
               <a:rPr lang="en-US" smtClean="0"/>
-              <a:t>10/16/2016</a:t>
+              <a:t>10/24/2018</a:t>
             </a:fld>
             <a:endParaRPr lang="en-US"/>
           </a:p>
@@ -1264,10 +1271,9 @@
           </a:lstStyle>
           <a:p>
             <a:r>
-              <a:rPr lang="en-US" smtClean="0"/>
+              <a:rPr lang="en-US"/>
               <a:t>Click to edit Master title style</a:t>
             </a:r>
-            <a:endParaRPr lang="en-US"/>
           </a:p>
         </p:txBody>
       </p:sp>
@@ -1384,7 +1390,7 @@
           <a:p>
             <a:pPr lvl="0"/>
             <a:r>
-              <a:rPr lang="en-US" smtClean="0"/>
+              <a:rPr lang="en-US"/>
               <a:t>Click to edit Master text styles</a:t>
             </a:r>
           </a:p>
@@ -1407,7 +1413,7 @@
           <a:p>
             <a:fld id="{78C97017-6FC3-485B-9764-EAC9E56C1D49}" type="datetimeFigureOut">
               <a:rPr lang="en-US" smtClean="0"/>
-              <a:t>10/16/2016</a:t>
+              <a:t>10/24/2018</a:t>
             </a:fld>
             <a:endParaRPr lang="en-US"/>
           </a:p>
@@ -1501,10 +1507,9 @@
           <a:lstStyle/>
           <a:p>
             <a:r>
-              <a:rPr lang="en-US" smtClean="0"/>
+              <a:rPr lang="en-US"/>
               <a:t>Click to edit Master title style</a:t>
             </a:r>
-            <a:endParaRPr lang="en-US"/>
           </a:p>
         </p:txBody>
       </p:sp>
@@ -1558,38 +1563,37 @@
           <a:p>
             <a:pPr lvl="0"/>
             <a:r>
-              <a:rPr lang="en-US" smtClean="0"/>
+              <a:rPr lang="en-US"/>
               <a:t>Click to edit Master text styles</a:t>
             </a:r>
           </a:p>
           <a:p>
             <a:pPr lvl="1"/>
             <a:r>
-              <a:rPr lang="en-US" smtClean="0"/>
+              <a:rPr lang="en-US"/>
               <a:t>Second level</a:t>
             </a:r>
           </a:p>
           <a:p>
             <a:pPr lvl="2"/>
             <a:r>
-              <a:rPr lang="en-US" smtClean="0"/>
+              <a:rPr lang="en-US"/>
               <a:t>Third level</a:t>
             </a:r>
           </a:p>
           <a:p>
             <a:pPr lvl="3"/>
             <a:r>
-              <a:rPr lang="en-US" smtClean="0"/>
+              <a:rPr lang="en-US"/>
               <a:t>Fourth level</a:t>
             </a:r>
           </a:p>
           <a:p>
             <a:pPr lvl="4"/>
             <a:r>
-              <a:rPr lang="en-US" smtClean="0"/>
+              <a:rPr lang="en-US"/>
               <a:t>Fifth level</a:t>
             </a:r>
-            <a:endParaRPr lang="en-US"/>
           </a:p>
         </p:txBody>
       </p:sp>
@@ -1643,38 +1647,37 @@
           <a:p>
             <a:pPr lvl="0"/>
             <a:r>
-              <a:rPr lang="en-US" smtClean="0"/>
+              <a:rPr lang="en-US"/>
               <a:t>Click to edit Master text styles</a:t>
             </a:r>
           </a:p>
           <a:p>
             <a:pPr lvl="1"/>
             <a:r>
-              <a:rPr lang="en-US" smtClean="0"/>
+              <a:rPr lang="en-US"/>
               <a:t>Second level</a:t>
             </a:r>
           </a:p>
           <a:p>
             <a:pPr lvl="2"/>
             <a:r>
-              <a:rPr lang="en-US" smtClean="0"/>
+              <a:rPr lang="en-US"/>
               <a:t>Third level</a:t>
             </a:r>
           </a:p>
           <a:p>
             <a:pPr lvl="3"/>
             <a:r>
-              <a:rPr lang="en-US" smtClean="0"/>
+              <a:rPr lang="en-US"/>
               <a:t>Fourth level</a:t>
             </a:r>
           </a:p>
           <a:p>
             <a:pPr lvl="4"/>
             <a:r>
-              <a:rPr lang="en-US" smtClean="0"/>
+              <a:rPr lang="en-US"/>
               <a:t>Fifth level</a:t>
             </a:r>
-            <a:endParaRPr lang="en-US"/>
           </a:p>
         </p:txBody>
       </p:sp>
@@ -1695,7 +1698,7 @@
           <a:p>
             <a:fld id="{78C97017-6FC3-485B-9764-EAC9E56C1D49}" type="datetimeFigureOut">
               <a:rPr lang="en-US" smtClean="0"/>
-              <a:t>10/16/2016</a:t>
+              <a:t>10/24/2018</a:t>
             </a:fld>
             <a:endParaRPr lang="en-US"/>
           </a:p>
@@ -1793,10 +1796,9 @@
           </a:lstStyle>
           <a:p>
             <a:r>
-              <a:rPr lang="en-US" smtClean="0"/>
+              <a:rPr lang="en-US"/>
               <a:t>Click to edit Master title style</a:t>
             </a:r>
-            <a:endParaRPr lang="en-US"/>
           </a:p>
         </p:txBody>
       </p:sp>
@@ -1859,7 +1861,7 @@
           <a:p>
             <a:pPr lvl="0"/>
             <a:r>
-              <a:rPr lang="en-US" smtClean="0"/>
+              <a:rPr lang="en-US"/>
               <a:t>Click to edit Master text styles</a:t>
             </a:r>
           </a:p>
@@ -1915,38 +1917,37 @@
           <a:p>
             <a:pPr lvl="0"/>
             <a:r>
-              <a:rPr lang="en-US" smtClean="0"/>
+              <a:rPr lang="en-US"/>
               <a:t>Click to edit Master text styles</a:t>
             </a:r>
           </a:p>
           <a:p>
             <a:pPr lvl="1"/>
             <a:r>
-              <a:rPr lang="en-US" smtClean="0"/>
+              <a:rPr lang="en-US"/>
               <a:t>Second level</a:t>
             </a:r>
           </a:p>
           <a:p>
             <a:pPr lvl="2"/>
             <a:r>
-              <a:rPr lang="en-US" smtClean="0"/>
+              <a:rPr lang="en-US"/>
               <a:t>Third level</a:t>
             </a:r>
           </a:p>
           <a:p>
             <a:pPr lvl="3"/>
             <a:r>
-              <a:rPr lang="en-US" smtClean="0"/>
+              <a:rPr lang="en-US"/>
               <a:t>Fourth level</a:t>
             </a:r>
           </a:p>
           <a:p>
             <a:pPr lvl="4"/>
             <a:r>
-              <a:rPr lang="en-US" smtClean="0"/>
+              <a:rPr lang="en-US"/>
               <a:t>Fifth level</a:t>
             </a:r>
-            <a:endParaRPr lang="en-US"/>
           </a:p>
         </p:txBody>
       </p:sp>
@@ -2009,7 +2010,7 @@
           <a:p>
             <a:pPr lvl="0"/>
             <a:r>
-              <a:rPr lang="en-US" smtClean="0"/>
+              <a:rPr lang="en-US"/>
               <a:t>Click to edit Master text styles</a:t>
             </a:r>
           </a:p>
@@ -2065,38 +2066,37 @@
           <a:p>
             <a:pPr lvl="0"/>
             <a:r>
-              <a:rPr lang="en-US" smtClean="0"/>
+              <a:rPr lang="en-US"/>
               <a:t>Click to edit Master text styles</a:t>
             </a:r>
           </a:p>
           <a:p>
             <a:pPr lvl="1"/>
             <a:r>
-              <a:rPr lang="en-US" smtClean="0"/>
+              <a:rPr lang="en-US"/>
               <a:t>Second level</a:t>
             </a:r>
           </a:p>
           <a:p>
             <a:pPr lvl="2"/>
             <a:r>
-              <a:rPr lang="en-US" smtClean="0"/>
+              <a:rPr lang="en-US"/>
               <a:t>Third level</a:t>
             </a:r>
           </a:p>
           <a:p>
             <a:pPr lvl="3"/>
             <a:r>
-              <a:rPr lang="en-US" smtClean="0"/>
+              <a:rPr lang="en-US"/>
               <a:t>Fourth level</a:t>
             </a:r>
           </a:p>
           <a:p>
             <a:pPr lvl="4"/>
             <a:r>
-              <a:rPr lang="en-US" smtClean="0"/>
+              <a:rPr lang="en-US"/>
               <a:t>Fifth level</a:t>
             </a:r>
-            <a:endParaRPr lang="en-US"/>
           </a:p>
         </p:txBody>
       </p:sp>
@@ -2117,7 +2117,7 @@
           <a:p>
             <a:fld id="{78C97017-6FC3-485B-9764-EAC9E56C1D49}" type="datetimeFigureOut">
               <a:rPr lang="en-US" smtClean="0"/>
-              <a:t>10/16/2016</a:t>
+              <a:t>10/24/2018</a:t>
             </a:fld>
             <a:endParaRPr lang="en-US"/>
           </a:p>
@@ -2211,10 +2211,9 @@
           <a:lstStyle/>
           <a:p>
             <a:r>
-              <a:rPr lang="en-US" smtClean="0"/>
+              <a:rPr lang="en-US"/>
               <a:t>Click to edit Master title style</a:t>
             </a:r>
-            <a:endParaRPr lang="en-US"/>
           </a:p>
         </p:txBody>
       </p:sp>
@@ -2235,7 +2234,7 @@
           <a:p>
             <a:fld id="{78C97017-6FC3-485B-9764-EAC9E56C1D49}" type="datetimeFigureOut">
               <a:rPr lang="en-US" smtClean="0"/>
-              <a:t>10/16/2016</a:t>
+              <a:t>10/24/2018</a:t>
             </a:fld>
             <a:endParaRPr lang="en-US"/>
           </a:p>
@@ -2330,7 +2329,7 @@
           <a:p>
             <a:fld id="{78C97017-6FC3-485B-9764-EAC9E56C1D49}" type="datetimeFigureOut">
               <a:rPr lang="en-US" smtClean="0"/>
-              <a:t>10/16/2016</a:t>
+              <a:t>10/24/2018</a:t>
             </a:fld>
             <a:endParaRPr lang="en-US"/>
           </a:p>
@@ -2433,10 +2432,9 @@
           </a:lstStyle>
           <a:p>
             <a:r>
-              <a:rPr lang="en-US" smtClean="0"/>
+              <a:rPr lang="en-US"/>
               <a:t>Click to edit Master title style</a:t>
             </a:r>
-            <a:endParaRPr lang="en-US"/>
           </a:p>
         </p:txBody>
       </p:sp>
@@ -2490,38 +2488,37 @@
           <a:p>
             <a:pPr lvl="0"/>
             <a:r>
-              <a:rPr lang="en-US" smtClean="0"/>
+              <a:rPr lang="en-US"/>
               <a:t>Click to edit Master text styles</a:t>
             </a:r>
           </a:p>
           <a:p>
             <a:pPr lvl="1"/>
             <a:r>
-              <a:rPr lang="en-US" smtClean="0"/>
+              <a:rPr lang="en-US"/>
               <a:t>Second level</a:t>
             </a:r>
           </a:p>
           <a:p>
             <a:pPr lvl="2"/>
             <a:r>
-              <a:rPr lang="en-US" smtClean="0"/>
+              <a:rPr lang="en-US"/>
               <a:t>Third level</a:t>
             </a:r>
           </a:p>
           <a:p>
             <a:pPr lvl="3"/>
             <a:r>
-              <a:rPr lang="en-US" smtClean="0"/>
+              <a:rPr lang="en-US"/>
               <a:t>Fourth level</a:t>
             </a:r>
           </a:p>
           <a:p>
             <a:pPr lvl="4"/>
             <a:r>
-              <a:rPr lang="en-US" smtClean="0"/>
+              <a:rPr lang="en-US"/>
               <a:t>Fifth level</a:t>
             </a:r>
-            <a:endParaRPr lang="en-US"/>
           </a:p>
         </p:txBody>
       </p:sp>
@@ -2584,7 +2581,7 @@
           <a:p>
             <a:pPr lvl="0"/>
             <a:r>
-              <a:rPr lang="en-US" smtClean="0"/>
+              <a:rPr lang="en-US"/>
               <a:t>Click to edit Master text styles</a:t>
             </a:r>
           </a:p>
@@ -2607,7 +2604,7 @@
           <a:p>
             <a:fld id="{78C97017-6FC3-485B-9764-EAC9E56C1D49}" type="datetimeFigureOut">
               <a:rPr lang="en-US" smtClean="0"/>
-              <a:t>10/16/2016</a:t>
+              <a:t>10/24/2018</a:t>
             </a:fld>
             <a:endParaRPr lang="en-US"/>
           </a:p>
@@ -2710,10 +2707,9 @@
           </a:lstStyle>
           <a:p>
             <a:r>
-              <a:rPr lang="en-US" smtClean="0"/>
+              <a:rPr lang="en-US"/>
               <a:t>Click to edit Master title style</a:t>
             </a:r>
-            <a:endParaRPr lang="en-US"/>
           </a:p>
         </p:txBody>
       </p:sp>
@@ -2837,7 +2833,7 @@
           <a:p>
             <a:pPr lvl="0"/>
             <a:r>
-              <a:rPr lang="en-US" smtClean="0"/>
+              <a:rPr lang="en-US"/>
               <a:t>Click to edit Master text styles</a:t>
             </a:r>
           </a:p>
@@ -2860,7 +2856,7 @@
           <a:p>
             <a:fld id="{78C97017-6FC3-485B-9764-EAC9E56C1D49}" type="datetimeFigureOut">
               <a:rPr lang="en-US" smtClean="0"/>
-              <a:t>10/16/2016</a:t>
+              <a:t>10/24/2018</a:t>
             </a:fld>
             <a:endParaRPr lang="en-US"/>
           </a:p>
@@ -2969,10 +2965,9 @@
           <a:lstStyle/>
           <a:p>
             <a:r>
-              <a:rPr lang="en-US" smtClean="0"/>
+              <a:rPr lang="en-US"/>
               <a:t>Click to edit Master title style</a:t>
             </a:r>
-            <a:endParaRPr lang="en-US"/>
           </a:p>
         </p:txBody>
       </p:sp>
@@ -3003,38 +2998,37 @@
           <a:p>
             <a:pPr lvl="0"/>
             <a:r>
-              <a:rPr lang="en-US" smtClean="0"/>
+              <a:rPr lang="en-US"/>
               <a:t>Click to edit Master text styles</a:t>
             </a:r>
           </a:p>
           <a:p>
             <a:pPr lvl="1"/>
             <a:r>
-              <a:rPr lang="en-US" smtClean="0"/>
+              <a:rPr lang="en-US"/>
               <a:t>Second level</a:t>
             </a:r>
           </a:p>
           <a:p>
             <a:pPr lvl="2"/>
             <a:r>
-              <a:rPr lang="en-US" smtClean="0"/>
+              <a:rPr lang="en-US"/>
               <a:t>Third level</a:t>
             </a:r>
           </a:p>
           <a:p>
             <a:pPr lvl="3"/>
             <a:r>
-              <a:rPr lang="en-US" smtClean="0"/>
+              <a:rPr lang="en-US"/>
               <a:t>Fourth level</a:t>
             </a:r>
           </a:p>
           <a:p>
             <a:pPr lvl="4"/>
             <a:r>
-              <a:rPr lang="en-US" smtClean="0"/>
+              <a:rPr lang="en-US"/>
               <a:t>Fifth level</a:t>
             </a:r>
-            <a:endParaRPr lang="en-US"/>
           </a:p>
         </p:txBody>
       </p:sp>
@@ -3073,7 +3067,7 @@
           <a:p>
             <a:fld id="{78C97017-6FC3-485B-9764-EAC9E56C1D49}" type="datetimeFigureOut">
               <a:rPr lang="en-US" smtClean="0"/>
-              <a:t>10/16/2016</a:t>
+              <a:t>10/24/2018</a:t>
             </a:fld>
             <a:endParaRPr lang="en-US"/>
           </a:p>
@@ -3492,7 +3486,7 @@
           <a:p>
             <a:pPr algn="ctr"/>
             <a:r>
-              <a:rPr lang="en-US" sz="1600" dirty="0" smtClean="0">
+              <a:rPr lang="en-US" sz="1600" dirty="0">
                 <a:solidFill>
                   <a:schemeClr val="bg1"/>
                 </a:solidFill>
@@ -3856,7 +3850,7 @@
           <a:p>
             <a:pPr algn="ctr"/>
             <a:r>
-              <a:rPr lang="en-US" sz="1600" dirty="0" smtClean="0">
+              <a:rPr lang="en-US" sz="1600" dirty="0">
                 <a:solidFill>
                   <a:schemeClr val="bg1"/>
                 </a:solidFill>
@@ -4003,7 +3997,7 @@
           <a:p>
             <a:pPr algn="ctr"/>
             <a:r>
-              <a:rPr lang="en-US" sz="1600" dirty="0" smtClean="0">
+              <a:rPr lang="en-US" sz="1600" dirty="0">
                 <a:solidFill>
                   <a:schemeClr val="bg1"/>
                 </a:solidFill>
@@ -4150,8 +4144,8 @@
         </p:nvSpPr>
         <p:spPr>
           <a:xfrm>
-            <a:off x="466818" y="1345880"/>
-            <a:ext cx="860170" cy="215444"/>
+            <a:off x="466818" y="1329667"/>
+            <a:ext cx="979395" cy="215444"/>
           </a:xfrm>
           <a:prstGeom prst="rect">
             <a:avLst/>
@@ -4165,10 +4159,9 @@
           <a:lstStyle/>
           <a:p>
             <a:r>
-              <a:rPr lang="en-US" sz="1400" dirty="0" smtClean="0"/>
+              <a:rPr lang="en-US" sz="1400" dirty="0"/>
               <a:t>delete 1</a:t>
             </a:r>
-            <a:endParaRPr lang="en-US" sz="1400" dirty="0"/>
           </a:p>
         </p:txBody>
       </p:sp>
@@ -4231,18 +4224,13 @@
           <a:lstStyle/>
           <a:p>
             <a:r>
-              <a:rPr lang="en-US" sz="1400" dirty="0" smtClean="0">
+              <a:rPr lang="en-US" sz="1400" dirty="0">
                 <a:solidFill>
                   <a:srgbClr val="0070C0"/>
                 </a:solidFill>
               </a:rPr>
               <a:t>execute(“delete 1”)</a:t>
             </a:r>
-            <a:endParaRPr lang="en-US" sz="1400" dirty="0">
-              <a:solidFill>
-                <a:srgbClr val="0070C0"/>
-              </a:solidFill>
-            </a:endParaRPr>
           </a:p>
         </p:txBody>
       </p:sp>
@@ -4305,7 +4293,7 @@
           <a:lstStyle/>
           <a:p>
             <a:r>
-              <a:rPr lang="en-US" sz="1400" dirty="0" err="1" smtClean="0">
+              <a:rPr lang="en-US" sz="1400" dirty="0" err="1">
                 <a:solidFill>
                   <a:srgbClr val="7030A0"/>
                 </a:solidFill>
@@ -4313,18 +4301,13 @@
               <a:t>deletePerson</a:t>
             </a:r>
             <a:r>
-              <a:rPr lang="en-US" sz="1400" dirty="0" smtClean="0">
+              <a:rPr lang="en-US" sz="1400" dirty="0">
                 <a:solidFill>
                   <a:srgbClr val="7030A0"/>
                 </a:solidFill>
               </a:rPr>
               <a:t>(p)</a:t>
             </a:r>
-            <a:endParaRPr lang="en-US" sz="1400" dirty="0">
-              <a:solidFill>
-                <a:srgbClr val="7030A0"/>
-              </a:solidFill>
-            </a:endParaRPr>
           </a:p>
         </p:txBody>
       </p:sp>
@@ -4351,7 +4334,7 @@
           <a:lstStyle/>
           <a:p>
             <a:r>
-              <a:rPr lang="en-US" sz="1400" dirty="0" smtClean="0">
+              <a:rPr lang="en-US" sz="1400" dirty="0">
                 <a:solidFill>
                   <a:schemeClr val="accent5">
                     <a:lumMod val="75000"/>
@@ -4361,7 +4344,7 @@
               <a:t>post(</a:t>
             </a:r>
             <a:r>
-              <a:rPr lang="en-US" sz="1400" dirty="0" err="1" smtClean="0">
+              <a:rPr lang="en-US" sz="1400" dirty="0" err="1">
                 <a:solidFill>
                   <a:schemeClr val="accent5">
                     <a:lumMod val="75000"/>
@@ -4371,7 +4354,7 @@
               <a:t>AddressBookChangedEvent</a:t>
             </a:r>
             <a:r>
-              <a:rPr lang="en-US" sz="1400" dirty="0" smtClean="0">
+              <a:rPr lang="en-US" sz="1400" dirty="0">
                 <a:solidFill>
                   <a:schemeClr val="accent5">
                     <a:lumMod val="75000"/>
@@ -4380,13 +4363,6 @@
               </a:rPr>
               <a:t>)</a:t>
             </a:r>
-            <a:endParaRPr lang="en-US" sz="1400" dirty="0">
-              <a:solidFill>
-                <a:schemeClr val="accent5">
-                  <a:lumMod val="75000"/>
-                </a:schemeClr>
-              </a:solidFill>
-            </a:endParaRPr>
           </a:p>
         </p:txBody>
       </p:sp>
@@ -4552,7 +4528,7 @@
           <a:p>
             <a:pPr algn="ctr"/>
             <a:r>
-              <a:rPr lang="en-US" sz="1600" dirty="0" smtClean="0">
+              <a:rPr lang="en-US" sz="1600" dirty="0">
                 <a:solidFill>
                   <a:schemeClr val="bg1"/>
                 </a:solidFill>
@@ -4560,7 +4536,7 @@
               <a:t>:</a:t>
             </a:r>
             <a:r>
-              <a:rPr lang="en-US" sz="1600" dirty="0" err="1" smtClean="0">
+              <a:rPr lang="en-US" sz="1600" dirty="0" err="1">
                 <a:solidFill>
                   <a:schemeClr val="bg1"/>
                 </a:solidFill>
@@ -4793,7 +4769,7 @@
           <a:p>
             <a:pPr algn="ctr"/>
             <a:r>
-              <a:rPr lang="en-US" sz="1600" dirty="0" smtClean="0">
+              <a:rPr lang="en-US" sz="1600" dirty="0">
                 <a:solidFill>
                   <a:schemeClr val="bg1"/>
                 </a:solidFill>
@@ -4925,7 +4901,7 @@
           <a:lstStyle/>
           <a:p>
             <a:r>
-              <a:rPr lang="en-US" sz="1400" dirty="0" smtClean="0">
+              <a:rPr lang="en-US" sz="1400" dirty="0">
                 <a:solidFill>
                   <a:schemeClr val="accent5">
                     <a:lumMod val="75000"/>
@@ -4935,7 +4911,7 @@
               <a:t>post(</a:t>
             </a:r>
             <a:r>
-              <a:rPr lang="en-US" sz="1400" dirty="0" err="1" smtClean="0">
+              <a:rPr lang="en-US" sz="1400" dirty="0" err="1">
                 <a:solidFill>
                   <a:schemeClr val="accent5">
                     <a:lumMod val="75000"/>
@@ -4945,7 +4921,7 @@
               <a:t>AddressBookChangedEvent</a:t>
             </a:r>
             <a:r>
-              <a:rPr lang="en-US" sz="1400" dirty="0" smtClean="0">
+              <a:rPr lang="en-US" sz="1400" dirty="0">
                 <a:solidFill>
                   <a:schemeClr val="accent5">
                     <a:lumMod val="75000"/>
@@ -4954,13 +4930,6 @@
               </a:rPr>
               <a:t>)</a:t>
             </a:r>
-            <a:endParaRPr lang="en-US" sz="1400" dirty="0">
-              <a:solidFill>
-                <a:schemeClr val="accent5">
-                  <a:lumMod val="75000"/>
-                </a:schemeClr>
-              </a:solidFill>
-            </a:endParaRPr>
           </a:p>
         </p:txBody>
       </p:sp>
@@ -5052,7 +5021,7 @@
           <a:p>
             <a:pPr algn="ctr"/>
             <a:r>
-              <a:rPr lang="en-US" sz="1600" dirty="0" smtClean="0">
+              <a:rPr lang="en-US" sz="1600" dirty="0">
                 <a:solidFill>
                   <a:schemeClr val="bg1"/>
                 </a:solidFill>
@@ -5060,7 +5029,7 @@
               <a:t>:</a:t>
             </a:r>
             <a:r>
-              <a:rPr lang="en-US" sz="1600" dirty="0" err="1" smtClean="0">
+              <a:rPr lang="en-US" sz="1600" dirty="0" err="1">
                 <a:solidFill>
                   <a:schemeClr val="bg1"/>
                 </a:solidFill>
@@ -5307,7 +5276,7 @@
           <a:lstStyle/>
           <a:p>
             <a:r>
-              <a:rPr lang="en-US" sz="1400" dirty="0" err="1" smtClean="0">
+              <a:rPr lang="en-US" sz="1400" dirty="0" err="1">
                 <a:solidFill>
                   <a:schemeClr val="accent6">
                     <a:lumMod val="75000"/>
@@ -5317,7 +5286,7 @@
               <a:t>handleAddresssBookChangedEvent</a:t>
             </a:r>
             <a:r>
-              <a:rPr lang="en-US" sz="1400" dirty="0" smtClean="0">
+              <a:rPr lang="en-US" sz="1400" dirty="0">
                 <a:solidFill>
                   <a:schemeClr val="accent6">
                     <a:lumMod val="75000"/>
@@ -5326,13 +5295,6 @@
               </a:rPr>
               <a:t>()</a:t>
             </a:r>
-            <a:endParaRPr lang="en-US" sz="1400" dirty="0">
-              <a:solidFill>
-                <a:schemeClr val="accent6">
-                  <a:lumMod val="75000"/>
-                </a:schemeClr>
-              </a:solidFill>
-            </a:endParaRPr>
           </a:p>
         </p:txBody>
       </p:sp>
@@ -5417,7 +5379,7 @@
           <a:p>
             <a:pPr algn="ctr"/>
             <a:r>
-              <a:rPr lang="en-US" sz="1600" dirty="0" smtClean="0">
+              <a:rPr lang="en-US" sz="1600" dirty="0">
                 <a:solidFill>
                   <a:schemeClr val="bg1"/>
                 </a:solidFill>
@@ -5620,7 +5582,7 @@
           <a:lstStyle/>
           <a:p>
             <a:r>
-              <a:rPr lang="en-US" sz="1400" dirty="0" err="1" smtClean="0">
+              <a:rPr lang="en-US" sz="1400" dirty="0" err="1">
                 <a:solidFill>
                   <a:srgbClr val="00B050"/>
                 </a:solidFill>
@@ -5628,18 +5590,13 @@
               <a:t>handleAddresssBookChangedEvent</a:t>
             </a:r>
             <a:r>
-              <a:rPr lang="en-US" sz="1400" dirty="0" smtClean="0">
+              <a:rPr lang="en-US" sz="1400" dirty="0">
                 <a:solidFill>
                   <a:srgbClr val="00B050"/>
                 </a:solidFill>
               </a:rPr>
               <a:t>()</a:t>
             </a:r>
-            <a:endParaRPr lang="en-US" sz="1400" dirty="0">
-              <a:solidFill>
-                <a:srgbClr val="00B050"/>
-              </a:solidFill>
-            </a:endParaRPr>
           </a:p>
         </p:txBody>
       </p:sp>
@@ -5826,18 +5783,13 @@
           <a:p>
             <a:pPr algn="r"/>
             <a:r>
-              <a:rPr lang="en-US" sz="1400" dirty="0" smtClean="0">
+              <a:rPr lang="en-US" sz="1400" dirty="0">
                 <a:solidFill>
                   <a:srgbClr val="00B050"/>
                 </a:solidFill>
               </a:rPr>
               <a:t>Update status bar</a:t>
             </a:r>
-            <a:endParaRPr lang="en-US" sz="1400" dirty="0">
-              <a:solidFill>
-                <a:srgbClr val="00B050"/>
-              </a:solidFill>
-            </a:endParaRPr>
           </a:p>
         </p:txBody>
       </p:sp>
@@ -6027,7 +5979,7 @@
           <a:lstStyle/>
           <a:p>
             <a:r>
-              <a:rPr lang="en-US" sz="1400" dirty="0" smtClean="0">
+              <a:rPr lang="en-US" sz="1400" dirty="0">
                 <a:solidFill>
                   <a:schemeClr val="accent6">
                     <a:lumMod val="75000"/>
@@ -6037,7 +5989,7 @@
               <a:t>Save </a:t>
             </a:r>
             <a:br>
-              <a:rPr lang="en-US" sz="1400" dirty="0" smtClean="0">
+              <a:rPr lang="en-US" sz="1400" dirty="0">
                 <a:solidFill>
                   <a:schemeClr val="accent6">
                     <a:lumMod val="75000"/>
@@ -6046,7 +5998,7 @@
               </a:rPr>
             </a:br>
             <a:r>
-              <a:rPr lang="en-US" sz="1400" dirty="0" smtClean="0">
+              <a:rPr lang="en-US" sz="1400" dirty="0">
                 <a:solidFill>
                   <a:schemeClr val="accent6">
                     <a:lumMod val="75000"/>
@@ -6055,13 +6007,6 @@
               </a:rPr>
               <a:t>to file</a:t>
             </a:r>
-            <a:endParaRPr lang="en-US" sz="1400" dirty="0">
-              <a:solidFill>
-                <a:schemeClr val="accent6">
-                  <a:lumMod val="75000"/>
-                </a:schemeClr>
-              </a:solidFill>
-            </a:endParaRPr>
           </a:p>
         </p:txBody>
       </p:sp>

</xml_diff>

<commit_message>
docs/diagrams/HighLevelSequenceDiagrams.pptx: - Update stick figure of person to "Event" - Update method deletePerson(p)" to deleteEvent(e) - Update method post(AddressBookChangedEvent) to   post(SchedulerChangedEvent) - Model Class Diagram: -> Update method post(AddressBookChangedEvent) to     post(SchedulerChangedEvent) -> Update method handleAddressBookChangedEvent()     to handleSchedulerChangedEvent()
Replace docs/images/SDforDeletePerson.png with
docs/images/SDforDeleteEvent.png

docs/DeveloperGuide.adoc (line 152): Replace
SDforDeletePerson.png with SDforDeleteEvent.png
</commit_message>
<xml_diff>
--- a/docs/diagrams/HighLevelSequenceDiagrams.pptx
+++ b/docs/diagrams/HighLevelSequenceDiagrams.pptx
@@ -107,6 +107,22 @@
       </a:defRPr>
     </a:lvl9pPr>
   </p:defaultTextStyle>
+  <p:extLst>
+    <p:ext uri="{EFAFB233-063F-42B5-8137-9DF3F51BA10A}">
+      <p15:sldGuideLst xmlns:p15="http://schemas.microsoft.com/office/powerpoint/2012/main">
+        <p15:guide id="1" orient="horz" pos="1488">
+          <p15:clr>
+            <a:srgbClr val="A4A3A4"/>
+          </p15:clr>
+        </p15:guide>
+        <p15:guide id="2" pos="2880">
+          <p15:clr>
+            <a:srgbClr val="A4A3A4"/>
+          </p15:clr>
+        </p15:guide>
+      </p15:sldGuideLst>
+    </p:ext>
+  </p:extLst>
 </p:presentation>
 </file>
 
@@ -192,7 +208,7 @@
           <a:p>
             <a:fld id="{F5CC4B3F-88C1-4FFA-B1B6-F41C21DC6924}" type="datetimeFigureOut">
               <a:rPr lang="en-US" smtClean="0"/>
-              <a:t>10/16/2016</a:t>
+              <a:t>10/24/2018</a:t>
             </a:fld>
             <a:endParaRPr lang="en-US"/>
           </a:p>
@@ -256,38 +272,37 @@
           <a:p>
             <a:pPr lvl="0"/>
             <a:r>
-              <a:rPr lang="en-US" smtClean="0"/>
+              <a:rPr lang="en-US"/>
               <a:t>Click to edit Master text styles</a:t>
             </a:r>
           </a:p>
           <a:p>
             <a:pPr lvl="1"/>
             <a:r>
-              <a:rPr lang="en-US" smtClean="0"/>
+              <a:rPr lang="en-US"/>
               <a:t>Second level</a:t>
             </a:r>
           </a:p>
           <a:p>
             <a:pPr lvl="2"/>
             <a:r>
-              <a:rPr lang="en-US" smtClean="0"/>
+              <a:rPr lang="en-US"/>
               <a:t>Third level</a:t>
             </a:r>
           </a:p>
           <a:p>
             <a:pPr lvl="3"/>
             <a:r>
-              <a:rPr lang="en-US" smtClean="0"/>
+              <a:rPr lang="en-US"/>
               <a:t>Fourth level</a:t>
             </a:r>
           </a:p>
           <a:p>
             <a:pPr lvl="4"/>
             <a:r>
-              <a:rPr lang="en-US" smtClean="0"/>
+              <a:rPr lang="en-US"/>
               <a:t>Fifth level</a:t>
             </a:r>
-            <a:endParaRPr lang="en-US"/>
           </a:p>
         </p:txBody>
       </p:sp>
@@ -460,6 +475,90 @@
 </p:notesMaster>
 </file>
 
+<file path=ppt/notesSlides/notesSlide1.xml><?xml version="1.0" encoding="utf-8"?>
+<p:notes xmlns:a="http://schemas.openxmlformats.org/drawingml/2006/main" xmlns:r="http://schemas.openxmlformats.org/officeDocument/2006/relationships" xmlns:p="http://schemas.openxmlformats.org/presentationml/2006/main">
+  <p:cSld>
+    <p:spTree>
+      <p:nvGrpSpPr>
+        <p:cNvPr id="1" name=""/>
+        <p:cNvGrpSpPr/>
+        <p:nvPr/>
+      </p:nvGrpSpPr>
+      <p:grpSpPr>
+        <a:xfrm>
+          <a:off x="0" y="0"/>
+          <a:ext cx="0" cy="0"/>
+          <a:chOff x="0" y="0"/>
+          <a:chExt cx="0" cy="0"/>
+        </a:xfrm>
+      </p:grpSpPr>
+      <p:sp>
+        <p:nvSpPr>
+          <p:cNvPr id="2" name="Slide Image Placeholder 1"/>
+          <p:cNvSpPr>
+            <a:spLocks noGrp="1" noRot="1" noChangeAspect="1"/>
+          </p:cNvSpPr>
+          <p:nvPr>
+            <p:ph type="sldImg"/>
+          </p:nvPr>
+        </p:nvSpPr>
+        <p:spPr/>
+      </p:sp>
+      <p:sp>
+        <p:nvSpPr>
+          <p:cNvPr id="3" name="Notes Placeholder 2"/>
+          <p:cNvSpPr>
+            <a:spLocks noGrp="1"/>
+          </p:cNvSpPr>
+          <p:nvPr>
+            <p:ph type="body" idx="1"/>
+          </p:nvPr>
+        </p:nvSpPr>
+        <p:spPr/>
+        <p:txBody>
+          <a:bodyPr/>
+          <a:lstStyle/>
+          <a:p>
+            <a:endParaRPr lang="en-SG" dirty="0"/>
+          </a:p>
+        </p:txBody>
+      </p:sp>
+      <p:sp>
+        <p:nvSpPr>
+          <p:cNvPr id="4" name="Slide Number Placeholder 3"/>
+          <p:cNvSpPr>
+            <a:spLocks noGrp="1"/>
+          </p:cNvSpPr>
+          <p:nvPr>
+            <p:ph type="sldNum" sz="quarter" idx="5"/>
+          </p:nvPr>
+        </p:nvSpPr>
+        <p:spPr/>
+        <p:txBody>
+          <a:bodyPr/>
+          <a:lstStyle/>
+          <a:p>
+            <a:fld id="{5A7AB025-77E3-4BD1-A2FD-B3183DBA47A3}" type="slidenum">
+              <a:rPr lang="en-US" smtClean="0"/>
+              <a:t>1</a:t>
+            </a:fld>
+            <a:endParaRPr lang="en-US"/>
+          </a:p>
+        </p:txBody>
+      </p:sp>
+    </p:spTree>
+    <p:extLst>
+      <p:ext uri="{BB962C8B-B14F-4D97-AF65-F5344CB8AC3E}">
+        <p14:creationId xmlns:p14="http://schemas.microsoft.com/office/powerpoint/2010/main" val="3380028639"/>
+      </p:ext>
+    </p:extLst>
+  </p:cSld>
+  <p:clrMapOvr>
+    <a:masterClrMapping/>
+  </p:clrMapOvr>
+</p:notes>
+</file>
+
 <file path=ppt/slideLayouts/slideLayout1.xml><?xml version="1.0" encoding="utf-8"?>
 <p:sldLayout xmlns:a="http://schemas.openxmlformats.org/drawingml/2006/main" xmlns:r="http://schemas.openxmlformats.org/officeDocument/2006/relationships" xmlns:p="http://schemas.openxmlformats.org/presentationml/2006/main" type="title" preserve="1">
   <p:cSld name="Title Slide">
@@ -498,10 +597,9 @@
           <a:lstStyle/>
           <a:p>
             <a:r>
-              <a:rPr lang="en-US" smtClean="0"/>
+              <a:rPr lang="en-US"/>
               <a:t>Click to edit Master title style</a:t>
             </a:r>
-            <a:endParaRPr lang="en-US"/>
           </a:p>
         </p:txBody>
       </p:sp>
@@ -617,10 +715,9 @@
           </a:lstStyle>
           <a:p>
             <a:r>
-              <a:rPr lang="en-US" smtClean="0"/>
+              <a:rPr lang="en-US"/>
               <a:t>Click to edit Master subtitle style</a:t>
             </a:r>
-            <a:endParaRPr lang="en-US"/>
           </a:p>
         </p:txBody>
       </p:sp>
@@ -641,7 +738,7 @@
           <a:p>
             <a:fld id="{78C97017-6FC3-485B-9764-EAC9E56C1D49}" type="datetimeFigureOut">
               <a:rPr lang="en-US" smtClean="0"/>
-              <a:t>10/16/2016</a:t>
+              <a:t>10/24/2018</a:t>
             </a:fld>
             <a:endParaRPr lang="en-US"/>
           </a:p>
@@ -735,10 +832,9 @@
           <a:lstStyle/>
           <a:p>
             <a:r>
-              <a:rPr lang="en-US" smtClean="0"/>
+              <a:rPr lang="en-US"/>
               <a:t>Click to edit Master title style</a:t>
             </a:r>
-            <a:endParaRPr lang="en-US"/>
           </a:p>
         </p:txBody>
       </p:sp>
@@ -759,38 +855,37 @@
           <a:p>
             <a:pPr lvl="0"/>
             <a:r>
-              <a:rPr lang="en-US" smtClean="0"/>
+              <a:rPr lang="en-US"/>
               <a:t>Click to edit Master text styles</a:t>
             </a:r>
           </a:p>
           <a:p>
             <a:pPr lvl="1"/>
             <a:r>
-              <a:rPr lang="en-US" smtClean="0"/>
+              <a:rPr lang="en-US"/>
               <a:t>Second level</a:t>
             </a:r>
           </a:p>
           <a:p>
             <a:pPr lvl="2"/>
             <a:r>
-              <a:rPr lang="en-US" smtClean="0"/>
+              <a:rPr lang="en-US"/>
               <a:t>Third level</a:t>
             </a:r>
           </a:p>
           <a:p>
             <a:pPr lvl="3"/>
             <a:r>
-              <a:rPr lang="en-US" smtClean="0"/>
+              <a:rPr lang="en-US"/>
               <a:t>Fourth level</a:t>
             </a:r>
           </a:p>
           <a:p>
             <a:pPr lvl="4"/>
             <a:r>
-              <a:rPr lang="en-US" smtClean="0"/>
+              <a:rPr lang="en-US"/>
               <a:t>Fifth level</a:t>
             </a:r>
-            <a:endParaRPr lang="en-US"/>
           </a:p>
         </p:txBody>
       </p:sp>
@@ -811,7 +906,7 @@
           <a:p>
             <a:fld id="{78C97017-6FC3-485B-9764-EAC9E56C1D49}" type="datetimeFigureOut">
               <a:rPr lang="en-US" smtClean="0"/>
-              <a:t>10/16/2016</a:t>
+              <a:t>10/24/2018</a:t>
             </a:fld>
             <a:endParaRPr lang="en-US"/>
           </a:p>
@@ -910,10 +1005,9 @@
           <a:lstStyle/>
           <a:p>
             <a:r>
-              <a:rPr lang="en-US" smtClean="0"/>
+              <a:rPr lang="en-US"/>
               <a:t>Click to edit Master title style</a:t>
             </a:r>
-            <a:endParaRPr lang="en-US"/>
           </a:p>
         </p:txBody>
       </p:sp>
@@ -939,38 +1033,37 @@
           <a:p>
             <a:pPr lvl="0"/>
             <a:r>
-              <a:rPr lang="en-US" smtClean="0"/>
+              <a:rPr lang="en-US"/>
               <a:t>Click to edit Master text styles</a:t>
             </a:r>
           </a:p>
           <a:p>
             <a:pPr lvl="1"/>
             <a:r>
-              <a:rPr lang="en-US" smtClean="0"/>
+              <a:rPr lang="en-US"/>
               <a:t>Second level</a:t>
             </a:r>
           </a:p>
           <a:p>
             <a:pPr lvl="2"/>
             <a:r>
-              <a:rPr lang="en-US" smtClean="0"/>
+              <a:rPr lang="en-US"/>
               <a:t>Third level</a:t>
             </a:r>
           </a:p>
           <a:p>
             <a:pPr lvl="3"/>
             <a:r>
-              <a:rPr lang="en-US" smtClean="0"/>
+              <a:rPr lang="en-US"/>
               <a:t>Fourth level</a:t>
             </a:r>
           </a:p>
           <a:p>
             <a:pPr lvl="4"/>
             <a:r>
-              <a:rPr lang="en-US" smtClean="0"/>
+              <a:rPr lang="en-US"/>
               <a:t>Fifth level</a:t>
             </a:r>
-            <a:endParaRPr lang="en-US"/>
           </a:p>
         </p:txBody>
       </p:sp>
@@ -991,7 +1084,7 @@
           <a:p>
             <a:fld id="{78C97017-6FC3-485B-9764-EAC9E56C1D49}" type="datetimeFigureOut">
               <a:rPr lang="en-US" smtClean="0"/>
-              <a:t>10/16/2016</a:t>
+              <a:t>10/24/2018</a:t>
             </a:fld>
             <a:endParaRPr lang="en-US"/>
           </a:p>
@@ -1085,10 +1178,9 @@
           <a:lstStyle/>
           <a:p>
             <a:r>
-              <a:rPr lang="en-US" smtClean="0"/>
+              <a:rPr lang="en-US"/>
               <a:t>Click to edit Master title style</a:t>
             </a:r>
-            <a:endParaRPr lang="en-US"/>
           </a:p>
         </p:txBody>
       </p:sp>
@@ -1109,38 +1201,37 @@
           <a:p>
             <a:pPr lvl="0"/>
             <a:r>
-              <a:rPr lang="en-US" smtClean="0"/>
+              <a:rPr lang="en-US"/>
               <a:t>Click to edit Master text styles</a:t>
             </a:r>
           </a:p>
           <a:p>
             <a:pPr lvl="1"/>
             <a:r>
-              <a:rPr lang="en-US" smtClean="0"/>
+              <a:rPr lang="en-US"/>
               <a:t>Second level</a:t>
             </a:r>
           </a:p>
           <a:p>
             <a:pPr lvl="2"/>
             <a:r>
-              <a:rPr lang="en-US" smtClean="0"/>
+              <a:rPr lang="en-US"/>
               <a:t>Third level</a:t>
             </a:r>
           </a:p>
           <a:p>
             <a:pPr lvl="3"/>
             <a:r>
-              <a:rPr lang="en-US" smtClean="0"/>
+              <a:rPr lang="en-US"/>
               <a:t>Fourth level</a:t>
             </a:r>
           </a:p>
           <a:p>
             <a:pPr lvl="4"/>
             <a:r>
-              <a:rPr lang="en-US" smtClean="0"/>
+              <a:rPr lang="en-US"/>
               <a:t>Fifth level</a:t>
             </a:r>
-            <a:endParaRPr lang="en-US"/>
           </a:p>
         </p:txBody>
       </p:sp>
@@ -1161,7 +1252,7 @@
           <a:p>
             <a:fld id="{78C97017-6FC3-485B-9764-EAC9E56C1D49}" type="datetimeFigureOut">
               <a:rPr lang="en-US" smtClean="0"/>
-              <a:t>10/16/2016</a:t>
+              <a:t>10/24/2018</a:t>
             </a:fld>
             <a:endParaRPr lang="en-US"/>
           </a:p>
@@ -1264,10 +1355,9 @@
           </a:lstStyle>
           <a:p>
             <a:r>
-              <a:rPr lang="en-US" smtClean="0"/>
+              <a:rPr lang="en-US"/>
               <a:t>Click to edit Master title style</a:t>
             </a:r>
-            <a:endParaRPr lang="en-US"/>
           </a:p>
         </p:txBody>
       </p:sp>
@@ -1384,7 +1474,7 @@
           <a:p>
             <a:pPr lvl="0"/>
             <a:r>
-              <a:rPr lang="en-US" smtClean="0"/>
+              <a:rPr lang="en-US"/>
               <a:t>Click to edit Master text styles</a:t>
             </a:r>
           </a:p>
@@ -1407,7 +1497,7 @@
           <a:p>
             <a:fld id="{78C97017-6FC3-485B-9764-EAC9E56C1D49}" type="datetimeFigureOut">
               <a:rPr lang="en-US" smtClean="0"/>
-              <a:t>10/16/2016</a:t>
+              <a:t>10/24/2018</a:t>
             </a:fld>
             <a:endParaRPr lang="en-US"/>
           </a:p>
@@ -1501,10 +1591,9 @@
           <a:lstStyle/>
           <a:p>
             <a:r>
-              <a:rPr lang="en-US" smtClean="0"/>
+              <a:rPr lang="en-US"/>
               <a:t>Click to edit Master title style</a:t>
             </a:r>
-            <a:endParaRPr lang="en-US"/>
           </a:p>
         </p:txBody>
       </p:sp>
@@ -1558,38 +1647,37 @@
           <a:p>
             <a:pPr lvl="0"/>
             <a:r>
-              <a:rPr lang="en-US" smtClean="0"/>
+              <a:rPr lang="en-US"/>
               <a:t>Click to edit Master text styles</a:t>
             </a:r>
           </a:p>
           <a:p>
             <a:pPr lvl="1"/>
             <a:r>
-              <a:rPr lang="en-US" smtClean="0"/>
+              <a:rPr lang="en-US"/>
               <a:t>Second level</a:t>
             </a:r>
           </a:p>
           <a:p>
             <a:pPr lvl="2"/>
             <a:r>
-              <a:rPr lang="en-US" smtClean="0"/>
+              <a:rPr lang="en-US"/>
               <a:t>Third level</a:t>
             </a:r>
           </a:p>
           <a:p>
             <a:pPr lvl="3"/>
             <a:r>
-              <a:rPr lang="en-US" smtClean="0"/>
+              <a:rPr lang="en-US"/>
               <a:t>Fourth level</a:t>
             </a:r>
           </a:p>
           <a:p>
             <a:pPr lvl="4"/>
             <a:r>
-              <a:rPr lang="en-US" smtClean="0"/>
+              <a:rPr lang="en-US"/>
               <a:t>Fifth level</a:t>
             </a:r>
-            <a:endParaRPr lang="en-US"/>
           </a:p>
         </p:txBody>
       </p:sp>
@@ -1643,38 +1731,37 @@
           <a:p>
             <a:pPr lvl="0"/>
             <a:r>
-              <a:rPr lang="en-US" smtClean="0"/>
+              <a:rPr lang="en-US"/>
               <a:t>Click to edit Master text styles</a:t>
             </a:r>
           </a:p>
           <a:p>
             <a:pPr lvl="1"/>
             <a:r>
-              <a:rPr lang="en-US" smtClean="0"/>
+              <a:rPr lang="en-US"/>
               <a:t>Second level</a:t>
             </a:r>
           </a:p>
           <a:p>
             <a:pPr lvl="2"/>
             <a:r>
-              <a:rPr lang="en-US" smtClean="0"/>
+              <a:rPr lang="en-US"/>
               <a:t>Third level</a:t>
             </a:r>
           </a:p>
           <a:p>
             <a:pPr lvl="3"/>
             <a:r>
-              <a:rPr lang="en-US" smtClean="0"/>
+              <a:rPr lang="en-US"/>
               <a:t>Fourth level</a:t>
             </a:r>
           </a:p>
           <a:p>
             <a:pPr lvl="4"/>
             <a:r>
-              <a:rPr lang="en-US" smtClean="0"/>
+              <a:rPr lang="en-US"/>
               <a:t>Fifth level</a:t>
             </a:r>
-            <a:endParaRPr lang="en-US"/>
           </a:p>
         </p:txBody>
       </p:sp>
@@ -1695,7 +1782,7 @@
           <a:p>
             <a:fld id="{78C97017-6FC3-485B-9764-EAC9E56C1D49}" type="datetimeFigureOut">
               <a:rPr lang="en-US" smtClean="0"/>
-              <a:t>10/16/2016</a:t>
+              <a:t>10/24/2018</a:t>
             </a:fld>
             <a:endParaRPr lang="en-US"/>
           </a:p>
@@ -1793,10 +1880,9 @@
           </a:lstStyle>
           <a:p>
             <a:r>
-              <a:rPr lang="en-US" smtClean="0"/>
+              <a:rPr lang="en-US"/>
               <a:t>Click to edit Master title style</a:t>
             </a:r>
-            <a:endParaRPr lang="en-US"/>
           </a:p>
         </p:txBody>
       </p:sp>
@@ -1859,7 +1945,7 @@
           <a:p>
             <a:pPr lvl="0"/>
             <a:r>
-              <a:rPr lang="en-US" smtClean="0"/>
+              <a:rPr lang="en-US"/>
               <a:t>Click to edit Master text styles</a:t>
             </a:r>
           </a:p>
@@ -1915,38 +2001,37 @@
           <a:p>
             <a:pPr lvl="0"/>
             <a:r>
-              <a:rPr lang="en-US" smtClean="0"/>
+              <a:rPr lang="en-US"/>
               <a:t>Click to edit Master text styles</a:t>
             </a:r>
           </a:p>
           <a:p>
             <a:pPr lvl="1"/>
             <a:r>
-              <a:rPr lang="en-US" smtClean="0"/>
+              <a:rPr lang="en-US"/>
               <a:t>Second level</a:t>
             </a:r>
           </a:p>
           <a:p>
             <a:pPr lvl="2"/>
             <a:r>
-              <a:rPr lang="en-US" smtClean="0"/>
+              <a:rPr lang="en-US"/>
               <a:t>Third level</a:t>
             </a:r>
           </a:p>
           <a:p>
             <a:pPr lvl="3"/>
             <a:r>
-              <a:rPr lang="en-US" smtClean="0"/>
+              <a:rPr lang="en-US"/>
               <a:t>Fourth level</a:t>
             </a:r>
           </a:p>
           <a:p>
             <a:pPr lvl="4"/>
             <a:r>
-              <a:rPr lang="en-US" smtClean="0"/>
+              <a:rPr lang="en-US"/>
               <a:t>Fifth level</a:t>
             </a:r>
-            <a:endParaRPr lang="en-US"/>
           </a:p>
         </p:txBody>
       </p:sp>
@@ -2009,7 +2094,7 @@
           <a:p>
             <a:pPr lvl="0"/>
             <a:r>
-              <a:rPr lang="en-US" smtClean="0"/>
+              <a:rPr lang="en-US"/>
               <a:t>Click to edit Master text styles</a:t>
             </a:r>
           </a:p>
@@ -2065,38 +2150,37 @@
           <a:p>
             <a:pPr lvl="0"/>
             <a:r>
-              <a:rPr lang="en-US" smtClean="0"/>
+              <a:rPr lang="en-US"/>
               <a:t>Click to edit Master text styles</a:t>
             </a:r>
           </a:p>
           <a:p>
             <a:pPr lvl="1"/>
             <a:r>
-              <a:rPr lang="en-US" smtClean="0"/>
+              <a:rPr lang="en-US"/>
               <a:t>Second level</a:t>
             </a:r>
           </a:p>
           <a:p>
             <a:pPr lvl="2"/>
             <a:r>
-              <a:rPr lang="en-US" smtClean="0"/>
+              <a:rPr lang="en-US"/>
               <a:t>Third level</a:t>
             </a:r>
           </a:p>
           <a:p>
             <a:pPr lvl="3"/>
             <a:r>
-              <a:rPr lang="en-US" smtClean="0"/>
+              <a:rPr lang="en-US"/>
               <a:t>Fourth level</a:t>
             </a:r>
           </a:p>
           <a:p>
             <a:pPr lvl="4"/>
             <a:r>
-              <a:rPr lang="en-US" smtClean="0"/>
+              <a:rPr lang="en-US"/>
               <a:t>Fifth level</a:t>
             </a:r>
-            <a:endParaRPr lang="en-US"/>
           </a:p>
         </p:txBody>
       </p:sp>
@@ -2117,7 +2201,7 @@
           <a:p>
             <a:fld id="{78C97017-6FC3-485B-9764-EAC9E56C1D49}" type="datetimeFigureOut">
               <a:rPr lang="en-US" smtClean="0"/>
-              <a:t>10/16/2016</a:t>
+              <a:t>10/24/2018</a:t>
             </a:fld>
             <a:endParaRPr lang="en-US"/>
           </a:p>
@@ -2211,10 +2295,9 @@
           <a:lstStyle/>
           <a:p>
             <a:r>
-              <a:rPr lang="en-US" smtClean="0"/>
+              <a:rPr lang="en-US"/>
               <a:t>Click to edit Master title style</a:t>
             </a:r>
-            <a:endParaRPr lang="en-US"/>
           </a:p>
         </p:txBody>
       </p:sp>
@@ -2235,7 +2318,7 @@
           <a:p>
             <a:fld id="{78C97017-6FC3-485B-9764-EAC9E56C1D49}" type="datetimeFigureOut">
               <a:rPr lang="en-US" smtClean="0"/>
-              <a:t>10/16/2016</a:t>
+              <a:t>10/24/2018</a:t>
             </a:fld>
             <a:endParaRPr lang="en-US"/>
           </a:p>
@@ -2330,7 +2413,7 @@
           <a:p>
             <a:fld id="{78C97017-6FC3-485B-9764-EAC9E56C1D49}" type="datetimeFigureOut">
               <a:rPr lang="en-US" smtClean="0"/>
-              <a:t>10/16/2016</a:t>
+              <a:t>10/24/2018</a:t>
             </a:fld>
             <a:endParaRPr lang="en-US"/>
           </a:p>
@@ -2433,10 +2516,9 @@
           </a:lstStyle>
           <a:p>
             <a:r>
-              <a:rPr lang="en-US" smtClean="0"/>
+              <a:rPr lang="en-US"/>
               <a:t>Click to edit Master title style</a:t>
             </a:r>
-            <a:endParaRPr lang="en-US"/>
           </a:p>
         </p:txBody>
       </p:sp>
@@ -2490,38 +2572,37 @@
           <a:p>
             <a:pPr lvl="0"/>
             <a:r>
-              <a:rPr lang="en-US" smtClean="0"/>
+              <a:rPr lang="en-US"/>
               <a:t>Click to edit Master text styles</a:t>
             </a:r>
           </a:p>
           <a:p>
             <a:pPr lvl="1"/>
             <a:r>
-              <a:rPr lang="en-US" smtClean="0"/>
+              <a:rPr lang="en-US"/>
               <a:t>Second level</a:t>
             </a:r>
           </a:p>
           <a:p>
             <a:pPr lvl="2"/>
             <a:r>
-              <a:rPr lang="en-US" smtClean="0"/>
+              <a:rPr lang="en-US"/>
               <a:t>Third level</a:t>
             </a:r>
           </a:p>
           <a:p>
             <a:pPr lvl="3"/>
             <a:r>
-              <a:rPr lang="en-US" smtClean="0"/>
+              <a:rPr lang="en-US"/>
               <a:t>Fourth level</a:t>
             </a:r>
           </a:p>
           <a:p>
             <a:pPr lvl="4"/>
             <a:r>
-              <a:rPr lang="en-US" smtClean="0"/>
+              <a:rPr lang="en-US"/>
               <a:t>Fifth level</a:t>
             </a:r>
-            <a:endParaRPr lang="en-US"/>
           </a:p>
         </p:txBody>
       </p:sp>
@@ -2584,7 +2665,7 @@
           <a:p>
             <a:pPr lvl="0"/>
             <a:r>
-              <a:rPr lang="en-US" smtClean="0"/>
+              <a:rPr lang="en-US"/>
               <a:t>Click to edit Master text styles</a:t>
             </a:r>
           </a:p>
@@ -2607,7 +2688,7 @@
           <a:p>
             <a:fld id="{78C97017-6FC3-485B-9764-EAC9E56C1D49}" type="datetimeFigureOut">
               <a:rPr lang="en-US" smtClean="0"/>
-              <a:t>10/16/2016</a:t>
+              <a:t>10/24/2018</a:t>
             </a:fld>
             <a:endParaRPr lang="en-US"/>
           </a:p>
@@ -2710,10 +2791,9 @@
           </a:lstStyle>
           <a:p>
             <a:r>
-              <a:rPr lang="en-US" smtClean="0"/>
+              <a:rPr lang="en-US"/>
               <a:t>Click to edit Master title style</a:t>
             </a:r>
-            <a:endParaRPr lang="en-US"/>
           </a:p>
         </p:txBody>
       </p:sp>
@@ -2837,7 +2917,7 @@
           <a:p>
             <a:pPr lvl="0"/>
             <a:r>
-              <a:rPr lang="en-US" smtClean="0"/>
+              <a:rPr lang="en-US"/>
               <a:t>Click to edit Master text styles</a:t>
             </a:r>
           </a:p>
@@ -2860,7 +2940,7 @@
           <a:p>
             <a:fld id="{78C97017-6FC3-485B-9764-EAC9E56C1D49}" type="datetimeFigureOut">
               <a:rPr lang="en-US" smtClean="0"/>
-              <a:t>10/16/2016</a:t>
+              <a:t>10/24/2018</a:t>
             </a:fld>
             <a:endParaRPr lang="en-US"/>
           </a:p>
@@ -2969,10 +3049,9 @@
           <a:lstStyle/>
           <a:p>
             <a:r>
-              <a:rPr lang="en-US" smtClean="0"/>
+              <a:rPr lang="en-US"/>
               <a:t>Click to edit Master title style</a:t>
             </a:r>
-            <a:endParaRPr lang="en-US"/>
           </a:p>
         </p:txBody>
       </p:sp>
@@ -3003,38 +3082,37 @@
           <a:p>
             <a:pPr lvl="0"/>
             <a:r>
-              <a:rPr lang="en-US" smtClean="0"/>
+              <a:rPr lang="en-US"/>
               <a:t>Click to edit Master text styles</a:t>
             </a:r>
           </a:p>
           <a:p>
             <a:pPr lvl="1"/>
             <a:r>
-              <a:rPr lang="en-US" smtClean="0"/>
+              <a:rPr lang="en-US"/>
               <a:t>Second level</a:t>
             </a:r>
           </a:p>
           <a:p>
             <a:pPr lvl="2"/>
             <a:r>
-              <a:rPr lang="en-US" smtClean="0"/>
+              <a:rPr lang="en-US"/>
               <a:t>Third level</a:t>
             </a:r>
           </a:p>
           <a:p>
             <a:pPr lvl="3"/>
             <a:r>
-              <a:rPr lang="en-US" smtClean="0"/>
+              <a:rPr lang="en-US"/>
               <a:t>Fourth level</a:t>
             </a:r>
           </a:p>
           <a:p>
             <a:pPr lvl="4"/>
             <a:r>
-              <a:rPr lang="en-US" smtClean="0"/>
+              <a:rPr lang="en-US"/>
               <a:t>Fifth level</a:t>
             </a:r>
-            <a:endParaRPr lang="en-US"/>
           </a:p>
         </p:txBody>
       </p:sp>
@@ -3073,7 +3151,7 @@
           <a:p>
             <a:fld id="{78C97017-6FC3-485B-9764-EAC9E56C1D49}" type="datetimeFigureOut">
               <a:rPr lang="en-US" smtClean="0"/>
-              <a:t>10/16/2016</a:t>
+              <a:t>10/24/2018</a:t>
             </a:fld>
             <a:endParaRPr lang="en-US"/>
           </a:p>
@@ -3492,7 +3570,7 @@
           <a:p>
             <a:pPr algn="ctr"/>
             <a:r>
-              <a:rPr lang="en-US" sz="1600" dirty="0" smtClean="0">
+              <a:rPr lang="en-US" sz="1600" dirty="0">
                 <a:solidFill>
                   <a:schemeClr val="bg1"/>
                 </a:solidFill>
@@ -3595,223 +3673,6 @@
           </a:p>
         </p:txBody>
       </p:sp>
-      <p:grpSp>
-        <p:nvGrpSpPr>
-          <p:cNvPr id="7" name="Actor"/>
-          <p:cNvGrpSpPr/>
-          <p:nvPr/>
-        </p:nvGrpSpPr>
-        <p:grpSpPr>
-          <a:xfrm>
-            <a:off x="152400" y="533400"/>
-            <a:ext cx="324036" cy="573410"/>
-            <a:chOff x="3239901" y="4149080"/>
-            <a:chExt cx="648072" cy="1146820"/>
-          </a:xfrm>
-        </p:grpSpPr>
-        <p:sp>
-          <p:nvSpPr>
-            <p:cNvPr id="8" name="Flowchart: Connector 7"/>
-            <p:cNvSpPr/>
-            <p:nvPr/>
-          </p:nvSpPr>
-          <p:spPr>
-            <a:xfrm>
-              <a:off x="3419872" y="4149080"/>
-              <a:ext cx="288032" cy="288032"/>
-            </a:xfrm>
-            <a:prstGeom prst="flowChartConnector">
-              <a:avLst/>
-            </a:prstGeom>
-            <a:solidFill>
-              <a:schemeClr val="bg1">
-                <a:lumMod val="85000"/>
-              </a:schemeClr>
-            </a:solidFill>
-            <a:ln w="28575">
-              <a:solidFill>
-                <a:schemeClr val="tx1"/>
-              </a:solidFill>
-            </a:ln>
-            <a:effectLst/>
-          </p:spPr>
-          <p:style>
-            <a:lnRef idx="1">
-              <a:schemeClr val="accent4"/>
-            </a:lnRef>
-            <a:fillRef idx="2">
-              <a:schemeClr val="accent4"/>
-            </a:fillRef>
-            <a:effectRef idx="1">
-              <a:schemeClr val="accent4"/>
-            </a:effectRef>
-            <a:fontRef idx="minor">
-              <a:schemeClr val="dk1"/>
-            </a:fontRef>
-          </p:style>
-          <p:txBody>
-            <a:bodyPr rtlCol="0" anchor="ctr"/>
-            <a:lstStyle/>
-            <a:p>
-              <a:pPr algn="ctr"/>
-              <a:endParaRPr lang="en-SG"/>
-            </a:p>
-          </p:txBody>
-        </p:sp>
-        <p:cxnSp>
-          <p:nvCxnSpPr>
-            <p:cNvPr id="9" name="Straight Connector 8"/>
-            <p:cNvCxnSpPr>
-              <a:stCxn id="8" idx="4"/>
-            </p:cNvCxnSpPr>
-            <p:nvPr/>
-          </p:nvCxnSpPr>
-          <p:spPr>
-            <a:xfrm>
-              <a:off x="3563888" y="4437112"/>
-              <a:ext cx="0" cy="504056"/>
-            </a:xfrm>
-            <a:prstGeom prst="line">
-              <a:avLst/>
-            </a:prstGeom>
-            <a:ln w="28575">
-              <a:solidFill>
-                <a:schemeClr val="tx1"/>
-              </a:solidFill>
-            </a:ln>
-            <a:effectLst/>
-          </p:spPr>
-          <p:style>
-            <a:lnRef idx="1">
-              <a:schemeClr val="accent4"/>
-            </a:lnRef>
-            <a:fillRef idx="2">
-              <a:schemeClr val="accent4"/>
-            </a:fillRef>
-            <a:effectRef idx="1">
-              <a:schemeClr val="accent4"/>
-            </a:effectRef>
-            <a:fontRef idx="minor">
-              <a:schemeClr val="dk1"/>
-            </a:fontRef>
-          </p:style>
-        </p:cxnSp>
-        <p:sp>
-          <p:nvSpPr>
-            <p:cNvPr id="10" name="Freeform 9"/>
-            <p:cNvSpPr/>
-            <p:nvPr/>
-          </p:nvSpPr>
-          <p:spPr>
-            <a:xfrm>
-              <a:off x="3324225" y="4933950"/>
-              <a:ext cx="479425" cy="361950"/>
-            </a:xfrm>
-            <a:custGeom>
-              <a:avLst/>
-              <a:gdLst>
-                <a:gd name="connsiteX0" fmla="*/ 0 w 479425"/>
-                <a:gd name="connsiteY0" fmla="*/ 355600 h 361950"/>
-                <a:gd name="connsiteX1" fmla="*/ 241300 w 479425"/>
-                <a:gd name="connsiteY1" fmla="*/ 0 h 361950"/>
-                <a:gd name="connsiteX2" fmla="*/ 479425 w 479425"/>
-                <a:gd name="connsiteY2" fmla="*/ 361950 h 361950"/>
-              </a:gdLst>
-              <a:ahLst/>
-              <a:cxnLst>
-                <a:cxn ang="0">
-                  <a:pos x="connsiteX0" y="connsiteY0"/>
-                </a:cxn>
-                <a:cxn ang="0">
-                  <a:pos x="connsiteX1" y="connsiteY1"/>
-                </a:cxn>
-                <a:cxn ang="0">
-                  <a:pos x="connsiteX2" y="connsiteY2"/>
-                </a:cxn>
-              </a:cxnLst>
-              <a:rect l="l" t="t" r="r" b="b"/>
-              <a:pathLst>
-                <a:path w="479425" h="361950">
-                  <a:moveTo>
-                    <a:pt x="0" y="355600"/>
-                  </a:moveTo>
-                  <a:lnTo>
-                    <a:pt x="241300" y="0"/>
-                  </a:lnTo>
-                  <a:lnTo>
-                    <a:pt x="479425" y="361950"/>
-                  </a:lnTo>
-                </a:path>
-              </a:pathLst>
-            </a:custGeom>
-            <a:noFill/>
-            <a:ln w="28575">
-              <a:solidFill>
-                <a:schemeClr val="tx1"/>
-              </a:solidFill>
-            </a:ln>
-            <a:effectLst/>
-          </p:spPr>
-          <p:style>
-            <a:lnRef idx="1">
-              <a:schemeClr val="accent4"/>
-            </a:lnRef>
-            <a:fillRef idx="2">
-              <a:schemeClr val="accent4"/>
-            </a:fillRef>
-            <a:effectRef idx="1">
-              <a:schemeClr val="accent4"/>
-            </a:effectRef>
-            <a:fontRef idx="minor">
-              <a:schemeClr val="dk1"/>
-            </a:fontRef>
-          </p:style>
-          <p:txBody>
-            <a:bodyPr rtlCol="0" anchor="ctr"/>
-            <a:lstStyle/>
-            <a:p>
-              <a:pPr algn="ctr"/>
-              <a:endParaRPr lang="en-SG"/>
-            </a:p>
-          </p:txBody>
-        </p:sp>
-        <p:cxnSp>
-          <p:nvCxnSpPr>
-            <p:cNvPr id="11" name="Straight Connector 10"/>
-            <p:cNvCxnSpPr/>
-            <p:nvPr/>
-          </p:nvCxnSpPr>
-          <p:spPr>
-            <a:xfrm>
-              <a:off x="3239901" y="4509120"/>
-              <a:ext cx="648072" cy="0"/>
-            </a:xfrm>
-            <a:prstGeom prst="line">
-              <a:avLst/>
-            </a:prstGeom>
-            <a:ln w="28575">
-              <a:solidFill>
-                <a:schemeClr val="tx1"/>
-              </a:solidFill>
-            </a:ln>
-            <a:effectLst/>
-          </p:spPr>
-          <p:style>
-            <a:lnRef idx="1">
-              <a:schemeClr val="accent4"/>
-            </a:lnRef>
-            <a:fillRef idx="2">
-              <a:schemeClr val="accent4"/>
-            </a:fillRef>
-            <a:effectRef idx="1">
-              <a:schemeClr val="accent4"/>
-            </a:effectRef>
-            <a:fontRef idx="minor">
-              <a:schemeClr val="dk1"/>
-            </a:fontRef>
-          </p:style>
-        </p:cxnSp>
-      </p:grpSp>
       <p:sp>
         <p:nvSpPr>
           <p:cNvPr id="16" name="Rectangle 62"/>
@@ -3856,7 +3717,7 @@
           <a:p>
             <a:pPr algn="ctr"/>
             <a:r>
-              <a:rPr lang="en-US" sz="1600" dirty="0" smtClean="0">
+              <a:rPr lang="en-US" sz="1600" dirty="0">
                 <a:solidFill>
                   <a:schemeClr val="bg1"/>
                 </a:solidFill>
@@ -4003,7 +3864,7 @@
           <a:p>
             <a:pPr algn="ctr"/>
             <a:r>
-              <a:rPr lang="en-US" sz="1600" dirty="0" smtClean="0">
+              <a:rPr lang="en-US" sz="1600" dirty="0">
                 <a:solidFill>
                   <a:schemeClr val="bg1"/>
                 </a:solidFill>
@@ -4165,10 +4026,9 @@
           <a:lstStyle/>
           <a:p>
             <a:r>
-              <a:rPr lang="en-US" sz="1400" dirty="0" smtClean="0"/>
+              <a:rPr lang="en-US" sz="1400" dirty="0"/>
               <a:t>delete 1</a:t>
             </a:r>
-            <a:endParaRPr lang="en-US" sz="1400" dirty="0"/>
           </a:p>
         </p:txBody>
       </p:sp>
@@ -4231,18 +4091,13 @@
           <a:lstStyle/>
           <a:p>
             <a:r>
-              <a:rPr lang="en-US" sz="1400" dirty="0" smtClean="0">
+              <a:rPr lang="en-US" sz="1400" dirty="0">
                 <a:solidFill>
                   <a:srgbClr val="0070C0"/>
                 </a:solidFill>
               </a:rPr>
               <a:t>execute(“delete 1”)</a:t>
             </a:r>
-            <a:endParaRPr lang="en-US" sz="1400" dirty="0">
-              <a:solidFill>
-                <a:srgbClr val="0070C0"/>
-              </a:solidFill>
-            </a:endParaRPr>
           </a:p>
         </p:txBody>
       </p:sp>
@@ -4305,26 +4160,21 @@
           <a:lstStyle/>
           <a:p>
             <a:r>
-              <a:rPr lang="en-US" sz="1400" dirty="0" err="1" smtClean="0">
+              <a:rPr lang="en-US" sz="1400" dirty="0" err="1">
                 <a:solidFill>
                   <a:srgbClr val="7030A0"/>
                 </a:solidFill>
               </a:rPr>
-              <a:t>deletePerson</a:t>
-            </a:r>
-            <a:r>
-              <a:rPr lang="en-US" sz="1400" dirty="0" smtClean="0">
+              <a:t>deleteEvent</a:t>
+            </a:r>
+            <a:r>
+              <a:rPr lang="en-US" sz="1400" dirty="0">
                 <a:solidFill>
                   <a:srgbClr val="7030A0"/>
                 </a:solidFill>
               </a:rPr>
-              <a:t>(p)</a:t>
-            </a:r>
-            <a:endParaRPr lang="en-US" sz="1400" dirty="0">
-              <a:solidFill>
-                <a:srgbClr val="7030A0"/>
-              </a:solidFill>
-            </a:endParaRPr>
+              <a:t>(e)</a:t>
+            </a:r>
           </a:p>
         </p:txBody>
       </p:sp>
@@ -4351,7 +4201,7 @@
           <a:lstStyle/>
           <a:p>
             <a:r>
-              <a:rPr lang="en-US" sz="1400" dirty="0" smtClean="0">
+              <a:rPr lang="en-US" sz="1400" dirty="0">
                 <a:solidFill>
                   <a:schemeClr val="accent5">
                     <a:lumMod val="75000"/>
@@ -4361,17 +4211,17 @@
               <a:t>post(</a:t>
             </a:r>
             <a:r>
-              <a:rPr lang="en-US" sz="1400" dirty="0" err="1" smtClean="0">
+              <a:rPr lang="en-US" sz="1400" dirty="0" err="1">
                 <a:solidFill>
                   <a:schemeClr val="accent5">
                     <a:lumMod val="75000"/>
                   </a:schemeClr>
                 </a:solidFill>
               </a:rPr>
-              <a:t>AddressBookChangedEvent</a:t>
-            </a:r>
-            <a:r>
-              <a:rPr lang="en-US" sz="1400" dirty="0" smtClean="0">
+              <a:t>SchedulerChangedEvent</a:t>
+            </a:r>
+            <a:r>
+              <a:rPr lang="en-US" sz="1400" dirty="0">
                 <a:solidFill>
                   <a:schemeClr val="accent5">
                     <a:lumMod val="75000"/>
@@ -4380,13 +4230,6 @@
               </a:rPr>
               <a:t>)</a:t>
             </a:r>
-            <a:endParaRPr lang="en-US" sz="1400" dirty="0">
-              <a:solidFill>
-                <a:schemeClr val="accent5">
-                  <a:lumMod val="75000"/>
-                </a:schemeClr>
-              </a:solidFill>
-            </a:endParaRPr>
           </a:p>
         </p:txBody>
       </p:sp>
@@ -4552,7 +4395,7 @@
           <a:p>
             <a:pPr algn="ctr"/>
             <a:r>
-              <a:rPr lang="en-US" sz="1600" dirty="0" smtClean="0">
+              <a:rPr lang="en-US" sz="1600" dirty="0">
                 <a:solidFill>
                   <a:schemeClr val="bg1"/>
                 </a:solidFill>
@@ -4560,7 +4403,7 @@
               <a:t>:</a:t>
             </a:r>
             <a:r>
-              <a:rPr lang="en-US" sz="1600" dirty="0" err="1" smtClean="0">
+              <a:rPr lang="en-US" sz="1600" dirty="0" err="1">
                 <a:solidFill>
                   <a:schemeClr val="bg1"/>
                 </a:solidFill>
@@ -4793,7 +4636,7 @@
           <a:p>
             <a:pPr algn="ctr"/>
             <a:r>
-              <a:rPr lang="en-US" sz="1600" dirty="0" smtClean="0">
+              <a:rPr lang="en-US" sz="1600" dirty="0">
                 <a:solidFill>
                   <a:schemeClr val="bg1"/>
                 </a:solidFill>
@@ -4925,7 +4768,7 @@
           <a:lstStyle/>
           <a:p>
             <a:r>
-              <a:rPr lang="en-US" sz="1400" dirty="0" smtClean="0">
+              <a:rPr lang="en-US" sz="1400" dirty="0">
                 <a:solidFill>
                   <a:schemeClr val="accent5">
                     <a:lumMod val="75000"/>
@@ -4935,17 +4778,17 @@
               <a:t>post(</a:t>
             </a:r>
             <a:r>
-              <a:rPr lang="en-US" sz="1400" dirty="0" err="1" smtClean="0">
+              <a:rPr lang="en-US" sz="1400" dirty="0" err="1">
                 <a:solidFill>
                   <a:schemeClr val="accent5">
                     <a:lumMod val="75000"/>
                   </a:schemeClr>
                 </a:solidFill>
               </a:rPr>
-              <a:t>AddressBookChangedEvent</a:t>
-            </a:r>
-            <a:r>
-              <a:rPr lang="en-US" sz="1400" dirty="0" smtClean="0">
+              <a:t>SchedulerChangedEvent</a:t>
+            </a:r>
+            <a:r>
+              <a:rPr lang="en-US" sz="1400" dirty="0">
                 <a:solidFill>
                   <a:schemeClr val="accent5">
                     <a:lumMod val="75000"/>
@@ -4954,13 +4797,6 @@
               </a:rPr>
               <a:t>)</a:t>
             </a:r>
-            <a:endParaRPr lang="en-US" sz="1400" dirty="0">
-              <a:solidFill>
-                <a:schemeClr val="accent5">
-                  <a:lumMod val="75000"/>
-                </a:schemeClr>
-              </a:solidFill>
-            </a:endParaRPr>
           </a:p>
         </p:txBody>
       </p:sp>
@@ -5052,7 +4888,7 @@
           <a:p>
             <a:pPr algn="ctr"/>
             <a:r>
-              <a:rPr lang="en-US" sz="1600" dirty="0" smtClean="0">
+              <a:rPr lang="en-US" sz="1600" dirty="0">
                 <a:solidFill>
                   <a:schemeClr val="bg1"/>
                 </a:solidFill>
@@ -5060,7 +4896,7 @@
               <a:t>:</a:t>
             </a:r>
             <a:r>
-              <a:rPr lang="en-US" sz="1600" dirty="0" err="1" smtClean="0">
+              <a:rPr lang="en-US" sz="1600" dirty="0" err="1">
                 <a:solidFill>
                   <a:schemeClr val="bg1"/>
                 </a:solidFill>
@@ -5307,17 +5143,17 @@
           <a:lstStyle/>
           <a:p>
             <a:r>
-              <a:rPr lang="en-US" sz="1400" dirty="0" err="1" smtClean="0">
+              <a:rPr lang="en-US" sz="1400" dirty="0" err="1">
                 <a:solidFill>
                   <a:schemeClr val="accent6">
                     <a:lumMod val="75000"/>
                   </a:schemeClr>
                 </a:solidFill>
               </a:rPr>
-              <a:t>handleAddresssBookChangedEvent</a:t>
-            </a:r>
-            <a:r>
-              <a:rPr lang="en-US" sz="1400" dirty="0" smtClean="0">
+              <a:t>handleSchedulerChangedEvent</a:t>
+            </a:r>
+            <a:r>
+              <a:rPr lang="en-US" sz="1400" dirty="0">
                 <a:solidFill>
                   <a:schemeClr val="accent6">
                     <a:lumMod val="75000"/>
@@ -5326,13 +5162,6 @@
               </a:rPr>
               <a:t>()</a:t>
             </a:r>
-            <a:endParaRPr lang="en-US" sz="1400" dirty="0">
-              <a:solidFill>
-                <a:schemeClr val="accent6">
-                  <a:lumMod val="75000"/>
-                </a:schemeClr>
-              </a:solidFill>
-            </a:endParaRPr>
           </a:p>
         </p:txBody>
       </p:sp>
@@ -5417,7 +5246,7 @@
           <a:p>
             <a:pPr algn="ctr"/>
             <a:r>
-              <a:rPr lang="en-US" sz="1600" dirty="0" smtClean="0">
+              <a:rPr lang="en-US" sz="1600" dirty="0">
                 <a:solidFill>
                   <a:schemeClr val="bg1"/>
                 </a:solidFill>
@@ -5620,26 +5449,21 @@
           <a:lstStyle/>
           <a:p>
             <a:r>
-              <a:rPr lang="en-US" sz="1400" dirty="0" err="1" smtClean="0">
+              <a:rPr lang="en-US" sz="1400" dirty="0" err="1">
                 <a:solidFill>
                   <a:srgbClr val="00B050"/>
                 </a:solidFill>
               </a:rPr>
-              <a:t>handleAddresssBookChangedEvent</a:t>
-            </a:r>
-            <a:r>
-              <a:rPr lang="en-US" sz="1400" dirty="0" smtClean="0">
+              <a:t>handleSchedulerChangedEvent</a:t>
+            </a:r>
+            <a:r>
+              <a:rPr lang="en-US" sz="1400" dirty="0">
                 <a:solidFill>
                   <a:srgbClr val="00B050"/>
                 </a:solidFill>
               </a:rPr>
               <a:t>()</a:t>
             </a:r>
-            <a:endParaRPr lang="en-US" sz="1400" dirty="0">
-              <a:solidFill>
-                <a:srgbClr val="00B050"/>
-              </a:solidFill>
-            </a:endParaRPr>
           </a:p>
         </p:txBody>
       </p:sp>
@@ -5826,18 +5650,13 @@
           <a:p>
             <a:pPr algn="r"/>
             <a:r>
-              <a:rPr lang="en-US" sz="1400" dirty="0" smtClean="0">
+              <a:rPr lang="en-US" sz="1400" dirty="0">
                 <a:solidFill>
                   <a:srgbClr val="00B050"/>
                 </a:solidFill>
               </a:rPr>
               <a:t>Update status bar</a:t>
             </a:r>
-            <a:endParaRPr lang="en-US" sz="1400" dirty="0">
-              <a:solidFill>
-                <a:srgbClr val="00B050"/>
-              </a:solidFill>
-            </a:endParaRPr>
           </a:p>
         </p:txBody>
       </p:sp>
@@ -6027,7 +5846,7 @@
           <a:lstStyle/>
           <a:p>
             <a:r>
-              <a:rPr lang="en-US" sz="1400" dirty="0" smtClean="0">
+              <a:rPr lang="en-US" sz="1400" dirty="0">
                 <a:solidFill>
                   <a:schemeClr val="accent6">
                     <a:lumMod val="75000"/>
@@ -6037,7 +5856,7 @@
               <a:t>Save </a:t>
             </a:r>
             <a:br>
-              <a:rPr lang="en-US" sz="1400" dirty="0" smtClean="0">
+              <a:rPr lang="en-US" sz="1400" dirty="0">
                 <a:solidFill>
                   <a:schemeClr val="accent6">
                     <a:lumMod val="75000"/>
@@ -6046,7 +5865,7 @@
               </a:rPr>
             </a:br>
             <a:r>
-              <a:rPr lang="en-US" sz="1400" dirty="0" smtClean="0">
+              <a:rPr lang="en-US" sz="1400" dirty="0">
                 <a:solidFill>
                   <a:schemeClr val="accent6">
                     <a:lumMod val="75000"/>
@@ -6055,13 +5874,79 @@
               </a:rPr>
               <a:t>to file</a:t>
             </a:r>
-            <a:endParaRPr lang="en-US" sz="1400" dirty="0">
-              <a:solidFill>
-                <a:schemeClr val="accent6">
-                  <a:lumMod val="75000"/>
-                </a:schemeClr>
-              </a:solidFill>
-            </a:endParaRPr>
+          </a:p>
+        </p:txBody>
+      </p:sp>
+      <p:sp>
+        <p:nvSpPr>
+          <p:cNvPr id="4" name="Rectangle 3">
+            <a:extLst>
+              <a:ext uri="{FF2B5EF4-FFF2-40B4-BE49-F238E27FC236}">
+                <a16:creationId xmlns:a16="http://schemas.microsoft.com/office/drawing/2014/main" id="{D3AFC9AC-C4F5-45A2-A77F-70567CB4B408}"/>
+              </a:ext>
+            </a:extLst>
+          </p:cNvPr>
+          <p:cNvSpPr/>
+          <p:nvPr/>
+        </p:nvSpPr>
+        <p:spPr>
+          <a:xfrm>
+            <a:off x="3549092" y="3244334"/>
+            <a:ext cx="2045816" cy="369332"/>
+          </a:xfrm>
+          <a:prstGeom prst="rect">
+            <a:avLst/>
+          </a:prstGeom>
+        </p:spPr>
+        <p:txBody>
+          <a:bodyPr wrap="none">
+            <a:spAutoFit/>
+          </a:bodyPr>
+          <a:lstStyle/>
+          <a:p>
+            <a:r>
+              <a:rPr lang="en-SG" dirty="0" err="1"/>
+              <a:t>ModelClassDiagram</a:t>
+            </a:r>
+            <a:endParaRPr lang="en-SG" dirty="0"/>
+          </a:p>
+        </p:txBody>
+      </p:sp>
+      <p:sp>
+        <p:nvSpPr>
+          <p:cNvPr id="14" name="TextBox 13">
+            <a:extLst>
+              <a:ext uri="{FF2B5EF4-FFF2-40B4-BE49-F238E27FC236}">
+                <a16:creationId xmlns:a16="http://schemas.microsoft.com/office/drawing/2014/main" id="{EDE47874-F48C-4174-BEB3-BEE3C2DCCC28}"/>
+              </a:ext>
+            </a:extLst>
+          </p:cNvPr>
+          <p:cNvSpPr txBox="1"/>
+          <p:nvPr/>
+        </p:nvSpPr>
+        <p:spPr>
+          <a:xfrm>
+            <a:off x="-38904" y="731569"/>
+            <a:ext cx="699767" cy="369332"/>
+          </a:xfrm>
+          <a:prstGeom prst="rect">
+            <a:avLst/>
+          </a:prstGeom>
+          <a:noFill/>
+          <a:ln>
+            <a:noFill/>
+          </a:ln>
+        </p:spPr>
+        <p:txBody>
+          <a:bodyPr wrap="square" rtlCol="0">
+            <a:spAutoFit/>
+          </a:bodyPr>
+          <a:lstStyle/>
+          <a:p>
+            <a:r>
+              <a:rPr lang="en-SG" dirty="0"/>
+              <a:t>Event</a:t>
+            </a:r>
           </a:p>
         </p:txBody>
       </p:sp>

</xml_diff>

<commit_message>
update sequential diagram of "event-driven nature of design" part in DeveloperGuide.adoc
</commit_message>
<xml_diff>
--- a/docs/diagrams/HighLevelSequenceDiagrams.pptx
+++ b/docs/diagrams/HighLevelSequenceDiagrams.pptx
@@ -107,6 +107,22 @@
       </a:defRPr>
     </a:lvl9pPr>
   </p:defaultTextStyle>
+  <p:extLst>
+    <p:ext uri="{EFAFB233-063F-42B5-8137-9DF3F51BA10A}">
+      <p15:sldGuideLst xmlns:p15="http://schemas.microsoft.com/office/powerpoint/2012/main">
+        <p15:guide id="1" orient="horz" pos="1488">
+          <p15:clr>
+            <a:srgbClr val="A4A3A4"/>
+          </p15:clr>
+        </p15:guide>
+        <p15:guide id="2" pos="2880">
+          <p15:clr>
+            <a:srgbClr val="A4A3A4"/>
+          </p15:clr>
+        </p15:guide>
+      </p15:sldGuideLst>
+    </p:ext>
+  </p:extLst>
 </p:presentation>
 </file>
 
@@ -192,7 +208,7 @@
           <a:p>
             <a:fld id="{F5CC4B3F-88C1-4FFA-B1B6-F41C21DC6924}" type="datetimeFigureOut">
               <a:rPr lang="en-US" smtClean="0"/>
-              <a:t>10/16/2016</a:t>
+              <a:t>10/31/18</a:t>
             </a:fld>
             <a:endParaRPr lang="en-US"/>
           </a:p>
@@ -256,38 +272,37 @@
           <a:p>
             <a:pPr lvl="0"/>
             <a:r>
-              <a:rPr lang="en-US" smtClean="0"/>
+              <a:rPr lang="en-US"/>
               <a:t>Click to edit Master text styles</a:t>
             </a:r>
           </a:p>
           <a:p>
             <a:pPr lvl="1"/>
             <a:r>
-              <a:rPr lang="en-US" smtClean="0"/>
+              <a:rPr lang="en-US"/>
               <a:t>Second level</a:t>
             </a:r>
           </a:p>
           <a:p>
             <a:pPr lvl="2"/>
             <a:r>
-              <a:rPr lang="en-US" smtClean="0"/>
+              <a:rPr lang="en-US"/>
               <a:t>Third level</a:t>
             </a:r>
           </a:p>
           <a:p>
             <a:pPr lvl="3"/>
             <a:r>
-              <a:rPr lang="en-US" smtClean="0"/>
+              <a:rPr lang="en-US"/>
               <a:t>Fourth level</a:t>
             </a:r>
           </a:p>
           <a:p>
             <a:pPr lvl="4"/>
             <a:r>
-              <a:rPr lang="en-US" smtClean="0"/>
+              <a:rPr lang="en-US"/>
               <a:t>Fifth level</a:t>
             </a:r>
-            <a:endParaRPr lang="en-US"/>
           </a:p>
         </p:txBody>
       </p:sp>
@@ -498,10 +513,9 @@
           <a:lstStyle/>
           <a:p>
             <a:r>
-              <a:rPr lang="en-US" smtClean="0"/>
+              <a:rPr lang="en-US"/>
               <a:t>Click to edit Master title style</a:t>
             </a:r>
-            <a:endParaRPr lang="en-US"/>
           </a:p>
         </p:txBody>
       </p:sp>
@@ -617,10 +631,9 @@
           </a:lstStyle>
           <a:p>
             <a:r>
-              <a:rPr lang="en-US" smtClean="0"/>
+              <a:rPr lang="en-US"/>
               <a:t>Click to edit Master subtitle style</a:t>
             </a:r>
-            <a:endParaRPr lang="en-US"/>
           </a:p>
         </p:txBody>
       </p:sp>
@@ -641,7 +654,7 @@
           <a:p>
             <a:fld id="{78C97017-6FC3-485B-9764-EAC9E56C1D49}" type="datetimeFigureOut">
               <a:rPr lang="en-US" smtClean="0"/>
-              <a:t>10/16/2016</a:t>
+              <a:t>10/31/18</a:t>
             </a:fld>
             <a:endParaRPr lang="en-US"/>
           </a:p>
@@ -735,10 +748,9 @@
           <a:lstStyle/>
           <a:p>
             <a:r>
-              <a:rPr lang="en-US" smtClean="0"/>
+              <a:rPr lang="en-US"/>
               <a:t>Click to edit Master title style</a:t>
             </a:r>
-            <a:endParaRPr lang="en-US"/>
           </a:p>
         </p:txBody>
       </p:sp>
@@ -759,38 +771,37 @@
           <a:p>
             <a:pPr lvl="0"/>
             <a:r>
-              <a:rPr lang="en-US" smtClean="0"/>
+              <a:rPr lang="en-US"/>
               <a:t>Click to edit Master text styles</a:t>
             </a:r>
           </a:p>
           <a:p>
             <a:pPr lvl="1"/>
             <a:r>
-              <a:rPr lang="en-US" smtClean="0"/>
+              <a:rPr lang="en-US"/>
               <a:t>Second level</a:t>
             </a:r>
           </a:p>
           <a:p>
             <a:pPr lvl="2"/>
             <a:r>
-              <a:rPr lang="en-US" smtClean="0"/>
+              <a:rPr lang="en-US"/>
               <a:t>Third level</a:t>
             </a:r>
           </a:p>
           <a:p>
             <a:pPr lvl="3"/>
             <a:r>
-              <a:rPr lang="en-US" smtClean="0"/>
+              <a:rPr lang="en-US"/>
               <a:t>Fourth level</a:t>
             </a:r>
           </a:p>
           <a:p>
             <a:pPr lvl="4"/>
             <a:r>
-              <a:rPr lang="en-US" smtClean="0"/>
+              <a:rPr lang="en-US"/>
               <a:t>Fifth level</a:t>
             </a:r>
-            <a:endParaRPr lang="en-US"/>
           </a:p>
         </p:txBody>
       </p:sp>
@@ -811,7 +822,7 @@
           <a:p>
             <a:fld id="{78C97017-6FC3-485B-9764-EAC9E56C1D49}" type="datetimeFigureOut">
               <a:rPr lang="en-US" smtClean="0"/>
-              <a:t>10/16/2016</a:t>
+              <a:t>10/31/18</a:t>
             </a:fld>
             <a:endParaRPr lang="en-US"/>
           </a:p>
@@ -910,10 +921,9 @@
           <a:lstStyle/>
           <a:p>
             <a:r>
-              <a:rPr lang="en-US" smtClean="0"/>
+              <a:rPr lang="en-US"/>
               <a:t>Click to edit Master title style</a:t>
             </a:r>
-            <a:endParaRPr lang="en-US"/>
           </a:p>
         </p:txBody>
       </p:sp>
@@ -939,38 +949,37 @@
           <a:p>
             <a:pPr lvl="0"/>
             <a:r>
-              <a:rPr lang="en-US" smtClean="0"/>
+              <a:rPr lang="en-US"/>
               <a:t>Click to edit Master text styles</a:t>
             </a:r>
           </a:p>
           <a:p>
             <a:pPr lvl="1"/>
             <a:r>
-              <a:rPr lang="en-US" smtClean="0"/>
+              <a:rPr lang="en-US"/>
               <a:t>Second level</a:t>
             </a:r>
           </a:p>
           <a:p>
             <a:pPr lvl="2"/>
             <a:r>
-              <a:rPr lang="en-US" smtClean="0"/>
+              <a:rPr lang="en-US"/>
               <a:t>Third level</a:t>
             </a:r>
           </a:p>
           <a:p>
             <a:pPr lvl="3"/>
             <a:r>
-              <a:rPr lang="en-US" smtClean="0"/>
+              <a:rPr lang="en-US"/>
               <a:t>Fourth level</a:t>
             </a:r>
           </a:p>
           <a:p>
             <a:pPr lvl="4"/>
             <a:r>
-              <a:rPr lang="en-US" smtClean="0"/>
+              <a:rPr lang="en-US"/>
               <a:t>Fifth level</a:t>
             </a:r>
-            <a:endParaRPr lang="en-US"/>
           </a:p>
         </p:txBody>
       </p:sp>
@@ -991,7 +1000,7 @@
           <a:p>
             <a:fld id="{78C97017-6FC3-485B-9764-EAC9E56C1D49}" type="datetimeFigureOut">
               <a:rPr lang="en-US" smtClean="0"/>
-              <a:t>10/16/2016</a:t>
+              <a:t>10/31/18</a:t>
             </a:fld>
             <a:endParaRPr lang="en-US"/>
           </a:p>
@@ -1085,10 +1094,9 @@
           <a:lstStyle/>
           <a:p>
             <a:r>
-              <a:rPr lang="en-US" smtClean="0"/>
+              <a:rPr lang="en-US"/>
               <a:t>Click to edit Master title style</a:t>
             </a:r>
-            <a:endParaRPr lang="en-US"/>
           </a:p>
         </p:txBody>
       </p:sp>
@@ -1109,38 +1117,37 @@
           <a:p>
             <a:pPr lvl="0"/>
             <a:r>
-              <a:rPr lang="en-US" smtClean="0"/>
+              <a:rPr lang="en-US"/>
               <a:t>Click to edit Master text styles</a:t>
             </a:r>
           </a:p>
           <a:p>
             <a:pPr lvl="1"/>
             <a:r>
-              <a:rPr lang="en-US" smtClean="0"/>
+              <a:rPr lang="en-US"/>
               <a:t>Second level</a:t>
             </a:r>
           </a:p>
           <a:p>
             <a:pPr lvl="2"/>
             <a:r>
-              <a:rPr lang="en-US" smtClean="0"/>
+              <a:rPr lang="en-US"/>
               <a:t>Third level</a:t>
             </a:r>
           </a:p>
           <a:p>
             <a:pPr lvl="3"/>
             <a:r>
-              <a:rPr lang="en-US" smtClean="0"/>
+              <a:rPr lang="en-US"/>
               <a:t>Fourth level</a:t>
             </a:r>
           </a:p>
           <a:p>
             <a:pPr lvl="4"/>
             <a:r>
-              <a:rPr lang="en-US" smtClean="0"/>
+              <a:rPr lang="en-US"/>
               <a:t>Fifth level</a:t>
             </a:r>
-            <a:endParaRPr lang="en-US"/>
           </a:p>
         </p:txBody>
       </p:sp>
@@ -1161,7 +1168,7 @@
           <a:p>
             <a:fld id="{78C97017-6FC3-485B-9764-EAC9E56C1D49}" type="datetimeFigureOut">
               <a:rPr lang="en-US" smtClean="0"/>
-              <a:t>10/16/2016</a:t>
+              <a:t>10/31/18</a:t>
             </a:fld>
             <a:endParaRPr lang="en-US"/>
           </a:p>
@@ -1264,10 +1271,9 @@
           </a:lstStyle>
           <a:p>
             <a:r>
-              <a:rPr lang="en-US" smtClean="0"/>
+              <a:rPr lang="en-US"/>
               <a:t>Click to edit Master title style</a:t>
             </a:r>
-            <a:endParaRPr lang="en-US"/>
           </a:p>
         </p:txBody>
       </p:sp>
@@ -1384,7 +1390,7 @@
           <a:p>
             <a:pPr lvl="0"/>
             <a:r>
-              <a:rPr lang="en-US" smtClean="0"/>
+              <a:rPr lang="en-US"/>
               <a:t>Click to edit Master text styles</a:t>
             </a:r>
           </a:p>
@@ -1407,7 +1413,7 @@
           <a:p>
             <a:fld id="{78C97017-6FC3-485B-9764-EAC9E56C1D49}" type="datetimeFigureOut">
               <a:rPr lang="en-US" smtClean="0"/>
-              <a:t>10/16/2016</a:t>
+              <a:t>10/31/18</a:t>
             </a:fld>
             <a:endParaRPr lang="en-US"/>
           </a:p>
@@ -1501,10 +1507,9 @@
           <a:lstStyle/>
           <a:p>
             <a:r>
-              <a:rPr lang="en-US" smtClean="0"/>
+              <a:rPr lang="en-US"/>
               <a:t>Click to edit Master title style</a:t>
             </a:r>
-            <a:endParaRPr lang="en-US"/>
           </a:p>
         </p:txBody>
       </p:sp>
@@ -1558,38 +1563,37 @@
           <a:p>
             <a:pPr lvl="0"/>
             <a:r>
-              <a:rPr lang="en-US" smtClean="0"/>
+              <a:rPr lang="en-US"/>
               <a:t>Click to edit Master text styles</a:t>
             </a:r>
           </a:p>
           <a:p>
             <a:pPr lvl="1"/>
             <a:r>
-              <a:rPr lang="en-US" smtClean="0"/>
+              <a:rPr lang="en-US"/>
               <a:t>Second level</a:t>
             </a:r>
           </a:p>
           <a:p>
             <a:pPr lvl="2"/>
             <a:r>
-              <a:rPr lang="en-US" smtClean="0"/>
+              <a:rPr lang="en-US"/>
               <a:t>Third level</a:t>
             </a:r>
           </a:p>
           <a:p>
             <a:pPr lvl="3"/>
             <a:r>
-              <a:rPr lang="en-US" smtClean="0"/>
+              <a:rPr lang="en-US"/>
               <a:t>Fourth level</a:t>
             </a:r>
           </a:p>
           <a:p>
             <a:pPr lvl="4"/>
             <a:r>
-              <a:rPr lang="en-US" smtClean="0"/>
+              <a:rPr lang="en-US"/>
               <a:t>Fifth level</a:t>
             </a:r>
-            <a:endParaRPr lang="en-US"/>
           </a:p>
         </p:txBody>
       </p:sp>
@@ -1643,38 +1647,37 @@
           <a:p>
             <a:pPr lvl="0"/>
             <a:r>
-              <a:rPr lang="en-US" smtClean="0"/>
+              <a:rPr lang="en-US"/>
               <a:t>Click to edit Master text styles</a:t>
             </a:r>
           </a:p>
           <a:p>
             <a:pPr lvl="1"/>
             <a:r>
-              <a:rPr lang="en-US" smtClean="0"/>
+              <a:rPr lang="en-US"/>
               <a:t>Second level</a:t>
             </a:r>
           </a:p>
           <a:p>
             <a:pPr lvl="2"/>
             <a:r>
-              <a:rPr lang="en-US" smtClean="0"/>
+              <a:rPr lang="en-US"/>
               <a:t>Third level</a:t>
             </a:r>
           </a:p>
           <a:p>
             <a:pPr lvl="3"/>
             <a:r>
-              <a:rPr lang="en-US" smtClean="0"/>
+              <a:rPr lang="en-US"/>
               <a:t>Fourth level</a:t>
             </a:r>
           </a:p>
           <a:p>
             <a:pPr lvl="4"/>
             <a:r>
-              <a:rPr lang="en-US" smtClean="0"/>
+              <a:rPr lang="en-US"/>
               <a:t>Fifth level</a:t>
             </a:r>
-            <a:endParaRPr lang="en-US"/>
           </a:p>
         </p:txBody>
       </p:sp>
@@ -1695,7 +1698,7 @@
           <a:p>
             <a:fld id="{78C97017-6FC3-485B-9764-EAC9E56C1D49}" type="datetimeFigureOut">
               <a:rPr lang="en-US" smtClean="0"/>
-              <a:t>10/16/2016</a:t>
+              <a:t>10/31/18</a:t>
             </a:fld>
             <a:endParaRPr lang="en-US"/>
           </a:p>
@@ -1793,10 +1796,9 @@
           </a:lstStyle>
           <a:p>
             <a:r>
-              <a:rPr lang="en-US" smtClean="0"/>
+              <a:rPr lang="en-US"/>
               <a:t>Click to edit Master title style</a:t>
             </a:r>
-            <a:endParaRPr lang="en-US"/>
           </a:p>
         </p:txBody>
       </p:sp>
@@ -1859,7 +1861,7 @@
           <a:p>
             <a:pPr lvl="0"/>
             <a:r>
-              <a:rPr lang="en-US" smtClean="0"/>
+              <a:rPr lang="en-US"/>
               <a:t>Click to edit Master text styles</a:t>
             </a:r>
           </a:p>
@@ -1915,38 +1917,37 @@
           <a:p>
             <a:pPr lvl="0"/>
             <a:r>
-              <a:rPr lang="en-US" smtClean="0"/>
+              <a:rPr lang="en-US"/>
               <a:t>Click to edit Master text styles</a:t>
             </a:r>
           </a:p>
           <a:p>
             <a:pPr lvl="1"/>
             <a:r>
-              <a:rPr lang="en-US" smtClean="0"/>
+              <a:rPr lang="en-US"/>
               <a:t>Second level</a:t>
             </a:r>
           </a:p>
           <a:p>
             <a:pPr lvl="2"/>
             <a:r>
-              <a:rPr lang="en-US" smtClean="0"/>
+              <a:rPr lang="en-US"/>
               <a:t>Third level</a:t>
             </a:r>
           </a:p>
           <a:p>
             <a:pPr lvl="3"/>
             <a:r>
-              <a:rPr lang="en-US" smtClean="0"/>
+              <a:rPr lang="en-US"/>
               <a:t>Fourth level</a:t>
             </a:r>
           </a:p>
           <a:p>
             <a:pPr lvl="4"/>
             <a:r>
-              <a:rPr lang="en-US" smtClean="0"/>
+              <a:rPr lang="en-US"/>
               <a:t>Fifth level</a:t>
             </a:r>
-            <a:endParaRPr lang="en-US"/>
           </a:p>
         </p:txBody>
       </p:sp>
@@ -2009,7 +2010,7 @@
           <a:p>
             <a:pPr lvl="0"/>
             <a:r>
-              <a:rPr lang="en-US" smtClean="0"/>
+              <a:rPr lang="en-US"/>
               <a:t>Click to edit Master text styles</a:t>
             </a:r>
           </a:p>
@@ -2065,38 +2066,37 @@
           <a:p>
             <a:pPr lvl="0"/>
             <a:r>
-              <a:rPr lang="en-US" smtClean="0"/>
+              <a:rPr lang="en-US"/>
               <a:t>Click to edit Master text styles</a:t>
             </a:r>
           </a:p>
           <a:p>
             <a:pPr lvl="1"/>
             <a:r>
-              <a:rPr lang="en-US" smtClean="0"/>
+              <a:rPr lang="en-US"/>
               <a:t>Second level</a:t>
             </a:r>
           </a:p>
           <a:p>
             <a:pPr lvl="2"/>
             <a:r>
-              <a:rPr lang="en-US" smtClean="0"/>
+              <a:rPr lang="en-US"/>
               <a:t>Third level</a:t>
             </a:r>
           </a:p>
           <a:p>
             <a:pPr lvl="3"/>
             <a:r>
-              <a:rPr lang="en-US" smtClean="0"/>
+              <a:rPr lang="en-US"/>
               <a:t>Fourth level</a:t>
             </a:r>
           </a:p>
           <a:p>
             <a:pPr lvl="4"/>
             <a:r>
-              <a:rPr lang="en-US" smtClean="0"/>
+              <a:rPr lang="en-US"/>
               <a:t>Fifth level</a:t>
             </a:r>
-            <a:endParaRPr lang="en-US"/>
           </a:p>
         </p:txBody>
       </p:sp>
@@ -2117,7 +2117,7 @@
           <a:p>
             <a:fld id="{78C97017-6FC3-485B-9764-EAC9E56C1D49}" type="datetimeFigureOut">
               <a:rPr lang="en-US" smtClean="0"/>
-              <a:t>10/16/2016</a:t>
+              <a:t>10/31/18</a:t>
             </a:fld>
             <a:endParaRPr lang="en-US"/>
           </a:p>
@@ -2211,10 +2211,9 @@
           <a:lstStyle/>
           <a:p>
             <a:r>
-              <a:rPr lang="en-US" smtClean="0"/>
+              <a:rPr lang="en-US"/>
               <a:t>Click to edit Master title style</a:t>
             </a:r>
-            <a:endParaRPr lang="en-US"/>
           </a:p>
         </p:txBody>
       </p:sp>
@@ -2235,7 +2234,7 @@
           <a:p>
             <a:fld id="{78C97017-6FC3-485B-9764-EAC9E56C1D49}" type="datetimeFigureOut">
               <a:rPr lang="en-US" smtClean="0"/>
-              <a:t>10/16/2016</a:t>
+              <a:t>10/31/18</a:t>
             </a:fld>
             <a:endParaRPr lang="en-US"/>
           </a:p>
@@ -2330,7 +2329,7 @@
           <a:p>
             <a:fld id="{78C97017-6FC3-485B-9764-EAC9E56C1D49}" type="datetimeFigureOut">
               <a:rPr lang="en-US" smtClean="0"/>
-              <a:t>10/16/2016</a:t>
+              <a:t>10/31/18</a:t>
             </a:fld>
             <a:endParaRPr lang="en-US"/>
           </a:p>
@@ -2433,10 +2432,9 @@
           </a:lstStyle>
           <a:p>
             <a:r>
-              <a:rPr lang="en-US" smtClean="0"/>
+              <a:rPr lang="en-US"/>
               <a:t>Click to edit Master title style</a:t>
             </a:r>
-            <a:endParaRPr lang="en-US"/>
           </a:p>
         </p:txBody>
       </p:sp>
@@ -2490,38 +2488,37 @@
           <a:p>
             <a:pPr lvl="0"/>
             <a:r>
-              <a:rPr lang="en-US" smtClean="0"/>
+              <a:rPr lang="en-US"/>
               <a:t>Click to edit Master text styles</a:t>
             </a:r>
           </a:p>
           <a:p>
             <a:pPr lvl="1"/>
             <a:r>
-              <a:rPr lang="en-US" smtClean="0"/>
+              <a:rPr lang="en-US"/>
               <a:t>Second level</a:t>
             </a:r>
           </a:p>
           <a:p>
             <a:pPr lvl="2"/>
             <a:r>
-              <a:rPr lang="en-US" smtClean="0"/>
+              <a:rPr lang="en-US"/>
               <a:t>Third level</a:t>
             </a:r>
           </a:p>
           <a:p>
             <a:pPr lvl="3"/>
             <a:r>
-              <a:rPr lang="en-US" smtClean="0"/>
+              <a:rPr lang="en-US"/>
               <a:t>Fourth level</a:t>
             </a:r>
           </a:p>
           <a:p>
             <a:pPr lvl="4"/>
             <a:r>
-              <a:rPr lang="en-US" smtClean="0"/>
+              <a:rPr lang="en-US"/>
               <a:t>Fifth level</a:t>
             </a:r>
-            <a:endParaRPr lang="en-US"/>
           </a:p>
         </p:txBody>
       </p:sp>
@@ -2584,7 +2581,7 @@
           <a:p>
             <a:pPr lvl="0"/>
             <a:r>
-              <a:rPr lang="en-US" smtClean="0"/>
+              <a:rPr lang="en-US"/>
               <a:t>Click to edit Master text styles</a:t>
             </a:r>
           </a:p>
@@ -2607,7 +2604,7 @@
           <a:p>
             <a:fld id="{78C97017-6FC3-485B-9764-EAC9E56C1D49}" type="datetimeFigureOut">
               <a:rPr lang="en-US" smtClean="0"/>
-              <a:t>10/16/2016</a:t>
+              <a:t>10/31/18</a:t>
             </a:fld>
             <a:endParaRPr lang="en-US"/>
           </a:p>
@@ -2710,10 +2707,9 @@
           </a:lstStyle>
           <a:p>
             <a:r>
-              <a:rPr lang="en-US" smtClean="0"/>
+              <a:rPr lang="en-US"/>
               <a:t>Click to edit Master title style</a:t>
             </a:r>
-            <a:endParaRPr lang="en-US"/>
           </a:p>
         </p:txBody>
       </p:sp>
@@ -2837,7 +2833,7 @@
           <a:p>
             <a:pPr lvl="0"/>
             <a:r>
-              <a:rPr lang="en-US" smtClean="0"/>
+              <a:rPr lang="en-US"/>
               <a:t>Click to edit Master text styles</a:t>
             </a:r>
           </a:p>
@@ -2860,7 +2856,7 @@
           <a:p>
             <a:fld id="{78C97017-6FC3-485B-9764-EAC9E56C1D49}" type="datetimeFigureOut">
               <a:rPr lang="en-US" smtClean="0"/>
-              <a:t>10/16/2016</a:t>
+              <a:t>10/31/18</a:t>
             </a:fld>
             <a:endParaRPr lang="en-US"/>
           </a:p>
@@ -2969,10 +2965,9 @@
           <a:lstStyle/>
           <a:p>
             <a:r>
-              <a:rPr lang="en-US" smtClean="0"/>
+              <a:rPr lang="en-US"/>
               <a:t>Click to edit Master title style</a:t>
             </a:r>
-            <a:endParaRPr lang="en-US"/>
           </a:p>
         </p:txBody>
       </p:sp>
@@ -3003,38 +2998,37 @@
           <a:p>
             <a:pPr lvl="0"/>
             <a:r>
-              <a:rPr lang="en-US" smtClean="0"/>
+              <a:rPr lang="en-US"/>
               <a:t>Click to edit Master text styles</a:t>
             </a:r>
           </a:p>
           <a:p>
             <a:pPr lvl="1"/>
             <a:r>
-              <a:rPr lang="en-US" smtClean="0"/>
+              <a:rPr lang="en-US"/>
               <a:t>Second level</a:t>
             </a:r>
           </a:p>
           <a:p>
             <a:pPr lvl="2"/>
             <a:r>
-              <a:rPr lang="en-US" smtClean="0"/>
+              <a:rPr lang="en-US"/>
               <a:t>Third level</a:t>
             </a:r>
           </a:p>
           <a:p>
             <a:pPr lvl="3"/>
             <a:r>
-              <a:rPr lang="en-US" smtClean="0"/>
+              <a:rPr lang="en-US"/>
               <a:t>Fourth level</a:t>
             </a:r>
           </a:p>
           <a:p>
             <a:pPr lvl="4"/>
             <a:r>
-              <a:rPr lang="en-US" smtClean="0"/>
+              <a:rPr lang="en-US"/>
               <a:t>Fifth level</a:t>
             </a:r>
-            <a:endParaRPr lang="en-US"/>
           </a:p>
         </p:txBody>
       </p:sp>
@@ -3073,7 +3067,7 @@
           <a:p>
             <a:fld id="{78C97017-6FC3-485B-9764-EAC9E56C1D49}" type="datetimeFigureOut">
               <a:rPr lang="en-US" smtClean="0"/>
-              <a:t>10/16/2016</a:t>
+              <a:t>10/31/18</a:t>
             </a:fld>
             <a:endParaRPr lang="en-US"/>
           </a:p>
@@ -3492,7 +3486,7 @@
           <a:p>
             <a:pPr algn="ctr"/>
             <a:r>
-              <a:rPr lang="en-US" sz="1600" dirty="0" smtClean="0">
+              <a:rPr lang="en-US" sz="1600" dirty="0">
                 <a:solidFill>
                   <a:schemeClr val="bg1"/>
                 </a:solidFill>
@@ -3856,7 +3850,7 @@
           <a:p>
             <a:pPr algn="ctr"/>
             <a:r>
-              <a:rPr lang="en-US" sz="1600" dirty="0" smtClean="0">
+              <a:rPr lang="en-US" sz="1600" dirty="0">
                 <a:solidFill>
                   <a:schemeClr val="bg1"/>
                 </a:solidFill>
@@ -4003,7 +3997,7 @@
           <a:p>
             <a:pPr algn="ctr"/>
             <a:r>
-              <a:rPr lang="en-US" sz="1600" dirty="0" smtClean="0">
+              <a:rPr lang="en-US" sz="1600" dirty="0">
                 <a:solidFill>
                   <a:schemeClr val="bg1"/>
                 </a:solidFill>
@@ -4150,8 +4144,8 @@
         </p:nvSpPr>
         <p:spPr>
           <a:xfrm>
-            <a:off x="466818" y="1345880"/>
-            <a:ext cx="860170" cy="215444"/>
+            <a:off x="363824" y="1359326"/>
+            <a:ext cx="1434334" cy="215444"/>
           </a:xfrm>
           <a:prstGeom prst="rect">
             <a:avLst/>
@@ -4165,10 +4159,9 @@
           <a:lstStyle/>
           <a:p>
             <a:r>
-              <a:rPr lang="en-US" sz="1400" dirty="0" smtClean="0"/>
-              <a:t>delete 1</a:t>
-            </a:r>
-            <a:endParaRPr lang="en-US" sz="1400" dirty="0"/>
+              <a:rPr lang="en-US" sz="1400" dirty="0"/>
+              <a:t>playlist del p/Fav</a:t>
+            </a:r>
           </a:p>
         </p:txBody>
       </p:sp>
@@ -4217,7 +4210,7 @@
         <p:spPr>
           <a:xfrm>
             <a:off x="2166172" y="1453379"/>
-            <a:ext cx="1424846" cy="215444"/>
+            <a:ext cx="1424846" cy="430887"/>
           </a:xfrm>
           <a:prstGeom prst="rect">
             <a:avLst/>
@@ -4231,18 +4224,13 @@
           <a:lstStyle/>
           <a:p>
             <a:r>
-              <a:rPr lang="en-US" sz="1400" dirty="0" smtClean="0">
+              <a:rPr lang="en-US" sz="1400" dirty="0">
                 <a:solidFill>
                   <a:srgbClr val="0070C0"/>
                 </a:solidFill>
               </a:rPr>
-              <a:t>execute(“delete 1”)</a:t>
-            </a:r>
-            <a:endParaRPr lang="en-US" sz="1400" dirty="0">
-              <a:solidFill>
-                <a:srgbClr val="0070C0"/>
-              </a:solidFill>
-            </a:endParaRPr>
+              <a:t>execute(“playlist del p/Fav”)</a:t>
+            </a:r>
           </a:p>
         </p:txBody>
       </p:sp>
@@ -4305,26 +4293,21 @@
           <a:lstStyle/>
           <a:p>
             <a:r>
-              <a:rPr lang="en-US" sz="1400" dirty="0" err="1" smtClean="0">
+              <a:rPr lang="en-US" sz="1400" dirty="0" err="1">
                 <a:solidFill>
                   <a:srgbClr val="7030A0"/>
                 </a:solidFill>
               </a:rPr>
-              <a:t>deletePerson</a:t>
-            </a:r>
-            <a:r>
-              <a:rPr lang="en-US" sz="1400" dirty="0" smtClean="0">
+              <a:t>deletePlaylist</a:t>
+            </a:r>
+            <a:r>
+              <a:rPr lang="en-US" sz="1400" dirty="0">
                 <a:solidFill>
                   <a:srgbClr val="7030A0"/>
                 </a:solidFill>
               </a:rPr>
-              <a:t>(p)</a:t>
-            </a:r>
-            <a:endParaRPr lang="en-US" sz="1400" dirty="0">
-              <a:solidFill>
-                <a:srgbClr val="7030A0"/>
-              </a:solidFill>
-            </a:endParaRPr>
+              <a:t>(Fav)</a:t>
+            </a:r>
           </a:p>
         </p:txBody>
       </p:sp>
@@ -4351,7 +4334,7 @@
           <a:lstStyle/>
           <a:p>
             <a:r>
-              <a:rPr lang="en-US" sz="1400" dirty="0" smtClean="0">
+              <a:rPr lang="en-US" sz="1400" dirty="0">
                 <a:solidFill>
                   <a:schemeClr val="accent5">
                     <a:lumMod val="75000"/>
@@ -4361,17 +4344,17 @@
               <a:t>post(</a:t>
             </a:r>
             <a:r>
-              <a:rPr lang="en-US" sz="1400" dirty="0" err="1" smtClean="0">
+              <a:rPr lang="en-US" sz="1400" dirty="0" err="1">
                 <a:solidFill>
                   <a:schemeClr val="accent5">
                     <a:lumMod val="75000"/>
                   </a:schemeClr>
                 </a:solidFill>
               </a:rPr>
-              <a:t>AddressBookChangedEvent</a:t>
-            </a:r>
-            <a:r>
-              <a:rPr lang="en-US" sz="1400" dirty="0" smtClean="0">
+              <a:t>LibraryChangedEvent</a:t>
+            </a:r>
+            <a:r>
+              <a:rPr lang="en-US" sz="1400" dirty="0">
                 <a:solidFill>
                   <a:schemeClr val="accent5">
                     <a:lumMod val="75000"/>
@@ -4380,13 +4363,6 @@
               </a:rPr>
               <a:t>)</a:t>
             </a:r>
-            <a:endParaRPr lang="en-US" sz="1400" dirty="0">
-              <a:solidFill>
-                <a:schemeClr val="accent5">
-                  <a:lumMod val="75000"/>
-                </a:schemeClr>
-              </a:solidFill>
-            </a:endParaRPr>
           </a:p>
         </p:txBody>
       </p:sp>
@@ -4552,7 +4528,7 @@
           <a:p>
             <a:pPr algn="ctr"/>
             <a:r>
-              <a:rPr lang="en-US" sz="1600" dirty="0" smtClean="0">
+              <a:rPr lang="en-US" sz="1600" dirty="0">
                 <a:solidFill>
                   <a:schemeClr val="bg1"/>
                 </a:solidFill>
@@ -4560,7 +4536,7 @@
               <a:t>:</a:t>
             </a:r>
             <a:r>
-              <a:rPr lang="en-US" sz="1600" dirty="0" err="1" smtClean="0">
+              <a:rPr lang="en-US" sz="1600" dirty="0" err="1">
                 <a:solidFill>
                   <a:schemeClr val="bg1"/>
                 </a:solidFill>
@@ -4793,7 +4769,7 @@
           <a:p>
             <a:pPr algn="ctr"/>
             <a:r>
-              <a:rPr lang="en-US" sz="1600" dirty="0" smtClean="0">
+              <a:rPr lang="en-US" sz="1600" dirty="0">
                 <a:solidFill>
                   <a:schemeClr val="bg1"/>
                 </a:solidFill>
@@ -4925,7 +4901,7 @@
           <a:lstStyle/>
           <a:p>
             <a:r>
-              <a:rPr lang="en-US" sz="1400" dirty="0" smtClean="0">
+              <a:rPr lang="en-US" sz="1400" dirty="0">
                 <a:solidFill>
                   <a:schemeClr val="accent5">
                     <a:lumMod val="75000"/>
@@ -4935,17 +4911,17 @@
               <a:t>post(</a:t>
             </a:r>
             <a:r>
-              <a:rPr lang="en-US" sz="1400" dirty="0" err="1" smtClean="0">
+              <a:rPr lang="en-US" sz="1400" dirty="0" err="1">
                 <a:solidFill>
                   <a:schemeClr val="accent5">
                     <a:lumMod val="75000"/>
                   </a:schemeClr>
                 </a:solidFill>
               </a:rPr>
-              <a:t>AddressBookChangedEvent</a:t>
-            </a:r>
-            <a:r>
-              <a:rPr lang="en-US" sz="1400" dirty="0" smtClean="0">
+              <a:t>LibraryChangedEvent</a:t>
+            </a:r>
+            <a:r>
+              <a:rPr lang="en-US" sz="1400" dirty="0">
                 <a:solidFill>
                   <a:schemeClr val="accent5">
                     <a:lumMod val="75000"/>
@@ -4954,13 +4930,6 @@
               </a:rPr>
               <a:t>)</a:t>
             </a:r>
-            <a:endParaRPr lang="en-US" sz="1400" dirty="0">
-              <a:solidFill>
-                <a:schemeClr val="accent5">
-                  <a:lumMod val="75000"/>
-                </a:schemeClr>
-              </a:solidFill>
-            </a:endParaRPr>
           </a:p>
         </p:txBody>
       </p:sp>
@@ -5052,7 +5021,7 @@
           <a:p>
             <a:pPr algn="ctr"/>
             <a:r>
-              <a:rPr lang="en-US" sz="1600" dirty="0" smtClean="0">
+              <a:rPr lang="en-US" sz="1600" dirty="0">
                 <a:solidFill>
                   <a:schemeClr val="bg1"/>
                 </a:solidFill>
@@ -5060,7 +5029,7 @@
               <a:t>:</a:t>
             </a:r>
             <a:r>
-              <a:rPr lang="en-US" sz="1600" dirty="0" err="1" smtClean="0">
+              <a:rPr lang="en-US" sz="1600" dirty="0" err="1">
                 <a:solidFill>
                   <a:schemeClr val="bg1"/>
                 </a:solidFill>
@@ -5307,17 +5276,17 @@
           <a:lstStyle/>
           <a:p>
             <a:r>
-              <a:rPr lang="en-US" sz="1400" dirty="0" err="1" smtClean="0">
+              <a:rPr lang="en-US" sz="1400" dirty="0" err="1">
                 <a:solidFill>
                   <a:schemeClr val="accent6">
                     <a:lumMod val="75000"/>
                   </a:schemeClr>
                 </a:solidFill>
               </a:rPr>
-              <a:t>handleAddresssBookChangedEvent</a:t>
-            </a:r>
-            <a:r>
-              <a:rPr lang="en-US" sz="1400" dirty="0" smtClean="0">
+              <a:t>handleLibraryChangedEvent</a:t>
+            </a:r>
+            <a:r>
+              <a:rPr lang="en-US" sz="1400" dirty="0">
                 <a:solidFill>
                   <a:schemeClr val="accent6">
                     <a:lumMod val="75000"/>
@@ -5326,13 +5295,6 @@
               </a:rPr>
               <a:t>()</a:t>
             </a:r>
-            <a:endParaRPr lang="en-US" sz="1400" dirty="0">
-              <a:solidFill>
-                <a:schemeClr val="accent6">
-                  <a:lumMod val="75000"/>
-                </a:schemeClr>
-              </a:solidFill>
-            </a:endParaRPr>
           </a:p>
         </p:txBody>
       </p:sp>
@@ -5417,7 +5379,7 @@
           <a:p>
             <a:pPr algn="ctr"/>
             <a:r>
-              <a:rPr lang="en-US" sz="1600" dirty="0" smtClean="0">
+              <a:rPr lang="en-US" sz="1600" dirty="0">
                 <a:solidFill>
                   <a:schemeClr val="bg1"/>
                 </a:solidFill>
@@ -5620,26 +5582,21 @@
           <a:lstStyle/>
           <a:p>
             <a:r>
-              <a:rPr lang="en-US" sz="1400" dirty="0" err="1" smtClean="0">
+              <a:rPr lang="en-US" sz="1400" dirty="0" err="1">
                 <a:solidFill>
                   <a:srgbClr val="00B050"/>
                 </a:solidFill>
               </a:rPr>
-              <a:t>handleAddresssBookChangedEvent</a:t>
-            </a:r>
-            <a:r>
-              <a:rPr lang="en-US" sz="1400" dirty="0" smtClean="0">
+              <a:t>handleLibraryChangedEvent</a:t>
+            </a:r>
+            <a:r>
+              <a:rPr lang="en-US" sz="1400" dirty="0">
                 <a:solidFill>
                   <a:srgbClr val="00B050"/>
                 </a:solidFill>
               </a:rPr>
               <a:t>()</a:t>
             </a:r>
-            <a:endParaRPr lang="en-US" sz="1400" dirty="0">
-              <a:solidFill>
-                <a:srgbClr val="00B050"/>
-              </a:solidFill>
-            </a:endParaRPr>
           </a:p>
         </p:txBody>
       </p:sp>
@@ -5826,18 +5783,13 @@
           <a:p>
             <a:pPr algn="r"/>
             <a:r>
-              <a:rPr lang="en-US" sz="1400" dirty="0" smtClean="0">
+              <a:rPr lang="en-US" sz="1400" dirty="0">
                 <a:solidFill>
                   <a:srgbClr val="00B050"/>
                 </a:solidFill>
               </a:rPr>
               <a:t>Update status bar</a:t>
             </a:r>
-            <a:endParaRPr lang="en-US" sz="1400" dirty="0">
-              <a:solidFill>
-                <a:srgbClr val="00B050"/>
-              </a:solidFill>
-            </a:endParaRPr>
           </a:p>
         </p:txBody>
       </p:sp>
@@ -6027,7 +5979,7 @@
           <a:lstStyle/>
           <a:p>
             <a:r>
-              <a:rPr lang="en-US" sz="1400" dirty="0" smtClean="0">
+              <a:rPr lang="en-US" sz="1400" dirty="0">
                 <a:solidFill>
                   <a:schemeClr val="accent6">
                     <a:lumMod val="75000"/>
@@ -6037,7 +5989,7 @@
               <a:t>Save </a:t>
             </a:r>
             <a:br>
-              <a:rPr lang="en-US" sz="1400" dirty="0" smtClean="0">
+              <a:rPr lang="en-US" sz="1400" dirty="0">
                 <a:solidFill>
                   <a:schemeClr val="accent6">
                     <a:lumMod val="75000"/>
@@ -6046,7 +5998,7 @@
               </a:rPr>
             </a:br>
             <a:r>
-              <a:rPr lang="en-US" sz="1400" dirty="0" smtClean="0">
+              <a:rPr lang="en-US" sz="1400" dirty="0">
                 <a:solidFill>
                   <a:schemeClr val="accent6">
                     <a:lumMod val="75000"/>
@@ -6055,13 +6007,6 @@
               </a:rPr>
               <a:t>to file</a:t>
             </a:r>
-            <a:endParaRPr lang="en-US" sz="1400" dirty="0">
-              <a:solidFill>
-                <a:schemeClr val="accent6">
-                  <a:lumMod val="75000"/>
-                </a:schemeClr>
-              </a:solidFill>
-            </a:endParaRPr>
           </a:p>
         </p:txBody>
       </p:sp>

</xml_diff>

<commit_message>
DeveloperGuide: Update high level sequence diagram
</commit_message>
<xml_diff>
--- a/docs/diagrams/HighLevelSequenceDiagrams.pptx
+++ b/docs/diagrams/HighLevelSequenceDiagrams.pptx
@@ -107,6 +107,22 @@
       </a:defRPr>
     </a:lvl9pPr>
   </p:defaultTextStyle>
+  <p:extLst>
+    <p:ext uri="{EFAFB233-063F-42B5-8137-9DF3F51BA10A}">
+      <p15:sldGuideLst xmlns:p15="http://schemas.microsoft.com/office/powerpoint/2012/main">
+        <p15:guide id="1" orient="horz" pos="1488">
+          <p15:clr>
+            <a:srgbClr val="A4A3A4"/>
+          </p15:clr>
+        </p15:guide>
+        <p15:guide id="2" pos="2880">
+          <p15:clr>
+            <a:srgbClr val="A4A3A4"/>
+          </p15:clr>
+        </p15:guide>
+      </p15:sldGuideLst>
+    </p:ext>
+  </p:extLst>
 </p:presentation>
 </file>
 
@@ -192,7 +208,7 @@
           <a:p>
             <a:fld id="{F5CC4B3F-88C1-4FFA-B1B6-F41C21DC6924}" type="datetimeFigureOut">
               <a:rPr lang="en-US" smtClean="0"/>
-              <a:t>10/16/2016</a:t>
+              <a:t>11/8/2018</a:t>
             </a:fld>
             <a:endParaRPr lang="en-US"/>
           </a:p>
@@ -256,38 +272,37 @@
           <a:p>
             <a:pPr lvl="0"/>
             <a:r>
-              <a:rPr lang="en-US" smtClean="0"/>
+              <a:rPr lang="en-US"/>
               <a:t>Click to edit Master text styles</a:t>
             </a:r>
           </a:p>
           <a:p>
             <a:pPr lvl="1"/>
             <a:r>
-              <a:rPr lang="en-US" smtClean="0"/>
+              <a:rPr lang="en-US"/>
               <a:t>Second level</a:t>
             </a:r>
           </a:p>
           <a:p>
             <a:pPr lvl="2"/>
             <a:r>
-              <a:rPr lang="en-US" smtClean="0"/>
+              <a:rPr lang="en-US"/>
               <a:t>Third level</a:t>
             </a:r>
           </a:p>
           <a:p>
             <a:pPr lvl="3"/>
             <a:r>
-              <a:rPr lang="en-US" smtClean="0"/>
+              <a:rPr lang="en-US"/>
               <a:t>Fourth level</a:t>
             </a:r>
           </a:p>
           <a:p>
             <a:pPr lvl="4"/>
             <a:r>
-              <a:rPr lang="en-US" smtClean="0"/>
+              <a:rPr lang="en-US"/>
               <a:t>Fifth level</a:t>
             </a:r>
-            <a:endParaRPr lang="en-US"/>
           </a:p>
         </p:txBody>
       </p:sp>
@@ -498,10 +513,9 @@
           <a:lstStyle/>
           <a:p>
             <a:r>
-              <a:rPr lang="en-US" smtClean="0"/>
+              <a:rPr lang="en-US"/>
               <a:t>Click to edit Master title style</a:t>
             </a:r>
-            <a:endParaRPr lang="en-US"/>
           </a:p>
         </p:txBody>
       </p:sp>
@@ -617,10 +631,9 @@
           </a:lstStyle>
           <a:p>
             <a:r>
-              <a:rPr lang="en-US" smtClean="0"/>
+              <a:rPr lang="en-US"/>
               <a:t>Click to edit Master subtitle style</a:t>
             </a:r>
-            <a:endParaRPr lang="en-US"/>
           </a:p>
         </p:txBody>
       </p:sp>
@@ -641,7 +654,7 @@
           <a:p>
             <a:fld id="{78C97017-6FC3-485B-9764-EAC9E56C1D49}" type="datetimeFigureOut">
               <a:rPr lang="en-US" smtClean="0"/>
-              <a:t>10/16/2016</a:t>
+              <a:t>11/8/2018</a:t>
             </a:fld>
             <a:endParaRPr lang="en-US"/>
           </a:p>
@@ -735,10 +748,9 @@
           <a:lstStyle/>
           <a:p>
             <a:r>
-              <a:rPr lang="en-US" smtClean="0"/>
+              <a:rPr lang="en-US"/>
               <a:t>Click to edit Master title style</a:t>
             </a:r>
-            <a:endParaRPr lang="en-US"/>
           </a:p>
         </p:txBody>
       </p:sp>
@@ -759,38 +771,37 @@
           <a:p>
             <a:pPr lvl="0"/>
             <a:r>
-              <a:rPr lang="en-US" smtClean="0"/>
+              <a:rPr lang="en-US"/>
               <a:t>Click to edit Master text styles</a:t>
             </a:r>
           </a:p>
           <a:p>
             <a:pPr lvl="1"/>
             <a:r>
-              <a:rPr lang="en-US" smtClean="0"/>
+              <a:rPr lang="en-US"/>
               <a:t>Second level</a:t>
             </a:r>
           </a:p>
           <a:p>
             <a:pPr lvl="2"/>
             <a:r>
-              <a:rPr lang="en-US" smtClean="0"/>
+              <a:rPr lang="en-US"/>
               <a:t>Third level</a:t>
             </a:r>
           </a:p>
           <a:p>
             <a:pPr lvl="3"/>
             <a:r>
-              <a:rPr lang="en-US" smtClean="0"/>
+              <a:rPr lang="en-US"/>
               <a:t>Fourth level</a:t>
             </a:r>
           </a:p>
           <a:p>
             <a:pPr lvl="4"/>
             <a:r>
-              <a:rPr lang="en-US" smtClean="0"/>
+              <a:rPr lang="en-US"/>
               <a:t>Fifth level</a:t>
             </a:r>
-            <a:endParaRPr lang="en-US"/>
           </a:p>
         </p:txBody>
       </p:sp>
@@ -811,7 +822,7 @@
           <a:p>
             <a:fld id="{78C97017-6FC3-485B-9764-EAC9E56C1D49}" type="datetimeFigureOut">
               <a:rPr lang="en-US" smtClean="0"/>
-              <a:t>10/16/2016</a:t>
+              <a:t>11/8/2018</a:t>
             </a:fld>
             <a:endParaRPr lang="en-US"/>
           </a:p>
@@ -910,10 +921,9 @@
           <a:lstStyle/>
           <a:p>
             <a:r>
-              <a:rPr lang="en-US" smtClean="0"/>
+              <a:rPr lang="en-US"/>
               <a:t>Click to edit Master title style</a:t>
             </a:r>
-            <a:endParaRPr lang="en-US"/>
           </a:p>
         </p:txBody>
       </p:sp>
@@ -939,38 +949,37 @@
           <a:p>
             <a:pPr lvl="0"/>
             <a:r>
-              <a:rPr lang="en-US" smtClean="0"/>
+              <a:rPr lang="en-US"/>
               <a:t>Click to edit Master text styles</a:t>
             </a:r>
           </a:p>
           <a:p>
             <a:pPr lvl="1"/>
             <a:r>
-              <a:rPr lang="en-US" smtClean="0"/>
+              <a:rPr lang="en-US"/>
               <a:t>Second level</a:t>
             </a:r>
           </a:p>
           <a:p>
             <a:pPr lvl="2"/>
             <a:r>
-              <a:rPr lang="en-US" smtClean="0"/>
+              <a:rPr lang="en-US"/>
               <a:t>Third level</a:t>
             </a:r>
           </a:p>
           <a:p>
             <a:pPr lvl="3"/>
             <a:r>
-              <a:rPr lang="en-US" smtClean="0"/>
+              <a:rPr lang="en-US"/>
               <a:t>Fourth level</a:t>
             </a:r>
           </a:p>
           <a:p>
             <a:pPr lvl="4"/>
             <a:r>
-              <a:rPr lang="en-US" smtClean="0"/>
+              <a:rPr lang="en-US"/>
               <a:t>Fifth level</a:t>
             </a:r>
-            <a:endParaRPr lang="en-US"/>
           </a:p>
         </p:txBody>
       </p:sp>
@@ -991,7 +1000,7 @@
           <a:p>
             <a:fld id="{78C97017-6FC3-485B-9764-EAC9E56C1D49}" type="datetimeFigureOut">
               <a:rPr lang="en-US" smtClean="0"/>
-              <a:t>10/16/2016</a:t>
+              <a:t>11/8/2018</a:t>
             </a:fld>
             <a:endParaRPr lang="en-US"/>
           </a:p>
@@ -1085,10 +1094,9 @@
           <a:lstStyle/>
           <a:p>
             <a:r>
-              <a:rPr lang="en-US" smtClean="0"/>
+              <a:rPr lang="en-US"/>
               <a:t>Click to edit Master title style</a:t>
             </a:r>
-            <a:endParaRPr lang="en-US"/>
           </a:p>
         </p:txBody>
       </p:sp>
@@ -1109,38 +1117,37 @@
           <a:p>
             <a:pPr lvl="0"/>
             <a:r>
-              <a:rPr lang="en-US" smtClean="0"/>
+              <a:rPr lang="en-US"/>
               <a:t>Click to edit Master text styles</a:t>
             </a:r>
           </a:p>
           <a:p>
             <a:pPr lvl="1"/>
             <a:r>
-              <a:rPr lang="en-US" smtClean="0"/>
+              <a:rPr lang="en-US"/>
               <a:t>Second level</a:t>
             </a:r>
           </a:p>
           <a:p>
             <a:pPr lvl="2"/>
             <a:r>
-              <a:rPr lang="en-US" smtClean="0"/>
+              <a:rPr lang="en-US"/>
               <a:t>Third level</a:t>
             </a:r>
           </a:p>
           <a:p>
             <a:pPr lvl="3"/>
             <a:r>
-              <a:rPr lang="en-US" smtClean="0"/>
+              <a:rPr lang="en-US"/>
               <a:t>Fourth level</a:t>
             </a:r>
           </a:p>
           <a:p>
             <a:pPr lvl="4"/>
             <a:r>
-              <a:rPr lang="en-US" smtClean="0"/>
+              <a:rPr lang="en-US"/>
               <a:t>Fifth level</a:t>
             </a:r>
-            <a:endParaRPr lang="en-US"/>
           </a:p>
         </p:txBody>
       </p:sp>
@@ -1161,7 +1168,7 @@
           <a:p>
             <a:fld id="{78C97017-6FC3-485B-9764-EAC9E56C1D49}" type="datetimeFigureOut">
               <a:rPr lang="en-US" smtClean="0"/>
-              <a:t>10/16/2016</a:t>
+              <a:t>11/8/2018</a:t>
             </a:fld>
             <a:endParaRPr lang="en-US"/>
           </a:p>
@@ -1264,10 +1271,9 @@
           </a:lstStyle>
           <a:p>
             <a:r>
-              <a:rPr lang="en-US" smtClean="0"/>
+              <a:rPr lang="en-US"/>
               <a:t>Click to edit Master title style</a:t>
             </a:r>
-            <a:endParaRPr lang="en-US"/>
           </a:p>
         </p:txBody>
       </p:sp>
@@ -1384,7 +1390,7 @@
           <a:p>
             <a:pPr lvl="0"/>
             <a:r>
-              <a:rPr lang="en-US" smtClean="0"/>
+              <a:rPr lang="en-US"/>
               <a:t>Click to edit Master text styles</a:t>
             </a:r>
           </a:p>
@@ -1407,7 +1413,7 @@
           <a:p>
             <a:fld id="{78C97017-6FC3-485B-9764-EAC9E56C1D49}" type="datetimeFigureOut">
               <a:rPr lang="en-US" smtClean="0"/>
-              <a:t>10/16/2016</a:t>
+              <a:t>11/8/2018</a:t>
             </a:fld>
             <a:endParaRPr lang="en-US"/>
           </a:p>
@@ -1501,10 +1507,9 @@
           <a:lstStyle/>
           <a:p>
             <a:r>
-              <a:rPr lang="en-US" smtClean="0"/>
+              <a:rPr lang="en-US"/>
               <a:t>Click to edit Master title style</a:t>
             </a:r>
-            <a:endParaRPr lang="en-US"/>
           </a:p>
         </p:txBody>
       </p:sp>
@@ -1558,38 +1563,37 @@
           <a:p>
             <a:pPr lvl="0"/>
             <a:r>
-              <a:rPr lang="en-US" smtClean="0"/>
+              <a:rPr lang="en-US"/>
               <a:t>Click to edit Master text styles</a:t>
             </a:r>
           </a:p>
           <a:p>
             <a:pPr lvl="1"/>
             <a:r>
-              <a:rPr lang="en-US" smtClean="0"/>
+              <a:rPr lang="en-US"/>
               <a:t>Second level</a:t>
             </a:r>
           </a:p>
           <a:p>
             <a:pPr lvl="2"/>
             <a:r>
-              <a:rPr lang="en-US" smtClean="0"/>
+              <a:rPr lang="en-US"/>
               <a:t>Third level</a:t>
             </a:r>
           </a:p>
           <a:p>
             <a:pPr lvl="3"/>
             <a:r>
-              <a:rPr lang="en-US" smtClean="0"/>
+              <a:rPr lang="en-US"/>
               <a:t>Fourth level</a:t>
             </a:r>
           </a:p>
           <a:p>
             <a:pPr lvl="4"/>
             <a:r>
-              <a:rPr lang="en-US" smtClean="0"/>
+              <a:rPr lang="en-US"/>
               <a:t>Fifth level</a:t>
             </a:r>
-            <a:endParaRPr lang="en-US"/>
           </a:p>
         </p:txBody>
       </p:sp>
@@ -1643,38 +1647,37 @@
           <a:p>
             <a:pPr lvl="0"/>
             <a:r>
-              <a:rPr lang="en-US" smtClean="0"/>
+              <a:rPr lang="en-US"/>
               <a:t>Click to edit Master text styles</a:t>
             </a:r>
           </a:p>
           <a:p>
             <a:pPr lvl="1"/>
             <a:r>
-              <a:rPr lang="en-US" smtClean="0"/>
+              <a:rPr lang="en-US"/>
               <a:t>Second level</a:t>
             </a:r>
           </a:p>
           <a:p>
             <a:pPr lvl="2"/>
             <a:r>
-              <a:rPr lang="en-US" smtClean="0"/>
+              <a:rPr lang="en-US"/>
               <a:t>Third level</a:t>
             </a:r>
           </a:p>
           <a:p>
             <a:pPr lvl="3"/>
             <a:r>
-              <a:rPr lang="en-US" smtClean="0"/>
+              <a:rPr lang="en-US"/>
               <a:t>Fourth level</a:t>
             </a:r>
           </a:p>
           <a:p>
             <a:pPr lvl="4"/>
             <a:r>
-              <a:rPr lang="en-US" smtClean="0"/>
+              <a:rPr lang="en-US"/>
               <a:t>Fifth level</a:t>
             </a:r>
-            <a:endParaRPr lang="en-US"/>
           </a:p>
         </p:txBody>
       </p:sp>
@@ -1695,7 +1698,7 @@
           <a:p>
             <a:fld id="{78C97017-6FC3-485B-9764-EAC9E56C1D49}" type="datetimeFigureOut">
               <a:rPr lang="en-US" smtClean="0"/>
-              <a:t>10/16/2016</a:t>
+              <a:t>11/8/2018</a:t>
             </a:fld>
             <a:endParaRPr lang="en-US"/>
           </a:p>
@@ -1793,10 +1796,9 @@
           </a:lstStyle>
           <a:p>
             <a:r>
-              <a:rPr lang="en-US" smtClean="0"/>
+              <a:rPr lang="en-US"/>
               <a:t>Click to edit Master title style</a:t>
             </a:r>
-            <a:endParaRPr lang="en-US"/>
           </a:p>
         </p:txBody>
       </p:sp>
@@ -1859,7 +1861,7 @@
           <a:p>
             <a:pPr lvl="0"/>
             <a:r>
-              <a:rPr lang="en-US" smtClean="0"/>
+              <a:rPr lang="en-US"/>
               <a:t>Click to edit Master text styles</a:t>
             </a:r>
           </a:p>
@@ -1915,38 +1917,37 @@
           <a:p>
             <a:pPr lvl="0"/>
             <a:r>
-              <a:rPr lang="en-US" smtClean="0"/>
+              <a:rPr lang="en-US"/>
               <a:t>Click to edit Master text styles</a:t>
             </a:r>
           </a:p>
           <a:p>
             <a:pPr lvl="1"/>
             <a:r>
-              <a:rPr lang="en-US" smtClean="0"/>
+              <a:rPr lang="en-US"/>
               <a:t>Second level</a:t>
             </a:r>
           </a:p>
           <a:p>
             <a:pPr lvl="2"/>
             <a:r>
-              <a:rPr lang="en-US" smtClean="0"/>
+              <a:rPr lang="en-US"/>
               <a:t>Third level</a:t>
             </a:r>
           </a:p>
           <a:p>
             <a:pPr lvl="3"/>
             <a:r>
-              <a:rPr lang="en-US" smtClean="0"/>
+              <a:rPr lang="en-US"/>
               <a:t>Fourth level</a:t>
             </a:r>
           </a:p>
           <a:p>
             <a:pPr lvl="4"/>
             <a:r>
-              <a:rPr lang="en-US" smtClean="0"/>
+              <a:rPr lang="en-US"/>
               <a:t>Fifth level</a:t>
             </a:r>
-            <a:endParaRPr lang="en-US"/>
           </a:p>
         </p:txBody>
       </p:sp>
@@ -2009,7 +2010,7 @@
           <a:p>
             <a:pPr lvl="0"/>
             <a:r>
-              <a:rPr lang="en-US" smtClean="0"/>
+              <a:rPr lang="en-US"/>
               <a:t>Click to edit Master text styles</a:t>
             </a:r>
           </a:p>
@@ -2065,38 +2066,37 @@
           <a:p>
             <a:pPr lvl="0"/>
             <a:r>
-              <a:rPr lang="en-US" smtClean="0"/>
+              <a:rPr lang="en-US"/>
               <a:t>Click to edit Master text styles</a:t>
             </a:r>
           </a:p>
           <a:p>
             <a:pPr lvl="1"/>
             <a:r>
-              <a:rPr lang="en-US" smtClean="0"/>
+              <a:rPr lang="en-US"/>
               <a:t>Second level</a:t>
             </a:r>
           </a:p>
           <a:p>
             <a:pPr lvl="2"/>
             <a:r>
-              <a:rPr lang="en-US" smtClean="0"/>
+              <a:rPr lang="en-US"/>
               <a:t>Third level</a:t>
             </a:r>
           </a:p>
           <a:p>
             <a:pPr lvl="3"/>
             <a:r>
-              <a:rPr lang="en-US" smtClean="0"/>
+              <a:rPr lang="en-US"/>
               <a:t>Fourth level</a:t>
             </a:r>
           </a:p>
           <a:p>
             <a:pPr lvl="4"/>
             <a:r>
-              <a:rPr lang="en-US" smtClean="0"/>
+              <a:rPr lang="en-US"/>
               <a:t>Fifth level</a:t>
             </a:r>
-            <a:endParaRPr lang="en-US"/>
           </a:p>
         </p:txBody>
       </p:sp>
@@ -2117,7 +2117,7 @@
           <a:p>
             <a:fld id="{78C97017-6FC3-485B-9764-EAC9E56C1D49}" type="datetimeFigureOut">
               <a:rPr lang="en-US" smtClean="0"/>
-              <a:t>10/16/2016</a:t>
+              <a:t>11/8/2018</a:t>
             </a:fld>
             <a:endParaRPr lang="en-US"/>
           </a:p>
@@ -2211,10 +2211,9 @@
           <a:lstStyle/>
           <a:p>
             <a:r>
-              <a:rPr lang="en-US" smtClean="0"/>
+              <a:rPr lang="en-US"/>
               <a:t>Click to edit Master title style</a:t>
             </a:r>
-            <a:endParaRPr lang="en-US"/>
           </a:p>
         </p:txBody>
       </p:sp>
@@ -2235,7 +2234,7 @@
           <a:p>
             <a:fld id="{78C97017-6FC3-485B-9764-EAC9E56C1D49}" type="datetimeFigureOut">
               <a:rPr lang="en-US" smtClean="0"/>
-              <a:t>10/16/2016</a:t>
+              <a:t>11/8/2018</a:t>
             </a:fld>
             <a:endParaRPr lang="en-US"/>
           </a:p>
@@ -2330,7 +2329,7 @@
           <a:p>
             <a:fld id="{78C97017-6FC3-485B-9764-EAC9E56C1D49}" type="datetimeFigureOut">
               <a:rPr lang="en-US" smtClean="0"/>
-              <a:t>10/16/2016</a:t>
+              <a:t>11/8/2018</a:t>
             </a:fld>
             <a:endParaRPr lang="en-US"/>
           </a:p>
@@ -2433,10 +2432,9 @@
           </a:lstStyle>
           <a:p>
             <a:r>
-              <a:rPr lang="en-US" smtClean="0"/>
+              <a:rPr lang="en-US"/>
               <a:t>Click to edit Master title style</a:t>
             </a:r>
-            <a:endParaRPr lang="en-US"/>
           </a:p>
         </p:txBody>
       </p:sp>
@@ -2490,38 +2488,37 @@
           <a:p>
             <a:pPr lvl="0"/>
             <a:r>
-              <a:rPr lang="en-US" smtClean="0"/>
+              <a:rPr lang="en-US"/>
               <a:t>Click to edit Master text styles</a:t>
             </a:r>
           </a:p>
           <a:p>
             <a:pPr lvl="1"/>
             <a:r>
-              <a:rPr lang="en-US" smtClean="0"/>
+              <a:rPr lang="en-US"/>
               <a:t>Second level</a:t>
             </a:r>
           </a:p>
           <a:p>
             <a:pPr lvl="2"/>
             <a:r>
-              <a:rPr lang="en-US" smtClean="0"/>
+              <a:rPr lang="en-US"/>
               <a:t>Third level</a:t>
             </a:r>
           </a:p>
           <a:p>
             <a:pPr lvl="3"/>
             <a:r>
-              <a:rPr lang="en-US" smtClean="0"/>
+              <a:rPr lang="en-US"/>
               <a:t>Fourth level</a:t>
             </a:r>
           </a:p>
           <a:p>
             <a:pPr lvl="4"/>
             <a:r>
-              <a:rPr lang="en-US" smtClean="0"/>
+              <a:rPr lang="en-US"/>
               <a:t>Fifth level</a:t>
             </a:r>
-            <a:endParaRPr lang="en-US"/>
           </a:p>
         </p:txBody>
       </p:sp>
@@ -2584,7 +2581,7 @@
           <a:p>
             <a:pPr lvl="0"/>
             <a:r>
-              <a:rPr lang="en-US" smtClean="0"/>
+              <a:rPr lang="en-US"/>
               <a:t>Click to edit Master text styles</a:t>
             </a:r>
           </a:p>
@@ -2607,7 +2604,7 @@
           <a:p>
             <a:fld id="{78C97017-6FC3-485B-9764-EAC9E56C1D49}" type="datetimeFigureOut">
               <a:rPr lang="en-US" smtClean="0"/>
-              <a:t>10/16/2016</a:t>
+              <a:t>11/8/2018</a:t>
             </a:fld>
             <a:endParaRPr lang="en-US"/>
           </a:p>
@@ -2710,10 +2707,9 @@
           </a:lstStyle>
           <a:p>
             <a:r>
-              <a:rPr lang="en-US" smtClean="0"/>
+              <a:rPr lang="en-US"/>
               <a:t>Click to edit Master title style</a:t>
             </a:r>
-            <a:endParaRPr lang="en-US"/>
           </a:p>
         </p:txBody>
       </p:sp>
@@ -2837,7 +2833,7 @@
           <a:p>
             <a:pPr lvl="0"/>
             <a:r>
-              <a:rPr lang="en-US" smtClean="0"/>
+              <a:rPr lang="en-US"/>
               <a:t>Click to edit Master text styles</a:t>
             </a:r>
           </a:p>
@@ -2860,7 +2856,7 @@
           <a:p>
             <a:fld id="{78C97017-6FC3-485B-9764-EAC9E56C1D49}" type="datetimeFigureOut">
               <a:rPr lang="en-US" smtClean="0"/>
-              <a:t>10/16/2016</a:t>
+              <a:t>11/8/2018</a:t>
             </a:fld>
             <a:endParaRPr lang="en-US"/>
           </a:p>
@@ -2969,10 +2965,9 @@
           <a:lstStyle/>
           <a:p>
             <a:r>
-              <a:rPr lang="en-US" smtClean="0"/>
+              <a:rPr lang="en-US"/>
               <a:t>Click to edit Master title style</a:t>
             </a:r>
-            <a:endParaRPr lang="en-US"/>
           </a:p>
         </p:txBody>
       </p:sp>
@@ -3003,38 +2998,37 @@
           <a:p>
             <a:pPr lvl="0"/>
             <a:r>
-              <a:rPr lang="en-US" smtClean="0"/>
+              <a:rPr lang="en-US"/>
               <a:t>Click to edit Master text styles</a:t>
             </a:r>
           </a:p>
           <a:p>
             <a:pPr lvl="1"/>
             <a:r>
-              <a:rPr lang="en-US" smtClean="0"/>
+              <a:rPr lang="en-US"/>
               <a:t>Second level</a:t>
             </a:r>
           </a:p>
           <a:p>
             <a:pPr lvl="2"/>
             <a:r>
-              <a:rPr lang="en-US" smtClean="0"/>
+              <a:rPr lang="en-US"/>
               <a:t>Third level</a:t>
             </a:r>
           </a:p>
           <a:p>
             <a:pPr lvl="3"/>
             <a:r>
-              <a:rPr lang="en-US" smtClean="0"/>
+              <a:rPr lang="en-US"/>
               <a:t>Fourth level</a:t>
             </a:r>
           </a:p>
           <a:p>
             <a:pPr lvl="4"/>
             <a:r>
-              <a:rPr lang="en-US" smtClean="0"/>
+              <a:rPr lang="en-US"/>
               <a:t>Fifth level</a:t>
             </a:r>
-            <a:endParaRPr lang="en-US"/>
           </a:p>
         </p:txBody>
       </p:sp>
@@ -3073,7 +3067,7 @@
           <a:p>
             <a:fld id="{78C97017-6FC3-485B-9764-EAC9E56C1D49}" type="datetimeFigureOut">
               <a:rPr lang="en-US" smtClean="0"/>
-              <a:t>10/16/2016</a:t>
+              <a:t>11/8/2018</a:t>
             </a:fld>
             <a:endParaRPr lang="en-US"/>
           </a:p>
@@ -3492,7 +3486,7 @@
           <a:p>
             <a:pPr algn="ctr"/>
             <a:r>
-              <a:rPr lang="en-US" sz="1600" dirty="0" smtClean="0">
+              <a:rPr lang="en-US" sz="1600" dirty="0">
                 <a:solidFill>
                   <a:schemeClr val="bg1"/>
                 </a:solidFill>
@@ -3856,7 +3850,7 @@
           <a:p>
             <a:pPr algn="ctr"/>
             <a:r>
-              <a:rPr lang="en-US" sz="1600" dirty="0" smtClean="0">
+              <a:rPr lang="en-US" sz="1600" dirty="0">
                 <a:solidFill>
                   <a:schemeClr val="bg1"/>
                 </a:solidFill>
@@ -4003,7 +3997,7 @@
           <a:p>
             <a:pPr algn="ctr"/>
             <a:r>
-              <a:rPr lang="en-US" sz="1600" dirty="0" smtClean="0">
+              <a:rPr lang="en-US" sz="1600" dirty="0">
                 <a:solidFill>
                   <a:schemeClr val="bg1"/>
                 </a:solidFill>
@@ -4165,10 +4159,9 @@
           <a:lstStyle/>
           <a:p>
             <a:r>
-              <a:rPr lang="en-US" sz="1400" dirty="0" smtClean="0"/>
+              <a:rPr lang="en-US" sz="1400" dirty="0"/>
               <a:t>delete 1</a:t>
             </a:r>
-            <a:endParaRPr lang="en-US" sz="1400" dirty="0"/>
           </a:p>
         </p:txBody>
       </p:sp>
@@ -4216,8 +4209,8 @@
         </p:nvSpPr>
         <p:spPr>
           <a:xfrm>
-            <a:off x="2166172" y="1453379"/>
-            <a:ext cx="1424846" cy="215444"/>
+            <a:off x="1859513" y="1491162"/>
+            <a:ext cx="1902442" cy="215444"/>
           </a:xfrm>
           <a:prstGeom prst="rect">
             <a:avLst/>
@@ -4231,18 +4224,13 @@
           <a:lstStyle/>
           <a:p>
             <a:r>
-              <a:rPr lang="en-US" sz="1400" dirty="0" smtClean="0">
+              <a:rPr lang="en-US" sz="1400" dirty="0">
                 <a:solidFill>
                   <a:srgbClr val="0070C0"/>
                 </a:solidFill>
               </a:rPr>
-              <a:t>execute(“delete 1”)</a:t>
-            </a:r>
-            <a:endParaRPr lang="en-US" sz="1400" dirty="0">
-              <a:solidFill>
-                <a:srgbClr val="0070C0"/>
-              </a:solidFill>
-            </a:endParaRPr>
+              <a:t>execute(“delete-item 1”)</a:t>
+            </a:r>
           </a:p>
         </p:txBody>
       </p:sp>
@@ -4305,26 +4293,21 @@
           <a:lstStyle/>
           <a:p>
             <a:r>
-              <a:rPr lang="en-US" sz="1400" dirty="0" err="1" smtClean="0">
+              <a:rPr lang="en-US" sz="1400" dirty="0" err="1">
                 <a:solidFill>
                   <a:srgbClr val="7030A0"/>
                 </a:solidFill>
               </a:rPr>
-              <a:t>deletePerson</a:t>
-            </a:r>
-            <a:r>
-              <a:rPr lang="en-US" sz="1400" dirty="0" smtClean="0">
+              <a:t>deleteItem</a:t>
+            </a:r>
+            <a:r>
+              <a:rPr lang="en-US" sz="1400" dirty="0">
                 <a:solidFill>
                   <a:srgbClr val="7030A0"/>
                 </a:solidFill>
               </a:rPr>
-              <a:t>(p)</a:t>
-            </a:r>
-            <a:endParaRPr lang="en-US" sz="1400" dirty="0">
-              <a:solidFill>
-                <a:srgbClr val="7030A0"/>
-              </a:solidFill>
-            </a:endParaRPr>
+              <a:t>(i)</a:t>
+            </a:r>
           </a:p>
         </p:txBody>
       </p:sp>
@@ -4336,8 +4319,8 @@
         </p:nvSpPr>
         <p:spPr>
           <a:xfrm>
-            <a:off x="6074030" y="1687656"/>
-            <a:ext cx="2438400" cy="215444"/>
+            <a:off x="6074029" y="1687656"/>
+            <a:ext cx="2612767" cy="215444"/>
           </a:xfrm>
           <a:prstGeom prst="rect">
             <a:avLst/>
@@ -4351,7 +4334,7 @@
           <a:lstStyle/>
           <a:p>
             <a:r>
-              <a:rPr lang="en-US" sz="1400" dirty="0" smtClean="0">
+              <a:rPr lang="en-US" sz="1400" dirty="0">
                 <a:solidFill>
                   <a:schemeClr val="accent5">
                     <a:lumMod val="75000"/>
@@ -4361,17 +4344,17 @@
               <a:t>post(</a:t>
             </a:r>
             <a:r>
-              <a:rPr lang="en-US" sz="1400" dirty="0" err="1" smtClean="0">
+              <a:rPr lang="en-US" sz="1400" dirty="0" err="1">
                 <a:solidFill>
                   <a:schemeClr val="accent5">
                     <a:lumMod val="75000"/>
                   </a:schemeClr>
                 </a:solidFill>
               </a:rPr>
-              <a:t>AddressBookChangedEvent</a:t>
-            </a:r>
-            <a:r>
-              <a:rPr lang="en-US" sz="1400" dirty="0" smtClean="0">
+              <a:t>RestaurantBookChangedEvent</a:t>
+            </a:r>
+            <a:r>
+              <a:rPr lang="en-US" sz="1400" dirty="0">
                 <a:solidFill>
                   <a:schemeClr val="accent5">
                     <a:lumMod val="75000"/>
@@ -4380,13 +4363,6 @@
               </a:rPr>
               <a:t>)</a:t>
             </a:r>
-            <a:endParaRPr lang="en-US" sz="1400" dirty="0">
-              <a:solidFill>
-                <a:schemeClr val="accent5">
-                  <a:lumMod val="75000"/>
-                </a:schemeClr>
-              </a:solidFill>
-            </a:endParaRPr>
           </a:p>
         </p:txBody>
       </p:sp>
@@ -4512,7 +4488,7 @@
         </p:nvSpPr>
         <p:spPr>
           <a:xfrm>
-            <a:off x="7696200" y="591251"/>
+            <a:off x="7848600" y="591251"/>
             <a:ext cx="1371600" cy="346760"/>
           </a:xfrm>
           <a:prstGeom prst="rect">
@@ -4552,7 +4528,7 @@
           <a:p>
             <a:pPr algn="ctr"/>
             <a:r>
-              <a:rPr lang="en-US" sz="1600" dirty="0" smtClean="0">
+              <a:rPr lang="en-US" sz="1600" dirty="0">
                 <a:solidFill>
                   <a:schemeClr val="bg1"/>
                 </a:solidFill>
@@ -4560,7 +4536,7 @@
               <a:t>:</a:t>
             </a:r>
             <a:r>
-              <a:rPr lang="en-US" sz="1600" dirty="0" err="1" smtClean="0">
+              <a:rPr lang="en-US" sz="1600" dirty="0" err="1">
                 <a:solidFill>
                   <a:schemeClr val="bg1"/>
                 </a:solidFill>
@@ -4583,7 +4559,7 @@
         </p:nvCxnSpPr>
         <p:spPr>
           <a:xfrm>
-            <a:off x="8616802" y="944305"/>
+            <a:off x="8769202" y="944305"/>
             <a:ext cx="0" cy="1723059"/>
           </a:xfrm>
           <a:prstGeom prst="line">
@@ -4622,7 +4598,7 @@
         </p:nvSpPr>
         <p:spPr>
           <a:xfrm>
-            <a:off x="8544794" y="1961202"/>
+            <a:off x="8697194" y="1961202"/>
             <a:ext cx="142006" cy="176787"/>
           </a:xfrm>
           <a:prstGeom prst="rect">
@@ -4672,13 +4648,15 @@
       <p:cxnSp>
         <p:nvCxnSpPr>
           <p:cNvPr id="42" name="Straight Arrow Connector 41"/>
-          <p:cNvCxnSpPr/>
+          <p:cNvCxnSpPr>
+            <a:cxnSpLocks/>
+          </p:cNvCxnSpPr>
           <p:nvPr/>
         </p:nvCxnSpPr>
         <p:spPr>
           <a:xfrm>
             <a:off x="5943992" y="1961202"/>
-            <a:ext cx="2568438" cy="0"/>
+            <a:ext cx="2742804" cy="0"/>
           </a:xfrm>
           <a:prstGeom prst="straightConnector1">
             <a:avLst/>
@@ -4708,13 +4686,16 @@
       <p:cxnSp>
         <p:nvCxnSpPr>
           <p:cNvPr id="44" name="Straight Arrow Connector 43"/>
-          <p:cNvCxnSpPr/>
+          <p:cNvCxnSpPr>
+            <a:cxnSpLocks/>
+            <a:endCxn id="41" idx="2"/>
+          </p:cNvCxnSpPr>
           <p:nvPr/>
         </p:nvCxnSpPr>
         <p:spPr>
           <a:xfrm>
             <a:off x="5943992" y="2137989"/>
-            <a:ext cx="2549946" cy="0"/>
+            <a:ext cx="2824205" cy="0"/>
           </a:xfrm>
           <a:prstGeom prst="straightConnector1">
             <a:avLst/>
@@ -4793,7 +4774,7 @@
           <a:p>
             <a:pPr algn="ctr"/>
             <a:r>
-              <a:rPr lang="en-US" sz="1600" dirty="0" smtClean="0">
+              <a:rPr lang="en-US" sz="1600" dirty="0">
                 <a:solidFill>
                   <a:schemeClr val="bg1"/>
                 </a:solidFill>
@@ -4925,7 +4906,7 @@
           <a:lstStyle/>
           <a:p>
             <a:r>
-              <a:rPr lang="en-US" sz="1400" dirty="0" smtClean="0">
+              <a:rPr lang="en-US" sz="1400" dirty="0">
                 <a:solidFill>
                   <a:schemeClr val="accent5">
                     <a:lumMod val="75000"/>
@@ -4935,17 +4916,17 @@
               <a:t>post(</a:t>
             </a:r>
             <a:r>
-              <a:rPr lang="en-US" sz="1400" dirty="0" err="1" smtClean="0">
+              <a:rPr lang="en-US" sz="1400" dirty="0" err="1">
                 <a:solidFill>
                   <a:schemeClr val="accent5">
                     <a:lumMod val="75000"/>
                   </a:schemeClr>
                 </a:solidFill>
               </a:rPr>
-              <a:t>AddressBookChangedEvent</a:t>
-            </a:r>
-            <a:r>
-              <a:rPr lang="en-US" sz="1400" dirty="0" smtClean="0">
+              <a:t>RestaurantBookChangedEvent</a:t>
+            </a:r>
+            <a:r>
+              <a:rPr lang="en-US" sz="1400" dirty="0">
                 <a:solidFill>
                   <a:schemeClr val="accent5">
                     <a:lumMod val="75000"/>
@@ -4954,13 +4935,6 @@
               </a:rPr>
               <a:t>)</a:t>
             </a:r>
-            <a:endParaRPr lang="en-US" sz="1400" dirty="0">
-              <a:solidFill>
-                <a:schemeClr val="accent5">
-                  <a:lumMod val="75000"/>
-                </a:schemeClr>
-              </a:solidFill>
-            </a:endParaRPr>
           </a:p>
         </p:txBody>
       </p:sp>
@@ -5052,7 +5026,7 @@
           <a:p>
             <a:pPr algn="ctr"/>
             <a:r>
-              <a:rPr lang="en-US" sz="1600" dirty="0" smtClean="0">
+              <a:rPr lang="en-US" sz="1600" dirty="0">
                 <a:solidFill>
                   <a:schemeClr val="bg1"/>
                 </a:solidFill>
@@ -5060,7 +5034,7 @@
               <a:t>:</a:t>
             </a:r>
             <a:r>
-              <a:rPr lang="en-US" sz="1600" dirty="0" err="1" smtClean="0">
+              <a:rPr lang="en-US" sz="1600" dirty="0" err="1">
                 <a:solidFill>
                   <a:schemeClr val="bg1"/>
                 </a:solidFill>
@@ -5292,8 +5266,8 @@
         </p:nvSpPr>
         <p:spPr>
           <a:xfrm>
-            <a:off x="5036330" y="5065911"/>
-            <a:ext cx="2659870" cy="215444"/>
+            <a:off x="4871995" y="5065911"/>
+            <a:ext cx="2824205" cy="215444"/>
           </a:xfrm>
           <a:prstGeom prst="rect">
             <a:avLst/>
@@ -5307,17 +5281,17 @@
           <a:lstStyle/>
           <a:p>
             <a:r>
-              <a:rPr lang="en-US" sz="1400" dirty="0" err="1" smtClean="0">
+              <a:rPr lang="en-US" sz="1400" dirty="0" err="1">
                 <a:solidFill>
                   <a:schemeClr val="accent6">
                     <a:lumMod val="75000"/>
                   </a:schemeClr>
                 </a:solidFill>
               </a:rPr>
-              <a:t>handleAddresssBookChangedEvent</a:t>
-            </a:r>
-            <a:r>
-              <a:rPr lang="en-US" sz="1400" dirty="0" smtClean="0">
+              <a:t>handleRestaurantBookChangedEvent</a:t>
+            </a:r>
+            <a:r>
+              <a:rPr lang="en-US" sz="1400" dirty="0">
                 <a:solidFill>
                   <a:schemeClr val="accent6">
                     <a:lumMod val="75000"/>
@@ -5326,13 +5300,6 @@
               </a:rPr>
               <a:t>()</a:t>
             </a:r>
-            <a:endParaRPr lang="en-US" sz="1400" dirty="0">
-              <a:solidFill>
-                <a:schemeClr val="accent6">
-                  <a:lumMod val="75000"/>
-                </a:schemeClr>
-              </a:solidFill>
-            </a:endParaRPr>
           </a:p>
         </p:txBody>
       </p:sp>
@@ -5417,7 +5384,7 @@
           <a:p>
             <a:pPr algn="ctr"/>
             <a:r>
-              <a:rPr lang="en-US" sz="1600" dirty="0" smtClean="0">
+              <a:rPr lang="en-US" sz="1600" dirty="0">
                 <a:solidFill>
                   <a:schemeClr val="bg1"/>
                 </a:solidFill>
@@ -5605,8 +5572,8 @@
         </p:nvSpPr>
         <p:spPr>
           <a:xfrm>
-            <a:off x="1416276" y="5395369"/>
-            <a:ext cx="2659870" cy="215444"/>
+            <a:off x="1416275" y="5395369"/>
+            <a:ext cx="2838455" cy="215444"/>
           </a:xfrm>
           <a:prstGeom prst="rect">
             <a:avLst/>
@@ -5620,26 +5587,21 @@
           <a:lstStyle/>
           <a:p>
             <a:r>
-              <a:rPr lang="en-US" sz="1400" dirty="0" err="1" smtClean="0">
+              <a:rPr lang="en-US" sz="1400" dirty="0" err="1">
                 <a:solidFill>
                   <a:srgbClr val="00B050"/>
                 </a:solidFill>
               </a:rPr>
-              <a:t>handleAddresssBookChangedEvent</a:t>
-            </a:r>
-            <a:r>
-              <a:rPr lang="en-US" sz="1400" dirty="0" smtClean="0">
+              <a:t>handleRestaurantBookChangedEvent</a:t>
+            </a:r>
+            <a:r>
+              <a:rPr lang="en-US" sz="1400" dirty="0">
                 <a:solidFill>
                   <a:srgbClr val="00B050"/>
                 </a:solidFill>
               </a:rPr>
               <a:t>()</a:t>
             </a:r>
-            <a:endParaRPr lang="en-US" sz="1400" dirty="0">
-              <a:solidFill>
-                <a:srgbClr val="00B050"/>
-              </a:solidFill>
-            </a:endParaRPr>
           </a:p>
         </p:txBody>
       </p:sp>
@@ -5826,18 +5788,13 @@
           <a:p>
             <a:pPr algn="r"/>
             <a:r>
-              <a:rPr lang="en-US" sz="1400" dirty="0" smtClean="0">
+              <a:rPr lang="en-US" sz="1400" dirty="0">
                 <a:solidFill>
                   <a:srgbClr val="00B050"/>
                 </a:solidFill>
               </a:rPr>
               <a:t>Update status bar</a:t>
             </a:r>
-            <a:endParaRPr lang="en-US" sz="1400" dirty="0">
-              <a:solidFill>
-                <a:srgbClr val="00B050"/>
-              </a:solidFill>
-            </a:endParaRPr>
           </a:p>
         </p:txBody>
       </p:sp>
@@ -6027,7 +5984,7 @@
           <a:lstStyle/>
           <a:p>
             <a:r>
-              <a:rPr lang="en-US" sz="1400" dirty="0" smtClean="0">
+              <a:rPr lang="en-US" sz="1400" dirty="0">
                 <a:solidFill>
                   <a:schemeClr val="accent6">
                     <a:lumMod val="75000"/>
@@ -6037,7 +5994,7 @@
               <a:t>Save </a:t>
             </a:r>
             <a:br>
-              <a:rPr lang="en-US" sz="1400" dirty="0" smtClean="0">
+              <a:rPr lang="en-US" sz="1400" dirty="0">
                 <a:solidFill>
                   <a:schemeClr val="accent6">
                     <a:lumMod val="75000"/>
@@ -6046,7 +6003,7 @@
               </a:rPr>
             </a:br>
             <a:r>
-              <a:rPr lang="en-US" sz="1400" dirty="0" smtClean="0">
+              <a:rPr lang="en-US" sz="1400" dirty="0">
                 <a:solidFill>
                   <a:schemeClr val="accent6">
                     <a:lumMod val="75000"/>
@@ -6055,13 +6012,6 @@
               </a:rPr>
               <a:t>to file</a:t>
             </a:r>
-            <a:endParaRPr lang="en-US" sz="1400" dirty="0">
-              <a:solidFill>
-                <a:schemeClr val="accent6">
-                  <a:lumMod val="75000"/>
-                </a:schemeClr>
-              </a:solidFill>
-            </a:endParaRPr>
           </a:p>
         </p:txBody>
       </p:sp>

</xml_diff>

<commit_message>
update sequential diagram for playlist del command
</commit_message>
<xml_diff>
--- a/docs/diagrams/HighLevelSequenceDiagrams.pptx
+++ b/docs/diagrams/HighLevelSequenceDiagrams.pptx
@@ -208,7 +208,7 @@
           <a:p>
             <a:fld id="{F5CC4B3F-88C1-4FFA-B1B6-F41C21DC6924}" type="datetimeFigureOut">
               <a:rPr lang="en-US" smtClean="0"/>
-              <a:t>10/31/18</a:t>
+              <a:t>11/10/18</a:t>
             </a:fld>
             <a:endParaRPr lang="en-US"/>
           </a:p>
@@ -654,7 +654,7 @@
           <a:p>
             <a:fld id="{78C97017-6FC3-485B-9764-EAC9E56C1D49}" type="datetimeFigureOut">
               <a:rPr lang="en-US" smtClean="0"/>
-              <a:t>10/31/18</a:t>
+              <a:t>11/10/18</a:t>
             </a:fld>
             <a:endParaRPr lang="en-US"/>
           </a:p>
@@ -822,7 +822,7 @@
           <a:p>
             <a:fld id="{78C97017-6FC3-485B-9764-EAC9E56C1D49}" type="datetimeFigureOut">
               <a:rPr lang="en-US" smtClean="0"/>
-              <a:t>10/31/18</a:t>
+              <a:t>11/10/18</a:t>
             </a:fld>
             <a:endParaRPr lang="en-US"/>
           </a:p>
@@ -1000,7 +1000,7 @@
           <a:p>
             <a:fld id="{78C97017-6FC3-485B-9764-EAC9E56C1D49}" type="datetimeFigureOut">
               <a:rPr lang="en-US" smtClean="0"/>
-              <a:t>10/31/18</a:t>
+              <a:t>11/10/18</a:t>
             </a:fld>
             <a:endParaRPr lang="en-US"/>
           </a:p>
@@ -1168,7 +1168,7 @@
           <a:p>
             <a:fld id="{78C97017-6FC3-485B-9764-EAC9E56C1D49}" type="datetimeFigureOut">
               <a:rPr lang="en-US" smtClean="0"/>
-              <a:t>10/31/18</a:t>
+              <a:t>11/10/18</a:t>
             </a:fld>
             <a:endParaRPr lang="en-US"/>
           </a:p>
@@ -1413,7 +1413,7 @@
           <a:p>
             <a:fld id="{78C97017-6FC3-485B-9764-EAC9E56C1D49}" type="datetimeFigureOut">
               <a:rPr lang="en-US" smtClean="0"/>
-              <a:t>10/31/18</a:t>
+              <a:t>11/10/18</a:t>
             </a:fld>
             <a:endParaRPr lang="en-US"/>
           </a:p>
@@ -1698,7 +1698,7 @@
           <a:p>
             <a:fld id="{78C97017-6FC3-485B-9764-EAC9E56C1D49}" type="datetimeFigureOut">
               <a:rPr lang="en-US" smtClean="0"/>
-              <a:t>10/31/18</a:t>
+              <a:t>11/10/18</a:t>
             </a:fld>
             <a:endParaRPr lang="en-US"/>
           </a:p>
@@ -2117,7 +2117,7 @@
           <a:p>
             <a:fld id="{78C97017-6FC3-485B-9764-EAC9E56C1D49}" type="datetimeFigureOut">
               <a:rPr lang="en-US" smtClean="0"/>
-              <a:t>10/31/18</a:t>
+              <a:t>11/10/18</a:t>
             </a:fld>
             <a:endParaRPr lang="en-US"/>
           </a:p>
@@ -2234,7 +2234,7 @@
           <a:p>
             <a:fld id="{78C97017-6FC3-485B-9764-EAC9E56C1D49}" type="datetimeFigureOut">
               <a:rPr lang="en-US" smtClean="0"/>
-              <a:t>10/31/18</a:t>
+              <a:t>11/10/18</a:t>
             </a:fld>
             <a:endParaRPr lang="en-US"/>
           </a:p>
@@ -2329,7 +2329,7 @@
           <a:p>
             <a:fld id="{78C97017-6FC3-485B-9764-EAC9E56C1D49}" type="datetimeFigureOut">
               <a:rPr lang="en-US" smtClean="0"/>
-              <a:t>10/31/18</a:t>
+              <a:t>11/10/18</a:t>
             </a:fld>
             <a:endParaRPr lang="en-US"/>
           </a:p>
@@ -2604,7 +2604,7 @@
           <a:p>
             <a:fld id="{78C97017-6FC3-485B-9764-EAC9E56C1D49}" type="datetimeFigureOut">
               <a:rPr lang="en-US" smtClean="0"/>
-              <a:t>10/31/18</a:t>
+              <a:t>11/10/18</a:t>
             </a:fld>
             <a:endParaRPr lang="en-US"/>
           </a:p>
@@ -2856,7 +2856,7 @@
           <a:p>
             <a:fld id="{78C97017-6FC3-485B-9764-EAC9E56C1D49}" type="datetimeFigureOut">
               <a:rPr lang="en-US" smtClean="0"/>
-              <a:t>10/31/18</a:t>
+              <a:t>11/10/18</a:t>
             </a:fld>
             <a:endParaRPr lang="en-US"/>
           </a:p>
@@ -3067,7 +3067,7 @@
           <a:p>
             <a:fld id="{78C97017-6FC3-485B-9764-EAC9E56C1D49}" type="datetimeFigureOut">
               <a:rPr lang="en-US" smtClean="0"/>
-              <a:t>10/31/18</a:t>
+              <a:t>11/10/18</a:t>
             </a:fld>
             <a:endParaRPr lang="en-US"/>
           </a:p>
@@ -4160,7 +4160,7 @@
           <a:p>
             <a:r>
               <a:rPr lang="en-US" sz="1400" dirty="0"/>
-              <a:t>playlist del p/Fav</a:t>
+              <a:t>playlist del 1</a:t>
             </a:r>
           </a:p>
         </p:txBody>
@@ -4229,7 +4229,7 @@
                   <a:srgbClr val="0070C0"/>
                 </a:solidFill>
               </a:rPr>
-              <a:t>execute(“playlist del p/Fav”)</a:t>
+              <a:t>execute(“playlist del 1”)</a:t>
             </a:r>
           </a:p>
         </p:txBody>
@@ -4306,7 +4306,7 @@
                   <a:srgbClr val="7030A0"/>
                 </a:solidFill>
               </a:rPr>
-              <a:t>(Fav)</a:t>
+              <a:t>(1)</a:t>
             </a:r>
           </a:p>
         </p:txBody>

</xml_diff>

<commit_message>
Updated SDforDeletePerson.png and SDforDeletePersonEventHandling.png
</commit_message>
<xml_diff>
--- a/docs/diagrams/HighLevelSequenceDiagrams.pptx
+++ b/docs/diagrams/HighLevelSequenceDiagrams.pptx
@@ -107,6 +107,22 @@
       </a:defRPr>
     </a:lvl9pPr>
   </p:defaultTextStyle>
+  <p:extLst>
+    <p:ext uri="{EFAFB233-063F-42B5-8137-9DF3F51BA10A}">
+      <p15:sldGuideLst xmlns:p15="http://schemas.microsoft.com/office/powerpoint/2012/main">
+        <p15:guide id="1" orient="horz" pos="1488">
+          <p15:clr>
+            <a:srgbClr val="A4A3A4"/>
+          </p15:clr>
+        </p15:guide>
+        <p15:guide id="2" pos="2880">
+          <p15:clr>
+            <a:srgbClr val="A4A3A4"/>
+          </p15:clr>
+        </p15:guide>
+      </p15:sldGuideLst>
+    </p:ext>
+  </p:extLst>
 </p:presentation>
 </file>
 
@@ -192,7 +208,7 @@
           <a:p>
             <a:fld id="{F5CC4B3F-88C1-4FFA-B1B6-F41C21DC6924}" type="datetimeFigureOut">
               <a:rPr lang="en-US" smtClean="0"/>
-              <a:t>10/16/2016</a:t>
+              <a:t>11/11/18</a:t>
             </a:fld>
             <a:endParaRPr lang="en-US"/>
           </a:p>
@@ -256,38 +272,37 @@
           <a:p>
             <a:pPr lvl="0"/>
             <a:r>
-              <a:rPr lang="en-US" smtClean="0"/>
+              <a:rPr lang="en-US"/>
               <a:t>Click to edit Master text styles</a:t>
             </a:r>
           </a:p>
           <a:p>
             <a:pPr lvl="1"/>
             <a:r>
-              <a:rPr lang="en-US" smtClean="0"/>
+              <a:rPr lang="en-US"/>
               <a:t>Second level</a:t>
             </a:r>
           </a:p>
           <a:p>
             <a:pPr lvl="2"/>
             <a:r>
-              <a:rPr lang="en-US" smtClean="0"/>
+              <a:rPr lang="en-US"/>
               <a:t>Third level</a:t>
             </a:r>
           </a:p>
           <a:p>
             <a:pPr lvl="3"/>
             <a:r>
-              <a:rPr lang="en-US" smtClean="0"/>
+              <a:rPr lang="en-US"/>
               <a:t>Fourth level</a:t>
             </a:r>
           </a:p>
           <a:p>
             <a:pPr lvl="4"/>
             <a:r>
-              <a:rPr lang="en-US" smtClean="0"/>
+              <a:rPr lang="en-US"/>
               <a:t>Fifth level</a:t>
             </a:r>
-            <a:endParaRPr lang="en-US"/>
           </a:p>
         </p:txBody>
       </p:sp>
@@ -498,10 +513,9 @@
           <a:lstStyle/>
           <a:p>
             <a:r>
-              <a:rPr lang="en-US" smtClean="0"/>
+              <a:rPr lang="en-US"/>
               <a:t>Click to edit Master title style</a:t>
             </a:r>
-            <a:endParaRPr lang="en-US"/>
           </a:p>
         </p:txBody>
       </p:sp>
@@ -617,10 +631,9 @@
           </a:lstStyle>
           <a:p>
             <a:r>
-              <a:rPr lang="en-US" smtClean="0"/>
+              <a:rPr lang="en-US"/>
               <a:t>Click to edit Master subtitle style</a:t>
             </a:r>
-            <a:endParaRPr lang="en-US"/>
           </a:p>
         </p:txBody>
       </p:sp>
@@ -641,7 +654,7 @@
           <a:p>
             <a:fld id="{78C97017-6FC3-485B-9764-EAC9E56C1D49}" type="datetimeFigureOut">
               <a:rPr lang="en-US" smtClean="0"/>
-              <a:t>10/16/2016</a:t>
+              <a:t>11/11/18</a:t>
             </a:fld>
             <a:endParaRPr lang="en-US"/>
           </a:p>
@@ -735,10 +748,9 @@
           <a:lstStyle/>
           <a:p>
             <a:r>
-              <a:rPr lang="en-US" smtClean="0"/>
+              <a:rPr lang="en-US"/>
               <a:t>Click to edit Master title style</a:t>
             </a:r>
-            <a:endParaRPr lang="en-US"/>
           </a:p>
         </p:txBody>
       </p:sp>
@@ -759,38 +771,37 @@
           <a:p>
             <a:pPr lvl="0"/>
             <a:r>
-              <a:rPr lang="en-US" smtClean="0"/>
+              <a:rPr lang="en-US"/>
               <a:t>Click to edit Master text styles</a:t>
             </a:r>
           </a:p>
           <a:p>
             <a:pPr lvl="1"/>
             <a:r>
-              <a:rPr lang="en-US" smtClean="0"/>
+              <a:rPr lang="en-US"/>
               <a:t>Second level</a:t>
             </a:r>
           </a:p>
           <a:p>
             <a:pPr lvl="2"/>
             <a:r>
-              <a:rPr lang="en-US" smtClean="0"/>
+              <a:rPr lang="en-US"/>
               <a:t>Third level</a:t>
             </a:r>
           </a:p>
           <a:p>
             <a:pPr lvl="3"/>
             <a:r>
-              <a:rPr lang="en-US" smtClean="0"/>
+              <a:rPr lang="en-US"/>
               <a:t>Fourth level</a:t>
             </a:r>
           </a:p>
           <a:p>
             <a:pPr lvl="4"/>
             <a:r>
-              <a:rPr lang="en-US" smtClean="0"/>
+              <a:rPr lang="en-US"/>
               <a:t>Fifth level</a:t>
             </a:r>
-            <a:endParaRPr lang="en-US"/>
           </a:p>
         </p:txBody>
       </p:sp>
@@ -811,7 +822,7 @@
           <a:p>
             <a:fld id="{78C97017-6FC3-485B-9764-EAC9E56C1D49}" type="datetimeFigureOut">
               <a:rPr lang="en-US" smtClean="0"/>
-              <a:t>10/16/2016</a:t>
+              <a:t>11/11/18</a:t>
             </a:fld>
             <a:endParaRPr lang="en-US"/>
           </a:p>
@@ -910,10 +921,9 @@
           <a:lstStyle/>
           <a:p>
             <a:r>
-              <a:rPr lang="en-US" smtClean="0"/>
+              <a:rPr lang="en-US"/>
               <a:t>Click to edit Master title style</a:t>
             </a:r>
-            <a:endParaRPr lang="en-US"/>
           </a:p>
         </p:txBody>
       </p:sp>
@@ -939,38 +949,37 @@
           <a:p>
             <a:pPr lvl="0"/>
             <a:r>
-              <a:rPr lang="en-US" smtClean="0"/>
+              <a:rPr lang="en-US"/>
               <a:t>Click to edit Master text styles</a:t>
             </a:r>
           </a:p>
           <a:p>
             <a:pPr lvl="1"/>
             <a:r>
-              <a:rPr lang="en-US" smtClean="0"/>
+              <a:rPr lang="en-US"/>
               <a:t>Second level</a:t>
             </a:r>
           </a:p>
           <a:p>
             <a:pPr lvl="2"/>
             <a:r>
-              <a:rPr lang="en-US" smtClean="0"/>
+              <a:rPr lang="en-US"/>
               <a:t>Third level</a:t>
             </a:r>
           </a:p>
           <a:p>
             <a:pPr lvl="3"/>
             <a:r>
-              <a:rPr lang="en-US" smtClean="0"/>
+              <a:rPr lang="en-US"/>
               <a:t>Fourth level</a:t>
             </a:r>
           </a:p>
           <a:p>
             <a:pPr lvl="4"/>
             <a:r>
-              <a:rPr lang="en-US" smtClean="0"/>
+              <a:rPr lang="en-US"/>
               <a:t>Fifth level</a:t>
             </a:r>
-            <a:endParaRPr lang="en-US"/>
           </a:p>
         </p:txBody>
       </p:sp>
@@ -991,7 +1000,7 @@
           <a:p>
             <a:fld id="{78C97017-6FC3-485B-9764-EAC9E56C1D49}" type="datetimeFigureOut">
               <a:rPr lang="en-US" smtClean="0"/>
-              <a:t>10/16/2016</a:t>
+              <a:t>11/11/18</a:t>
             </a:fld>
             <a:endParaRPr lang="en-US"/>
           </a:p>
@@ -1085,10 +1094,9 @@
           <a:lstStyle/>
           <a:p>
             <a:r>
-              <a:rPr lang="en-US" smtClean="0"/>
+              <a:rPr lang="en-US"/>
               <a:t>Click to edit Master title style</a:t>
             </a:r>
-            <a:endParaRPr lang="en-US"/>
           </a:p>
         </p:txBody>
       </p:sp>
@@ -1109,38 +1117,37 @@
           <a:p>
             <a:pPr lvl="0"/>
             <a:r>
-              <a:rPr lang="en-US" smtClean="0"/>
+              <a:rPr lang="en-US"/>
               <a:t>Click to edit Master text styles</a:t>
             </a:r>
           </a:p>
           <a:p>
             <a:pPr lvl="1"/>
             <a:r>
-              <a:rPr lang="en-US" smtClean="0"/>
+              <a:rPr lang="en-US"/>
               <a:t>Second level</a:t>
             </a:r>
           </a:p>
           <a:p>
             <a:pPr lvl="2"/>
             <a:r>
-              <a:rPr lang="en-US" smtClean="0"/>
+              <a:rPr lang="en-US"/>
               <a:t>Third level</a:t>
             </a:r>
           </a:p>
           <a:p>
             <a:pPr lvl="3"/>
             <a:r>
-              <a:rPr lang="en-US" smtClean="0"/>
+              <a:rPr lang="en-US"/>
               <a:t>Fourth level</a:t>
             </a:r>
           </a:p>
           <a:p>
             <a:pPr lvl="4"/>
             <a:r>
-              <a:rPr lang="en-US" smtClean="0"/>
+              <a:rPr lang="en-US"/>
               <a:t>Fifth level</a:t>
             </a:r>
-            <a:endParaRPr lang="en-US"/>
           </a:p>
         </p:txBody>
       </p:sp>
@@ -1161,7 +1168,7 @@
           <a:p>
             <a:fld id="{78C97017-6FC3-485B-9764-EAC9E56C1D49}" type="datetimeFigureOut">
               <a:rPr lang="en-US" smtClean="0"/>
-              <a:t>10/16/2016</a:t>
+              <a:t>11/11/18</a:t>
             </a:fld>
             <a:endParaRPr lang="en-US"/>
           </a:p>
@@ -1264,10 +1271,9 @@
           </a:lstStyle>
           <a:p>
             <a:r>
-              <a:rPr lang="en-US" smtClean="0"/>
+              <a:rPr lang="en-US"/>
               <a:t>Click to edit Master title style</a:t>
             </a:r>
-            <a:endParaRPr lang="en-US"/>
           </a:p>
         </p:txBody>
       </p:sp>
@@ -1384,7 +1390,7 @@
           <a:p>
             <a:pPr lvl="0"/>
             <a:r>
-              <a:rPr lang="en-US" smtClean="0"/>
+              <a:rPr lang="en-US"/>
               <a:t>Click to edit Master text styles</a:t>
             </a:r>
           </a:p>
@@ -1407,7 +1413,7 @@
           <a:p>
             <a:fld id="{78C97017-6FC3-485B-9764-EAC9E56C1D49}" type="datetimeFigureOut">
               <a:rPr lang="en-US" smtClean="0"/>
-              <a:t>10/16/2016</a:t>
+              <a:t>11/11/18</a:t>
             </a:fld>
             <a:endParaRPr lang="en-US"/>
           </a:p>
@@ -1501,10 +1507,9 @@
           <a:lstStyle/>
           <a:p>
             <a:r>
-              <a:rPr lang="en-US" smtClean="0"/>
+              <a:rPr lang="en-US"/>
               <a:t>Click to edit Master title style</a:t>
             </a:r>
-            <a:endParaRPr lang="en-US"/>
           </a:p>
         </p:txBody>
       </p:sp>
@@ -1558,38 +1563,37 @@
           <a:p>
             <a:pPr lvl="0"/>
             <a:r>
-              <a:rPr lang="en-US" smtClean="0"/>
+              <a:rPr lang="en-US"/>
               <a:t>Click to edit Master text styles</a:t>
             </a:r>
           </a:p>
           <a:p>
             <a:pPr lvl="1"/>
             <a:r>
-              <a:rPr lang="en-US" smtClean="0"/>
+              <a:rPr lang="en-US"/>
               <a:t>Second level</a:t>
             </a:r>
           </a:p>
           <a:p>
             <a:pPr lvl="2"/>
             <a:r>
-              <a:rPr lang="en-US" smtClean="0"/>
+              <a:rPr lang="en-US"/>
               <a:t>Third level</a:t>
             </a:r>
           </a:p>
           <a:p>
             <a:pPr lvl="3"/>
             <a:r>
-              <a:rPr lang="en-US" smtClean="0"/>
+              <a:rPr lang="en-US"/>
               <a:t>Fourth level</a:t>
             </a:r>
           </a:p>
           <a:p>
             <a:pPr lvl="4"/>
             <a:r>
-              <a:rPr lang="en-US" smtClean="0"/>
+              <a:rPr lang="en-US"/>
               <a:t>Fifth level</a:t>
             </a:r>
-            <a:endParaRPr lang="en-US"/>
           </a:p>
         </p:txBody>
       </p:sp>
@@ -1643,38 +1647,37 @@
           <a:p>
             <a:pPr lvl="0"/>
             <a:r>
-              <a:rPr lang="en-US" smtClean="0"/>
+              <a:rPr lang="en-US"/>
               <a:t>Click to edit Master text styles</a:t>
             </a:r>
           </a:p>
           <a:p>
             <a:pPr lvl="1"/>
             <a:r>
-              <a:rPr lang="en-US" smtClean="0"/>
+              <a:rPr lang="en-US"/>
               <a:t>Second level</a:t>
             </a:r>
           </a:p>
           <a:p>
             <a:pPr lvl="2"/>
             <a:r>
-              <a:rPr lang="en-US" smtClean="0"/>
+              <a:rPr lang="en-US"/>
               <a:t>Third level</a:t>
             </a:r>
           </a:p>
           <a:p>
             <a:pPr lvl="3"/>
             <a:r>
-              <a:rPr lang="en-US" smtClean="0"/>
+              <a:rPr lang="en-US"/>
               <a:t>Fourth level</a:t>
             </a:r>
           </a:p>
           <a:p>
             <a:pPr lvl="4"/>
             <a:r>
-              <a:rPr lang="en-US" smtClean="0"/>
+              <a:rPr lang="en-US"/>
               <a:t>Fifth level</a:t>
             </a:r>
-            <a:endParaRPr lang="en-US"/>
           </a:p>
         </p:txBody>
       </p:sp>
@@ -1695,7 +1698,7 @@
           <a:p>
             <a:fld id="{78C97017-6FC3-485B-9764-EAC9E56C1D49}" type="datetimeFigureOut">
               <a:rPr lang="en-US" smtClean="0"/>
-              <a:t>10/16/2016</a:t>
+              <a:t>11/11/18</a:t>
             </a:fld>
             <a:endParaRPr lang="en-US"/>
           </a:p>
@@ -1793,10 +1796,9 @@
           </a:lstStyle>
           <a:p>
             <a:r>
-              <a:rPr lang="en-US" smtClean="0"/>
+              <a:rPr lang="en-US"/>
               <a:t>Click to edit Master title style</a:t>
             </a:r>
-            <a:endParaRPr lang="en-US"/>
           </a:p>
         </p:txBody>
       </p:sp>
@@ -1859,7 +1861,7 @@
           <a:p>
             <a:pPr lvl="0"/>
             <a:r>
-              <a:rPr lang="en-US" smtClean="0"/>
+              <a:rPr lang="en-US"/>
               <a:t>Click to edit Master text styles</a:t>
             </a:r>
           </a:p>
@@ -1915,38 +1917,37 @@
           <a:p>
             <a:pPr lvl="0"/>
             <a:r>
-              <a:rPr lang="en-US" smtClean="0"/>
+              <a:rPr lang="en-US"/>
               <a:t>Click to edit Master text styles</a:t>
             </a:r>
           </a:p>
           <a:p>
             <a:pPr lvl="1"/>
             <a:r>
-              <a:rPr lang="en-US" smtClean="0"/>
+              <a:rPr lang="en-US"/>
               <a:t>Second level</a:t>
             </a:r>
           </a:p>
           <a:p>
             <a:pPr lvl="2"/>
             <a:r>
-              <a:rPr lang="en-US" smtClean="0"/>
+              <a:rPr lang="en-US"/>
               <a:t>Third level</a:t>
             </a:r>
           </a:p>
           <a:p>
             <a:pPr lvl="3"/>
             <a:r>
-              <a:rPr lang="en-US" smtClean="0"/>
+              <a:rPr lang="en-US"/>
               <a:t>Fourth level</a:t>
             </a:r>
           </a:p>
           <a:p>
             <a:pPr lvl="4"/>
             <a:r>
-              <a:rPr lang="en-US" smtClean="0"/>
+              <a:rPr lang="en-US"/>
               <a:t>Fifth level</a:t>
             </a:r>
-            <a:endParaRPr lang="en-US"/>
           </a:p>
         </p:txBody>
       </p:sp>
@@ -2009,7 +2010,7 @@
           <a:p>
             <a:pPr lvl="0"/>
             <a:r>
-              <a:rPr lang="en-US" smtClean="0"/>
+              <a:rPr lang="en-US"/>
               <a:t>Click to edit Master text styles</a:t>
             </a:r>
           </a:p>
@@ -2065,38 +2066,37 @@
           <a:p>
             <a:pPr lvl="0"/>
             <a:r>
-              <a:rPr lang="en-US" smtClean="0"/>
+              <a:rPr lang="en-US"/>
               <a:t>Click to edit Master text styles</a:t>
             </a:r>
           </a:p>
           <a:p>
             <a:pPr lvl="1"/>
             <a:r>
-              <a:rPr lang="en-US" smtClean="0"/>
+              <a:rPr lang="en-US"/>
               <a:t>Second level</a:t>
             </a:r>
           </a:p>
           <a:p>
             <a:pPr lvl="2"/>
             <a:r>
-              <a:rPr lang="en-US" smtClean="0"/>
+              <a:rPr lang="en-US"/>
               <a:t>Third level</a:t>
             </a:r>
           </a:p>
           <a:p>
             <a:pPr lvl="3"/>
             <a:r>
-              <a:rPr lang="en-US" smtClean="0"/>
+              <a:rPr lang="en-US"/>
               <a:t>Fourth level</a:t>
             </a:r>
           </a:p>
           <a:p>
             <a:pPr lvl="4"/>
             <a:r>
-              <a:rPr lang="en-US" smtClean="0"/>
+              <a:rPr lang="en-US"/>
               <a:t>Fifth level</a:t>
             </a:r>
-            <a:endParaRPr lang="en-US"/>
           </a:p>
         </p:txBody>
       </p:sp>
@@ -2117,7 +2117,7 @@
           <a:p>
             <a:fld id="{78C97017-6FC3-485B-9764-EAC9E56C1D49}" type="datetimeFigureOut">
               <a:rPr lang="en-US" smtClean="0"/>
-              <a:t>10/16/2016</a:t>
+              <a:t>11/11/18</a:t>
             </a:fld>
             <a:endParaRPr lang="en-US"/>
           </a:p>
@@ -2211,10 +2211,9 @@
           <a:lstStyle/>
           <a:p>
             <a:r>
-              <a:rPr lang="en-US" smtClean="0"/>
+              <a:rPr lang="en-US"/>
               <a:t>Click to edit Master title style</a:t>
             </a:r>
-            <a:endParaRPr lang="en-US"/>
           </a:p>
         </p:txBody>
       </p:sp>
@@ -2235,7 +2234,7 @@
           <a:p>
             <a:fld id="{78C97017-6FC3-485B-9764-EAC9E56C1D49}" type="datetimeFigureOut">
               <a:rPr lang="en-US" smtClean="0"/>
-              <a:t>10/16/2016</a:t>
+              <a:t>11/11/18</a:t>
             </a:fld>
             <a:endParaRPr lang="en-US"/>
           </a:p>
@@ -2330,7 +2329,7 @@
           <a:p>
             <a:fld id="{78C97017-6FC3-485B-9764-EAC9E56C1D49}" type="datetimeFigureOut">
               <a:rPr lang="en-US" smtClean="0"/>
-              <a:t>10/16/2016</a:t>
+              <a:t>11/11/18</a:t>
             </a:fld>
             <a:endParaRPr lang="en-US"/>
           </a:p>
@@ -2433,10 +2432,9 @@
           </a:lstStyle>
           <a:p>
             <a:r>
-              <a:rPr lang="en-US" smtClean="0"/>
+              <a:rPr lang="en-US"/>
               <a:t>Click to edit Master title style</a:t>
             </a:r>
-            <a:endParaRPr lang="en-US"/>
           </a:p>
         </p:txBody>
       </p:sp>
@@ -2490,38 +2488,37 @@
           <a:p>
             <a:pPr lvl="0"/>
             <a:r>
-              <a:rPr lang="en-US" smtClean="0"/>
+              <a:rPr lang="en-US"/>
               <a:t>Click to edit Master text styles</a:t>
             </a:r>
           </a:p>
           <a:p>
             <a:pPr lvl="1"/>
             <a:r>
-              <a:rPr lang="en-US" smtClean="0"/>
+              <a:rPr lang="en-US"/>
               <a:t>Second level</a:t>
             </a:r>
           </a:p>
           <a:p>
             <a:pPr lvl="2"/>
             <a:r>
-              <a:rPr lang="en-US" smtClean="0"/>
+              <a:rPr lang="en-US"/>
               <a:t>Third level</a:t>
             </a:r>
           </a:p>
           <a:p>
             <a:pPr lvl="3"/>
             <a:r>
-              <a:rPr lang="en-US" smtClean="0"/>
+              <a:rPr lang="en-US"/>
               <a:t>Fourth level</a:t>
             </a:r>
           </a:p>
           <a:p>
             <a:pPr lvl="4"/>
             <a:r>
-              <a:rPr lang="en-US" smtClean="0"/>
+              <a:rPr lang="en-US"/>
               <a:t>Fifth level</a:t>
             </a:r>
-            <a:endParaRPr lang="en-US"/>
           </a:p>
         </p:txBody>
       </p:sp>
@@ -2584,7 +2581,7 @@
           <a:p>
             <a:pPr lvl="0"/>
             <a:r>
-              <a:rPr lang="en-US" smtClean="0"/>
+              <a:rPr lang="en-US"/>
               <a:t>Click to edit Master text styles</a:t>
             </a:r>
           </a:p>
@@ -2607,7 +2604,7 @@
           <a:p>
             <a:fld id="{78C97017-6FC3-485B-9764-EAC9E56C1D49}" type="datetimeFigureOut">
               <a:rPr lang="en-US" smtClean="0"/>
-              <a:t>10/16/2016</a:t>
+              <a:t>11/11/18</a:t>
             </a:fld>
             <a:endParaRPr lang="en-US"/>
           </a:p>
@@ -2710,10 +2707,9 @@
           </a:lstStyle>
           <a:p>
             <a:r>
-              <a:rPr lang="en-US" smtClean="0"/>
+              <a:rPr lang="en-US"/>
               <a:t>Click to edit Master title style</a:t>
             </a:r>
-            <a:endParaRPr lang="en-US"/>
           </a:p>
         </p:txBody>
       </p:sp>
@@ -2837,7 +2833,7 @@
           <a:p>
             <a:pPr lvl="0"/>
             <a:r>
-              <a:rPr lang="en-US" smtClean="0"/>
+              <a:rPr lang="en-US"/>
               <a:t>Click to edit Master text styles</a:t>
             </a:r>
           </a:p>
@@ -2860,7 +2856,7 @@
           <a:p>
             <a:fld id="{78C97017-6FC3-485B-9764-EAC9E56C1D49}" type="datetimeFigureOut">
               <a:rPr lang="en-US" smtClean="0"/>
-              <a:t>10/16/2016</a:t>
+              <a:t>11/11/18</a:t>
             </a:fld>
             <a:endParaRPr lang="en-US"/>
           </a:p>
@@ -2969,10 +2965,9 @@
           <a:lstStyle/>
           <a:p>
             <a:r>
-              <a:rPr lang="en-US" smtClean="0"/>
+              <a:rPr lang="en-US"/>
               <a:t>Click to edit Master title style</a:t>
             </a:r>
-            <a:endParaRPr lang="en-US"/>
           </a:p>
         </p:txBody>
       </p:sp>
@@ -3003,38 +2998,37 @@
           <a:p>
             <a:pPr lvl="0"/>
             <a:r>
-              <a:rPr lang="en-US" smtClean="0"/>
+              <a:rPr lang="en-US"/>
               <a:t>Click to edit Master text styles</a:t>
             </a:r>
           </a:p>
           <a:p>
             <a:pPr lvl="1"/>
             <a:r>
-              <a:rPr lang="en-US" smtClean="0"/>
+              <a:rPr lang="en-US"/>
               <a:t>Second level</a:t>
             </a:r>
           </a:p>
           <a:p>
             <a:pPr lvl="2"/>
             <a:r>
-              <a:rPr lang="en-US" smtClean="0"/>
+              <a:rPr lang="en-US"/>
               <a:t>Third level</a:t>
             </a:r>
           </a:p>
           <a:p>
             <a:pPr lvl="3"/>
             <a:r>
-              <a:rPr lang="en-US" smtClean="0"/>
+              <a:rPr lang="en-US"/>
               <a:t>Fourth level</a:t>
             </a:r>
           </a:p>
           <a:p>
             <a:pPr lvl="4"/>
             <a:r>
-              <a:rPr lang="en-US" smtClean="0"/>
+              <a:rPr lang="en-US"/>
               <a:t>Fifth level</a:t>
             </a:r>
-            <a:endParaRPr lang="en-US"/>
           </a:p>
         </p:txBody>
       </p:sp>
@@ -3073,7 +3067,7 @@
           <a:p>
             <a:fld id="{78C97017-6FC3-485B-9764-EAC9E56C1D49}" type="datetimeFigureOut">
               <a:rPr lang="en-US" smtClean="0"/>
-              <a:t>10/16/2016</a:t>
+              <a:t>11/11/18</a:t>
             </a:fld>
             <a:endParaRPr lang="en-US"/>
           </a:p>
@@ -3492,7 +3486,7 @@
           <a:p>
             <a:pPr algn="ctr"/>
             <a:r>
-              <a:rPr lang="en-US" sz="1600" dirty="0" smtClean="0">
+              <a:rPr lang="en-US" sz="1600" dirty="0">
                 <a:solidFill>
                   <a:schemeClr val="bg1"/>
                 </a:solidFill>
@@ -3856,7 +3850,7 @@
           <a:p>
             <a:pPr algn="ctr"/>
             <a:r>
-              <a:rPr lang="en-US" sz="1600" dirty="0" smtClean="0">
+              <a:rPr lang="en-US" sz="1600" dirty="0">
                 <a:solidFill>
                   <a:schemeClr val="bg1"/>
                 </a:solidFill>
@@ -4003,7 +3997,7 @@
           <a:p>
             <a:pPr algn="ctr"/>
             <a:r>
-              <a:rPr lang="en-US" sz="1600" dirty="0" smtClean="0">
+              <a:rPr lang="en-US" sz="1600" dirty="0">
                 <a:solidFill>
                   <a:schemeClr val="bg1"/>
                 </a:solidFill>
@@ -4150,8 +4144,8 @@
         </p:nvSpPr>
         <p:spPr>
           <a:xfrm>
-            <a:off x="466818" y="1345880"/>
-            <a:ext cx="860170" cy="215444"/>
+            <a:off x="374250" y="1345880"/>
+            <a:ext cx="1242318" cy="430887"/>
           </a:xfrm>
           <a:prstGeom prst="rect">
             <a:avLst/>
@@ -4165,10 +4159,26 @@
           <a:lstStyle/>
           <a:p>
             <a:r>
-              <a:rPr lang="en-US" sz="1400" dirty="0" smtClean="0"/>
-              <a:t>delete 1</a:t>
-            </a:r>
-            <a:endParaRPr lang="en-US" sz="1400" dirty="0"/>
+              <a:rPr lang="en-US" sz="1400" dirty="0">
+                <a:solidFill>
+                  <a:srgbClr val="00B050"/>
+                </a:solidFill>
+              </a:rPr>
+              <a:t>delete </a:t>
+            </a:r>
+            <a:r>
+              <a:rPr lang="en-NZ" sz="1400" dirty="0">
+                <a:solidFill>
+                  <a:srgbClr val="00B050"/>
+                </a:solidFill>
+              </a:rPr>
+              <a:t>-t CS2103 -e 4 -z 2</a:t>
+            </a:r>
+            <a:endParaRPr lang="en-US" sz="1400" dirty="0">
+              <a:solidFill>
+                <a:srgbClr val="00B050"/>
+              </a:solidFill>
+            </a:endParaRPr>
           </a:p>
         </p:txBody>
       </p:sp>
@@ -4217,7 +4227,7 @@
         <p:spPr>
           <a:xfrm>
             <a:off x="2166172" y="1453379"/>
-            <a:ext cx="1424846" cy="215444"/>
+            <a:ext cx="1424846" cy="430887"/>
           </a:xfrm>
           <a:prstGeom prst="rect">
             <a:avLst/>
@@ -4231,18 +4241,29 @@
           <a:lstStyle/>
           <a:p>
             <a:r>
-              <a:rPr lang="en-US" sz="1400" dirty="0" smtClean="0">
+              <a:rPr lang="en-US" sz="1400" dirty="0">
                 <a:solidFill>
                   <a:srgbClr val="0070C0"/>
                 </a:solidFill>
               </a:rPr>
-              <a:t>execute(“delete 1”)</a:t>
-            </a:r>
-            <a:endParaRPr lang="en-US" sz="1400" dirty="0">
-              <a:solidFill>
-                <a:srgbClr val="0070C0"/>
-              </a:solidFill>
-            </a:endParaRPr>
+              <a:t>execute(“delete </a:t>
+            </a:r>
+            <a:r>
+              <a:rPr lang="en-NZ" sz="1400" dirty="0">
+                <a:solidFill>
+                  <a:srgbClr val="0070C0"/>
+                </a:solidFill>
+              </a:rPr>
+              <a:t>-t CS2103 -e 4 -z 2</a:t>
+            </a:r>
+            <a:r>
+              <a:rPr lang="en-US" sz="1400" dirty="0">
+                <a:solidFill>
+                  <a:srgbClr val="0070C0"/>
+                </a:solidFill>
+              </a:rPr>
+              <a:t>”)</a:t>
+            </a:r>
           </a:p>
         </p:txBody>
       </p:sp>
@@ -4290,8 +4311,8 @@
         </p:nvSpPr>
         <p:spPr>
           <a:xfrm>
-            <a:off x="4299772" y="1542583"/>
-            <a:ext cx="1424846" cy="215444"/>
+            <a:off x="4173782" y="1542583"/>
+            <a:ext cx="1550836" cy="430887"/>
           </a:xfrm>
           <a:prstGeom prst="rect">
             <a:avLst/>
@@ -4305,20 +4326,36 @@
           <a:lstStyle/>
           <a:p>
             <a:r>
-              <a:rPr lang="en-US" sz="1400" dirty="0" err="1" smtClean="0">
+              <a:rPr lang="en-NZ" sz="1400" dirty="0" err="1">
                 <a:solidFill>
                   <a:srgbClr val="7030A0"/>
                 </a:solidFill>
               </a:rPr>
-              <a:t>deletePerson</a:t>
-            </a:r>
-            <a:r>
-              <a:rPr lang="en-US" sz="1400" dirty="0" smtClean="0">
+              <a:t>model.deleteModule</a:t>
+            </a:r>
+            <a:r>
+              <a:rPr lang="en-NZ" sz="1400" dirty="0">
                 <a:solidFill>
                   <a:srgbClr val="7030A0"/>
                 </a:solidFill>
               </a:rPr>
-              <a:t>(p)</a:t>
+              <a:t>(</a:t>
+            </a:r>
+            <a:r>
+              <a:rPr lang="en-NZ" sz="1400" dirty="0" err="1">
+                <a:solidFill>
+                  <a:srgbClr val="7030A0"/>
+                </a:solidFill>
+              </a:rPr>
+              <a:t>targetModule</a:t>
+            </a:r>
+            <a:r>
+              <a:rPr lang="en-NZ" sz="1400" dirty="0">
+                <a:solidFill>
+                  <a:srgbClr val="7030A0"/>
+                </a:solidFill>
+              </a:rPr>
+              <a:t>)</a:t>
             </a:r>
             <a:endParaRPr lang="en-US" sz="1400" dirty="0">
               <a:solidFill>
@@ -4350,28 +4387,29 @@
           </a:bodyPr>
           <a:lstStyle/>
           <a:p>
-            <a:r>
-              <a:rPr lang="en-US" sz="1400" dirty="0" smtClean="0">
+            <a:pPr algn="r"/>
+            <a:r>
+              <a:rPr lang="en-NZ" sz="1400" dirty="0">
                 <a:solidFill>
                   <a:schemeClr val="accent5">
                     <a:lumMod val="75000"/>
                   </a:schemeClr>
                 </a:solidFill>
               </a:rPr>
-              <a:t>post(</a:t>
-            </a:r>
-            <a:r>
-              <a:rPr lang="en-US" sz="1400" dirty="0" err="1" smtClean="0">
+              <a:t>Post(</a:t>
+            </a:r>
+            <a:r>
+              <a:rPr lang="en-NZ" sz="1400" dirty="0" err="1">
                 <a:solidFill>
                   <a:schemeClr val="accent5">
                     <a:lumMod val="75000"/>
                   </a:schemeClr>
                 </a:solidFill>
               </a:rPr>
-              <a:t>AddressBookChangedEvent</a:t>
-            </a:r>
-            <a:r>
-              <a:rPr lang="en-US" sz="1400" dirty="0" smtClean="0">
+              <a:t>TranscriptChangedEvent</a:t>
+            </a:r>
+            <a:r>
+              <a:rPr lang="en-NZ" sz="1400" dirty="0">
                 <a:solidFill>
                   <a:schemeClr val="accent5">
                     <a:lumMod val="75000"/>
@@ -4552,7 +4590,7 @@
           <a:p>
             <a:pPr algn="ctr"/>
             <a:r>
-              <a:rPr lang="en-US" sz="1600" dirty="0" smtClean="0">
+              <a:rPr lang="en-US" sz="1600" dirty="0">
                 <a:solidFill>
                   <a:schemeClr val="bg1"/>
                 </a:solidFill>
@@ -4560,7 +4598,7 @@
               <a:t>:</a:t>
             </a:r>
             <a:r>
-              <a:rPr lang="en-US" sz="1600" dirty="0" err="1" smtClean="0">
+              <a:rPr lang="en-US" sz="1600" dirty="0" err="1">
                 <a:solidFill>
                   <a:schemeClr val="bg1"/>
                 </a:solidFill>
@@ -4793,7 +4831,7 @@
           <a:p>
             <a:pPr algn="ctr"/>
             <a:r>
-              <a:rPr lang="en-US" sz="1600" dirty="0" smtClean="0">
+              <a:rPr lang="en-US" sz="1600" dirty="0">
                 <a:solidFill>
                   <a:schemeClr val="bg1"/>
                 </a:solidFill>
@@ -4910,7 +4948,7 @@
         </p:nvSpPr>
         <p:spPr>
           <a:xfrm>
-            <a:off x="1810094" y="4797674"/>
+            <a:off x="1629698" y="4773588"/>
             <a:ext cx="2716635" cy="215444"/>
           </a:xfrm>
           <a:prstGeom prst="rect">
@@ -4924,8 +4962,9 @@
           </a:bodyPr>
           <a:lstStyle/>
           <a:p>
-            <a:r>
-              <a:rPr lang="en-US" sz="1400" dirty="0" smtClean="0">
+            <a:pPr algn="r"/>
+            <a:r>
+              <a:rPr lang="en-US" sz="1400" dirty="0">
                 <a:solidFill>
                   <a:schemeClr val="accent5">
                     <a:lumMod val="75000"/>
@@ -4935,17 +4974,17 @@
               <a:t>post(</a:t>
             </a:r>
             <a:r>
-              <a:rPr lang="en-US" sz="1400" dirty="0" err="1" smtClean="0">
+              <a:rPr lang="en-US" sz="1400" dirty="0" err="1">
                 <a:solidFill>
                   <a:schemeClr val="accent5">
                     <a:lumMod val="75000"/>
                   </a:schemeClr>
                 </a:solidFill>
               </a:rPr>
-              <a:t>AddressBookChangedEvent</a:t>
-            </a:r>
-            <a:r>
-              <a:rPr lang="en-US" sz="1400" dirty="0" smtClean="0">
+              <a:t>TranscriptChangedEvent</a:t>
+            </a:r>
+            <a:r>
+              <a:rPr lang="en-US" sz="1400" dirty="0">
                 <a:solidFill>
                   <a:schemeClr val="accent5">
                     <a:lumMod val="75000"/>
@@ -4954,13 +4993,6 @@
               </a:rPr>
               <a:t>)</a:t>
             </a:r>
-            <a:endParaRPr lang="en-US" sz="1400" dirty="0">
-              <a:solidFill>
-                <a:schemeClr val="accent5">
-                  <a:lumMod val="75000"/>
-                </a:schemeClr>
-              </a:solidFill>
-            </a:endParaRPr>
           </a:p>
         </p:txBody>
       </p:sp>
@@ -5052,7 +5084,7 @@
           <a:p>
             <a:pPr algn="ctr"/>
             <a:r>
-              <a:rPr lang="en-US" sz="1600" dirty="0" smtClean="0">
+              <a:rPr lang="en-US" sz="1600" dirty="0">
                 <a:solidFill>
                   <a:schemeClr val="bg1"/>
                 </a:solidFill>
@@ -5060,7 +5092,7 @@
               <a:t>:</a:t>
             </a:r>
             <a:r>
-              <a:rPr lang="en-US" sz="1600" dirty="0" err="1" smtClean="0">
+              <a:rPr lang="en-US" sz="1600" dirty="0" err="1">
                 <a:solidFill>
                   <a:schemeClr val="bg1"/>
                 </a:solidFill>
@@ -5307,17 +5339,17 @@
           <a:lstStyle/>
           <a:p>
             <a:r>
-              <a:rPr lang="en-US" sz="1400" dirty="0" err="1" smtClean="0">
+              <a:rPr lang="en-US" sz="1400" dirty="0" err="1">
                 <a:solidFill>
                   <a:schemeClr val="accent6">
                     <a:lumMod val="75000"/>
                   </a:schemeClr>
                 </a:solidFill>
               </a:rPr>
-              <a:t>handleAddresssBookChangedEvent</a:t>
-            </a:r>
-            <a:r>
-              <a:rPr lang="en-US" sz="1400" dirty="0" smtClean="0">
+              <a:t>handleTranscriptChangedEvent</a:t>
+            </a:r>
+            <a:r>
+              <a:rPr lang="en-US" sz="1400" dirty="0">
                 <a:solidFill>
                   <a:schemeClr val="accent6">
                     <a:lumMod val="75000"/>
@@ -5326,13 +5358,6 @@
               </a:rPr>
               <a:t>()</a:t>
             </a:r>
-            <a:endParaRPr lang="en-US" sz="1400" dirty="0">
-              <a:solidFill>
-                <a:schemeClr val="accent6">
-                  <a:lumMod val="75000"/>
-                </a:schemeClr>
-              </a:solidFill>
-            </a:endParaRPr>
           </a:p>
         </p:txBody>
       </p:sp>
@@ -5417,7 +5442,7 @@
           <a:p>
             <a:pPr algn="ctr"/>
             <a:r>
-              <a:rPr lang="en-US" sz="1600" dirty="0" smtClean="0">
+              <a:rPr lang="en-US" sz="1600" dirty="0">
                 <a:solidFill>
                   <a:schemeClr val="bg1"/>
                 </a:solidFill>
@@ -5620,26 +5645,21 @@
           <a:lstStyle/>
           <a:p>
             <a:r>
-              <a:rPr lang="en-US" sz="1400" dirty="0" err="1" smtClean="0">
+              <a:rPr lang="en-US" sz="1400" dirty="0" err="1">
                 <a:solidFill>
                   <a:srgbClr val="00B050"/>
                 </a:solidFill>
               </a:rPr>
-              <a:t>handleAddresssBookChangedEvent</a:t>
-            </a:r>
-            <a:r>
-              <a:rPr lang="en-US" sz="1400" dirty="0" smtClean="0">
+              <a:t>handleTranscriptChangedEvent</a:t>
+            </a:r>
+            <a:r>
+              <a:rPr lang="en-US" sz="1400" dirty="0">
                 <a:solidFill>
                   <a:srgbClr val="00B050"/>
                 </a:solidFill>
               </a:rPr>
               <a:t>()</a:t>
             </a:r>
-            <a:endParaRPr lang="en-US" sz="1400" dirty="0">
-              <a:solidFill>
-                <a:srgbClr val="00B050"/>
-              </a:solidFill>
-            </a:endParaRPr>
           </a:p>
         </p:txBody>
       </p:sp>
@@ -5826,18 +5846,13 @@
           <a:p>
             <a:pPr algn="r"/>
             <a:r>
-              <a:rPr lang="en-US" sz="1400" dirty="0" smtClean="0">
+              <a:rPr lang="en-US" sz="1400" dirty="0">
                 <a:solidFill>
                   <a:srgbClr val="00B050"/>
                 </a:solidFill>
               </a:rPr>
               <a:t>Update status bar</a:t>
             </a:r>
-            <a:endParaRPr lang="en-US" sz="1400" dirty="0">
-              <a:solidFill>
-                <a:srgbClr val="00B050"/>
-              </a:solidFill>
-            </a:endParaRPr>
           </a:p>
         </p:txBody>
       </p:sp>
@@ -6027,7 +6042,7 @@
           <a:lstStyle/>
           <a:p>
             <a:r>
-              <a:rPr lang="en-US" sz="1400" dirty="0" smtClean="0">
+              <a:rPr lang="en-US" sz="1400" dirty="0">
                 <a:solidFill>
                   <a:schemeClr val="accent6">
                     <a:lumMod val="75000"/>
@@ -6037,7 +6052,7 @@
               <a:t>Save </a:t>
             </a:r>
             <a:br>
-              <a:rPr lang="en-US" sz="1400" dirty="0" smtClean="0">
+              <a:rPr lang="en-US" sz="1400" dirty="0">
                 <a:solidFill>
                   <a:schemeClr val="accent6">
                     <a:lumMod val="75000"/>
@@ -6046,7 +6061,7 @@
               </a:rPr>
             </a:br>
             <a:r>
-              <a:rPr lang="en-US" sz="1400" dirty="0" smtClean="0">
+              <a:rPr lang="en-US" sz="1400" dirty="0">
                 <a:solidFill>
                   <a:schemeClr val="accent6">
                     <a:lumMod val="75000"/>
@@ -6055,13 +6070,6 @@
               </a:rPr>
               <a:t>to file</a:t>
             </a:r>
-            <a:endParaRPr lang="en-US" sz="1400" dirty="0">
-              <a:solidFill>
-                <a:schemeClr val="accent6">
-                  <a:lumMod val="75000"/>
-                </a:schemeClr>
-              </a:solidFill>
-            </a:endParaRPr>
           </a:p>
         </p:txBody>
       </p:sp>

</xml_diff>

<commit_message>
Update Developer guide images
</commit_message>
<xml_diff>
--- a/docs/diagrams/HighLevelSequenceDiagrams.pptx
+++ b/docs/diagrams/HighLevelSequenceDiagrams.pptx
@@ -208,7 +208,7 @@
           <a:p>
             <a:fld id="{F5CC4B3F-88C1-4FFA-B1B6-F41C21DC6924}" type="datetimeFigureOut">
               <a:rPr lang="en-US" smtClean="0"/>
-              <a:t>11/11/2018</a:t>
+              <a:t>11/12/2018</a:t>
             </a:fld>
             <a:endParaRPr lang="en-US"/>
           </a:p>
@@ -654,7 +654,7 @@
           <a:p>
             <a:fld id="{78C97017-6FC3-485B-9764-EAC9E56C1D49}" type="datetimeFigureOut">
               <a:rPr lang="en-US" smtClean="0"/>
-              <a:t>11/11/2018</a:t>
+              <a:t>11/12/2018</a:t>
             </a:fld>
             <a:endParaRPr lang="en-US"/>
           </a:p>
@@ -822,7 +822,7 @@
           <a:p>
             <a:fld id="{78C97017-6FC3-485B-9764-EAC9E56C1D49}" type="datetimeFigureOut">
               <a:rPr lang="en-US" smtClean="0"/>
-              <a:t>11/11/2018</a:t>
+              <a:t>11/12/2018</a:t>
             </a:fld>
             <a:endParaRPr lang="en-US"/>
           </a:p>
@@ -1000,7 +1000,7 @@
           <a:p>
             <a:fld id="{78C97017-6FC3-485B-9764-EAC9E56C1D49}" type="datetimeFigureOut">
               <a:rPr lang="en-US" smtClean="0"/>
-              <a:t>11/11/2018</a:t>
+              <a:t>11/12/2018</a:t>
             </a:fld>
             <a:endParaRPr lang="en-US"/>
           </a:p>
@@ -1168,7 +1168,7 @@
           <a:p>
             <a:fld id="{78C97017-6FC3-485B-9764-EAC9E56C1D49}" type="datetimeFigureOut">
               <a:rPr lang="en-US" smtClean="0"/>
-              <a:t>11/11/2018</a:t>
+              <a:t>11/12/2018</a:t>
             </a:fld>
             <a:endParaRPr lang="en-US"/>
           </a:p>
@@ -1413,7 +1413,7 @@
           <a:p>
             <a:fld id="{78C97017-6FC3-485B-9764-EAC9E56C1D49}" type="datetimeFigureOut">
               <a:rPr lang="en-US" smtClean="0"/>
-              <a:t>11/11/2018</a:t>
+              <a:t>11/12/2018</a:t>
             </a:fld>
             <a:endParaRPr lang="en-US"/>
           </a:p>
@@ -1698,7 +1698,7 @@
           <a:p>
             <a:fld id="{78C97017-6FC3-485B-9764-EAC9E56C1D49}" type="datetimeFigureOut">
               <a:rPr lang="en-US" smtClean="0"/>
-              <a:t>11/11/2018</a:t>
+              <a:t>11/12/2018</a:t>
             </a:fld>
             <a:endParaRPr lang="en-US"/>
           </a:p>
@@ -2117,7 +2117,7 @@
           <a:p>
             <a:fld id="{78C97017-6FC3-485B-9764-EAC9E56C1D49}" type="datetimeFigureOut">
               <a:rPr lang="en-US" smtClean="0"/>
-              <a:t>11/11/2018</a:t>
+              <a:t>11/12/2018</a:t>
             </a:fld>
             <a:endParaRPr lang="en-US"/>
           </a:p>
@@ -2234,7 +2234,7 @@
           <a:p>
             <a:fld id="{78C97017-6FC3-485B-9764-EAC9E56C1D49}" type="datetimeFigureOut">
               <a:rPr lang="en-US" smtClean="0"/>
-              <a:t>11/11/2018</a:t>
+              <a:t>11/12/2018</a:t>
             </a:fld>
             <a:endParaRPr lang="en-US"/>
           </a:p>
@@ -2329,7 +2329,7 @@
           <a:p>
             <a:fld id="{78C97017-6FC3-485B-9764-EAC9E56C1D49}" type="datetimeFigureOut">
               <a:rPr lang="en-US" smtClean="0"/>
-              <a:t>11/11/2018</a:t>
+              <a:t>11/12/2018</a:t>
             </a:fld>
             <a:endParaRPr lang="en-US"/>
           </a:p>
@@ -2604,7 +2604,7 @@
           <a:p>
             <a:fld id="{78C97017-6FC3-485B-9764-EAC9E56C1D49}" type="datetimeFigureOut">
               <a:rPr lang="en-US" smtClean="0"/>
-              <a:t>11/11/2018</a:t>
+              <a:t>11/12/2018</a:t>
             </a:fld>
             <a:endParaRPr lang="en-US"/>
           </a:p>
@@ -2856,7 +2856,7 @@
           <a:p>
             <a:fld id="{78C97017-6FC3-485B-9764-EAC9E56C1D49}" type="datetimeFigureOut">
               <a:rPr lang="en-US" smtClean="0"/>
-              <a:t>11/11/2018</a:t>
+              <a:t>11/12/2018</a:t>
             </a:fld>
             <a:endParaRPr lang="en-US"/>
           </a:p>
@@ -3067,7 +3067,7 @@
           <a:p>
             <a:fld id="{78C97017-6FC3-485B-9764-EAC9E56C1D49}" type="datetimeFigureOut">
               <a:rPr lang="en-US" smtClean="0"/>
-              <a:t>11/11/2018</a:t>
+              <a:t>11/12/2018</a:t>
             </a:fld>
             <a:endParaRPr lang="en-US"/>
           </a:p>
@@ -4375,7 +4375,7 @@
                   </a:schemeClr>
                 </a:solidFill>
               </a:rPr>
-              <a:t>AddressBookChangedEvent</a:t>
+              <a:t>HealthBookChangedEvent</a:t>
             </a:r>
             <a:r>
               <a:rPr lang="en-US" sz="1400" dirty="0">
@@ -4942,7 +4942,7 @@
                   </a:schemeClr>
                 </a:solidFill>
               </a:rPr>
-              <a:t>AddressBookChangedEvent</a:t>
+              <a:t>HealthBookChangedEvent</a:t>
             </a:r>
             <a:r>
               <a:rPr lang="en-US" sz="1400" dirty="0">
@@ -5307,7 +5307,7 @@
                   </a:schemeClr>
                 </a:solidFill>
               </a:rPr>
-              <a:t>handleAddresssBookChangedEvent</a:t>
+              <a:t>handleHealthBookChangedEvent</a:t>
             </a:r>
             <a:r>
               <a:rPr lang="en-US" sz="1400" dirty="0">
@@ -5611,7 +5611,7 @@
                   <a:srgbClr val="00B050"/>
                 </a:solidFill>
               </a:rPr>
-              <a:t>handleAddresssBookChangedEvent</a:t>
+              <a:t>handleHealthBookChangedEvent</a:t>
             </a:r>
             <a:r>
               <a:rPr lang="en-US" sz="1400" dirty="0">

</xml_diff>

<commit_message>
change addressbook in diagram to MeetingBook
</commit_message>
<xml_diff>
--- a/docs/diagrams/HighLevelSequenceDiagrams.pptx
+++ b/docs/diagrams/HighLevelSequenceDiagrams.pptx
@@ -107,6 +107,22 @@
       </a:defRPr>
     </a:lvl9pPr>
   </p:defaultTextStyle>
+  <p:extLst>
+    <p:ext uri="{EFAFB233-063F-42B5-8137-9DF3F51BA10A}">
+      <p15:sldGuideLst xmlns:p15="http://schemas.microsoft.com/office/powerpoint/2012/main">
+        <p15:guide id="1" orient="horz" pos="1488">
+          <p15:clr>
+            <a:srgbClr val="A4A3A4"/>
+          </p15:clr>
+        </p15:guide>
+        <p15:guide id="2" pos="2880">
+          <p15:clr>
+            <a:srgbClr val="A4A3A4"/>
+          </p15:clr>
+        </p15:guide>
+      </p15:sldGuideLst>
+    </p:ext>
+  </p:extLst>
 </p:presentation>
 </file>
 
@@ -192,7 +208,7 @@
           <a:p>
             <a:fld id="{F5CC4B3F-88C1-4FFA-B1B6-F41C21DC6924}" type="datetimeFigureOut">
               <a:rPr lang="en-US" smtClean="0"/>
-              <a:t>10/16/2016</a:t>
+              <a:t>11/12/18</a:t>
             </a:fld>
             <a:endParaRPr lang="en-US"/>
           </a:p>
@@ -256,38 +272,37 @@
           <a:p>
             <a:pPr lvl="0"/>
             <a:r>
-              <a:rPr lang="en-US" smtClean="0"/>
+              <a:rPr lang="en-US"/>
               <a:t>Click to edit Master text styles</a:t>
             </a:r>
           </a:p>
           <a:p>
             <a:pPr lvl="1"/>
             <a:r>
-              <a:rPr lang="en-US" smtClean="0"/>
+              <a:rPr lang="en-US"/>
               <a:t>Second level</a:t>
             </a:r>
           </a:p>
           <a:p>
             <a:pPr lvl="2"/>
             <a:r>
-              <a:rPr lang="en-US" smtClean="0"/>
+              <a:rPr lang="en-US"/>
               <a:t>Third level</a:t>
             </a:r>
           </a:p>
           <a:p>
             <a:pPr lvl="3"/>
             <a:r>
-              <a:rPr lang="en-US" smtClean="0"/>
+              <a:rPr lang="en-US"/>
               <a:t>Fourth level</a:t>
             </a:r>
           </a:p>
           <a:p>
             <a:pPr lvl="4"/>
             <a:r>
-              <a:rPr lang="en-US" smtClean="0"/>
+              <a:rPr lang="en-US"/>
               <a:t>Fifth level</a:t>
             </a:r>
-            <a:endParaRPr lang="en-US"/>
           </a:p>
         </p:txBody>
       </p:sp>
@@ -498,10 +513,9 @@
           <a:lstStyle/>
           <a:p>
             <a:r>
-              <a:rPr lang="en-US" smtClean="0"/>
+              <a:rPr lang="en-US"/>
               <a:t>Click to edit Master title style</a:t>
             </a:r>
-            <a:endParaRPr lang="en-US"/>
           </a:p>
         </p:txBody>
       </p:sp>
@@ -617,10 +631,9 @@
           </a:lstStyle>
           <a:p>
             <a:r>
-              <a:rPr lang="en-US" smtClean="0"/>
+              <a:rPr lang="en-US"/>
               <a:t>Click to edit Master subtitle style</a:t>
             </a:r>
-            <a:endParaRPr lang="en-US"/>
           </a:p>
         </p:txBody>
       </p:sp>
@@ -641,7 +654,7 @@
           <a:p>
             <a:fld id="{78C97017-6FC3-485B-9764-EAC9E56C1D49}" type="datetimeFigureOut">
               <a:rPr lang="en-US" smtClean="0"/>
-              <a:t>10/16/2016</a:t>
+              <a:t>11/12/18</a:t>
             </a:fld>
             <a:endParaRPr lang="en-US"/>
           </a:p>
@@ -735,10 +748,9 @@
           <a:lstStyle/>
           <a:p>
             <a:r>
-              <a:rPr lang="en-US" smtClean="0"/>
+              <a:rPr lang="en-US"/>
               <a:t>Click to edit Master title style</a:t>
             </a:r>
-            <a:endParaRPr lang="en-US"/>
           </a:p>
         </p:txBody>
       </p:sp>
@@ -759,38 +771,37 @@
           <a:p>
             <a:pPr lvl="0"/>
             <a:r>
-              <a:rPr lang="en-US" smtClean="0"/>
+              <a:rPr lang="en-US"/>
               <a:t>Click to edit Master text styles</a:t>
             </a:r>
           </a:p>
           <a:p>
             <a:pPr lvl="1"/>
             <a:r>
-              <a:rPr lang="en-US" smtClean="0"/>
+              <a:rPr lang="en-US"/>
               <a:t>Second level</a:t>
             </a:r>
           </a:p>
           <a:p>
             <a:pPr lvl="2"/>
             <a:r>
-              <a:rPr lang="en-US" smtClean="0"/>
+              <a:rPr lang="en-US"/>
               <a:t>Third level</a:t>
             </a:r>
           </a:p>
           <a:p>
             <a:pPr lvl="3"/>
             <a:r>
-              <a:rPr lang="en-US" smtClean="0"/>
+              <a:rPr lang="en-US"/>
               <a:t>Fourth level</a:t>
             </a:r>
           </a:p>
           <a:p>
             <a:pPr lvl="4"/>
             <a:r>
-              <a:rPr lang="en-US" smtClean="0"/>
+              <a:rPr lang="en-US"/>
               <a:t>Fifth level</a:t>
             </a:r>
-            <a:endParaRPr lang="en-US"/>
           </a:p>
         </p:txBody>
       </p:sp>
@@ -811,7 +822,7 @@
           <a:p>
             <a:fld id="{78C97017-6FC3-485B-9764-EAC9E56C1D49}" type="datetimeFigureOut">
               <a:rPr lang="en-US" smtClean="0"/>
-              <a:t>10/16/2016</a:t>
+              <a:t>11/12/18</a:t>
             </a:fld>
             <a:endParaRPr lang="en-US"/>
           </a:p>
@@ -910,10 +921,9 @@
           <a:lstStyle/>
           <a:p>
             <a:r>
-              <a:rPr lang="en-US" smtClean="0"/>
+              <a:rPr lang="en-US"/>
               <a:t>Click to edit Master title style</a:t>
             </a:r>
-            <a:endParaRPr lang="en-US"/>
           </a:p>
         </p:txBody>
       </p:sp>
@@ -939,38 +949,37 @@
           <a:p>
             <a:pPr lvl="0"/>
             <a:r>
-              <a:rPr lang="en-US" smtClean="0"/>
+              <a:rPr lang="en-US"/>
               <a:t>Click to edit Master text styles</a:t>
             </a:r>
           </a:p>
           <a:p>
             <a:pPr lvl="1"/>
             <a:r>
-              <a:rPr lang="en-US" smtClean="0"/>
+              <a:rPr lang="en-US"/>
               <a:t>Second level</a:t>
             </a:r>
           </a:p>
           <a:p>
             <a:pPr lvl="2"/>
             <a:r>
-              <a:rPr lang="en-US" smtClean="0"/>
+              <a:rPr lang="en-US"/>
               <a:t>Third level</a:t>
             </a:r>
           </a:p>
           <a:p>
             <a:pPr lvl="3"/>
             <a:r>
-              <a:rPr lang="en-US" smtClean="0"/>
+              <a:rPr lang="en-US"/>
               <a:t>Fourth level</a:t>
             </a:r>
           </a:p>
           <a:p>
             <a:pPr lvl="4"/>
             <a:r>
-              <a:rPr lang="en-US" smtClean="0"/>
+              <a:rPr lang="en-US"/>
               <a:t>Fifth level</a:t>
             </a:r>
-            <a:endParaRPr lang="en-US"/>
           </a:p>
         </p:txBody>
       </p:sp>
@@ -991,7 +1000,7 @@
           <a:p>
             <a:fld id="{78C97017-6FC3-485B-9764-EAC9E56C1D49}" type="datetimeFigureOut">
               <a:rPr lang="en-US" smtClean="0"/>
-              <a:t>10/16/2016</a:t>
+              <a:t>11/12/18</a:t>
             </a:fld>
             <a:endParaRPr lang="en-US"/>
           </a:p>
@@ -1085,10 +1094,9 @@
           <a:lstStyle/>
           <a:p>
             <a:r>
-              <a:rPr lang="en-US" smtClean="0"/>
+              <a:rPr lang="en-US"/>
               <a:t>Click to edit Master title style</a:t>
             </a:r>
-            <a:endParaRPr lang="en-US"/>
           </a:p>
         </p:txBody>
       </p:sp>
@@ -1109,38 +1117,37 @@
           <a:p>
             <a:pPr lvl="0"/>
             <a:r>
-              <a:rPr lang="en-US" smtClean="0"/>
+              <a:rPr lang="en-US"/>
               <a:t>Click to edit Master text styles</a:t>
             </a:r>
           </a:p>
           <a:p>
             <a:pPr lvl="1"/>
             <a:r>
-              <a:rPr lang="en-US" smtClean="0"/>
+              <a:rPr lang="en-US"/>
               <a:t>Second level</a:t>
             </a:r>
           </a:p>
           <a:p>
             <a:pPr lvl="2"/>
             <a:r>
-              <a:rPr lang="en-US" smtClean="0"/>
+              <a:rPr lang="en-US"/>
               <a:t>Third level</a:t>
             </a:r>
           </a:p>
           <a:p>
             <a:pPr lvl="3"/>
             <a:r>
-              <a:rPr lang="en-US" smtClean="0"/>
+              <a:rPr lang="en-US"/>
               <a:t>Fourth level</a:t>
             </a:r>
           </a:p>
           <a:p>
             <a:pPr lvl="4"/>
             <a:r>
-              <a:rPr lang="en-US" smtClean="0"/>
+              <a:rPr lang="en-US"/>
               <a:t>Fifth level</a:t>
             </a:r>
-            <a:endParaRPr lang="en-US"/>
           </a:p>
         </p:txBody>
       </p:sp>
@@ -1161,7 +1168,7 @@
           <a:p>
             <a:fld id="{78C97017-6FC3-485B-9764-EAC9E56C1D49}" type="datetimeFigureOut">
               <a:rPr lang="en-US" smtClean="0"/>
-              <a:t>10/16/2016</a:t>
+              <a:t>11/12/18</a:t>
             </a:fld>
             <a:endParaRPr lang="en-US"/>
           </a:p>
@@ -1264,10 +1271,9 @@
           </a:lstStyle>
           <a:p>
             <a:r>
-              <a:rPr lang="en-US" smtClean="0"/>
+              <a:rPr lang="en-US"/>
               <a:t>Click to edit Master title style</a:t>
             </a:r>
-            <a:endParaRPr lang="en-US"/>
           </a:p>
         </p:txBody>
       </p:sp>
@@ -1384,7 +1390,7 @@
           <a:p>
             <a:pPr lvl="0"/>
             <a:r>
-              <a:rPr lang="en-US" smtClean="0"/>
+              <a:rPr lang="en-US"/>
               <a:t>Click to edit Master text styles</a:t>
             </a:r>
           </a:p>
@@ -1407,7 +1413,7 @@
           <a:p>
             <a:fld id="{78C97017-6FC3-485B-9764-EAC9E56C1D49}" type="datetimeFigureOut">
               <a:rPr lang="en-US" smtClean="0"/>
-              <a:t>10/16/2016</a:t>
+              <a:t>11/12/18</a:t>
             </a:fld>
             <a:endParaRPr lang="en-US"/>
           </a:p>
@@ -1501,10 +1507,9 @@
           <a:lstStyle/>
           <a:p>
             <a:r>
-              <a:rPr lang="en-US" smtClean="0"/>
+              <a:rPr lang="en-US"/>
               <a:t>Click to edit Master title style</a:t>
             </a:r>
-            <a:endParaRPr lang="en-US"/>
           </a:p>
         </p:txBody>
       </p:sp>
@@ -1558,38 +1563,37 @@
           <a:p>
             <a:pPr lvl="0"/>
             <a:r>
-              <a:rPr lang="en-US" smtClean="0"/>
+              <a:rPr lang="en-US"/>
               <a:t>Click to edit Master text styles</a:t>
             </a:r>
           </a:p>
           <a:p>
             <a:pPr lvl="1"/>
             <a:r>
-              <a:rPr lang="en-US" smtClean="0"/>
+              <a:rPr lang="en-US"/>
               <a:t>Second level</a:t>
             </a:r>
           </a:p>
           <a:p>
             <a:pPr lvl="2"/>
             <a:r>
-              <a:rPr lang="en-US" smtClean="0"/>
+              <a:rPr lang="en-US"/>
               <a:t>Third level</a:t>
             </a:r>
           </a:p>
           <a:p>
             <a:pPr lvl="3"/>
             <a:r>
-              <a:rPr lang="en-US" smtClean="0"/>
+              <a:rPr lang="en-US"/>
               <a:t>Fourth level</a:t>
             </a:r>
           </a:p>
           <a:p>
             <a:pPr lvl="4"/>
             <a:r>
-              <a:rPr lang="en-US" smtClean="0"/>
+              <a:rPr lang="en-US"/>
               <a:t>Fifth level</a:t>
             </a:r>
-            <a:endParaRPr lang="en-US"/>
           </a:p>
         </p:txBody>
       </p:sp>
@@ -1643,38 +1647,37 @@
           <a:p>
             <a:pPr lvl="0"/>
             <a:r>
-              <a:rPr lang="en-US" smtClean="0"/>
+              <a:rPr lang="en-US"/>
               <a:t>Click to edit Master text styles</a:t>
             </a:r>
           </a:p>
           <a:p>
             <a:pPr lvl="1"/>
             <a:r>
-              <a:rPr lang="en-US" smtClean="0"/>
+              <a:rPr lang="en-US"/>
               <a:t>Second level</a:t>
             </a:r>
           </a:p>
           <a:p>
             <a:pPr lvl="2"/>
             <a:r>
-              <a:rPr lang="en-US" smtClean="0"/>
+              <a:rPr lang="en-US"/>
               <a:t>Third level</a:t>
             </a:r>
           </a:p>
           <a:p>
             <a:pPr lvl="3"/>
             <a:r>
-              <a:rPr lang="en-US" smtClean="0"/>
+              <a:rPr lang="en-US"/>
               <a:t>Fourth level</a:t>
             </a:r>
           </a:p>
           <a:p>
             <a:pPr lvl="4"/>
             <a:r>
-              <a:rPr lang="en-US" smtClean="0"/>
+              <a:rPr lang="en-US"/>
               <a:t>Fifth level</a:t>
             </a:r>
-            <a:endParaRPr lang="en-US"/>
           </a:p>
         </p:txBody>
       </p:sp>
@@ -1695,7 +1698,7 @@
           <a:p>
             <a:fld id="{78C97017-6FC3-485B-9764-EAC9E56C1D49}" type="datetimeFigureOut">
               <a:rPr lang="en-US" smtClean="0"/>
-              <a:t>10/16/2016</a:t>
+              <a:t>11/12/18</a:t>
             </a:fld>
             <a:endParaRPr lang="en-US"/>
           </a:p>
@@ -1793,10 +1796,9 @@
           </a:lstStyle>
           <a:p>
             <a:r>
-              <a:rPr lang="en-US" smtClean="0"/>
+              <a:rPr lang="en-US"/>
               <a:t>Click to edit Master title style</a:t>
             </a:r>
-            <a:endParaRPr lang="en-US"/>
           </a:p>
         </p:txBody>
       </p:sp>
@@ -1859,7 +1861,7 @@
           <a:p>
             <a:pPr lvl="0"/>
             <a:r>
-              <a:rPr lang="en-US" smtClean="0"/>
+              <a:rPr lang="en-US"/>
               <a:t>Click to edit Master text styles</a:t>
             </a:r>
           </a:p>
@@ -1915,38 +1917,37 @@
           <a:p>
             <a:pPr lvl="0"/>
             <a:r>
-              <a:rPr lang="en-US" smtClean="0"/>
+              <a:rPr lang="en-US"/>
               <a:t>Click to edit Master text styles</a:t>
             </a:r>
           </a:p>
           <a:p>
             <a:pPr lvl="1"/>
             <a:r>
-              <a:rPr lang="en-US" smtClean="0"/>
+              <a:rPr lang="en-US"/>
               <a:t>Second level</a:t>
             </a:r>
           </a:p>
           <a:p>
             <a:pPr lvl="2"/>
             <a:r>
-              <a:rPr lang="en-US" smtClean="0"/>
+              <a:rPr lang="en-US"/>
               <a:t>Third level</a:t>
             </a:r>
           </a:p>
           <a:p>
             <a:pPr lvl="3"/>
             <a:r>
-              <a:rPr lang="en-US" smtClean="0"/>
+              <a:rPr lang="en-US"/>
               <a:t>Fourth level</a:t>
             </a:r>
           </a:p>
           <a:p>
             <a:pPr lvl="4"/>
             <a:r>
-              <a:rPr lang="en-US" smtClean="0"/>
+              <a:rPr lang="en-US"/>
               <a:t>Fifth level</a:t>
             </a:r>
-            <a:endParaRPr lang="en-US"/>
           </a:p>
         </p:txBody>
       </p:sp>
@@ -2009,7 +2010,7 @@
           <a:p>
             <a:pPr lvl="0"/>
             <a:r>
-              <a:rPr lang="en-US" smtClean="0"/>
+              <a:rPr lang="en-US"/>
               <a:t>Click to edit Master text styles</a:t>
             </a:r>
           </a:p>
@@ -2065,38 +2066,37 @@
           <a:p>
             <a:pPr lvl="0"/>
             <a:r>
-              <a:rPr lang="en-US" smtClean="0"/>
+              <a:rPr lang="en-US"/>
               <a:t>Click to edit Master text styles</a:t>
             </a:r>
           </a:p>
           <a:p>
             <a:pPr lvl="1"/>
             <a:r>
-              <a:rPr lang="en-US" smtClean="0"/>
+              <a:rPr lang="en-US"/>
               <a:t>Second level</a:t>
             </a:r>
           </a:p>
           <a:p>
             <a:pPr lvl="2"/>
             <a:r>
-              <a:rPr lang="en-US" smtClean="0"/>
+              <a:rPr lang="en-US"/>
               <a:t>Third level</a:t>
             </a:r>
           </a:p>
           <a:p>
             <a:pPr lvl="3"/>
             <a:r>
-              <a:rPr lang="en-US" smtClean="0"/>
+              <a:rPr lang="en-US"/>
               <a:t>Fourth level</a:t>
             </a:r>
           </a:p>
           <a:p>
             <a:pPr lvl="4"/>
             <a:r>
-              <a:rPr lang="en-US" smtClean="0"/>
+              <a:rPr lang="en-US"/>
               <a:t>Fifth level</a:t>
             </a:r>
-            <a:endParaRPr lang="en-US"/>
           </a:p>
         </p:txBody>
       </p:sp>
@@ -2117,7 +2117,7 @@
           <a:p>
             <a:fld id="{78C97017-6FC3-485B-9764-EAC9E56C1D49}" type="datetimeFigureOut">
               <a:rPr lang="en-US" smtClean="0"/>
-              <a:t>10/16/2016</a:t>
+              <a:t>11/12/18</a:t>
             </a:fld>
             <a:endParaRPr lang="en-US"/>
           </a:p>
@@ -2211,10 +2211,9 @@
           <a:lstStyle/>
           <a:p>
             <a:r>
-              <a:rPr lang="en-US" smtClean="0"/>
+              <a:rPr lang="en-US"/>
               <a:t>Click to edit Master title style</a:t>
             </a:r>
-            <a:endParaRPr lang="en-US"/>
           </a:p>
         </p:txBody>
       </p:sp>
@@ -2235,7 +2234,7 @@
           <a:p>
             <a:fld id="{78C97017-6FC3-485B-9764-EAC9E56C1D49}" type="datetimeFigureOut">
               <a:rPr lang="en-US" smtClean="0"/>
-              <a:t>10/16/2016</a:t>
+              <a:t>11/12/18</a:t>
             </a:fld>
             <a:endParaRPr lang="en-US"/>
           </a:p>
@@ -2330,7 +2329,7 @@
           <a:p>
             <a:fld id="{78C97017-6FC3-485B-9764-EAC9E56C1D49}" type="datetimeFigureOut">
               <a:rPr lang="en-US" smtClean="0"/>
-              <a:t>10/16/2016</a:t>
+              <a:t>11/12/18</a:t>
             </a:fld>
             <a:endParaRPr lang="en-US"/>
           </a:p>
@@ -2433,10 +2432,9 @@
           </a:lstStyle>
           <a:p>
             <a:r>
-              <a:rPr lang="en-US" smtClean="0"/>
+              <a:rPr lang="en-US"/>
               <a:t>Click to edit Master title style</a:t>
             </a:r>
-            <a:endParaRPr lang="en-US"/>
           </a:p>
         </p:txBody>
       </p:sp>
@@ -2490,38 +2488,37 @@
           <a:p>
             <a:pPr lvl="0"/>
             <a:r>
-              <a:rPr lang="en-US" smtClean="0"/>
+              <a:rPr lang="en-US"/>
               <a:t>Click to edit Master text styles</a:t>
             </a:r>
           </a:p>
           <a:p>
             <a:pPr lvl="1"/>
             <a:r>
-              <a:rPr lang="en-US" smtClean="0"/>
+              <a:rPr lang="en-US"/>
               <a:t>Second level</a:t>
             </a:r>
           </a:p>
           <a:p>
             <a:pPr lvl="2"/>
             <a:r>
-              <a:rPr lang="en-US" smtClean="0"/>
+              <a:rPr lang="en-US"/>
               <a:t>Third level</a:t>
             </a:r>
           </a:p>
           <a:p>
             <a:pPr lvl="3"/>
             <a:r>
-              <a:rPr lang="en-US" smtClean="0"/>
+              <a:rPr lang="en-US"/>
               <a:t>Fourth level</a:t>
             </a:r>
           </a:p>
           <a:p>
             <a:pPr lvl="4"/>
             <a:r>
-              <a:rPr lang="en-US" smtClean="0"/>
+              <a:rPr lang="en-US"/>
               <a:t>Fifth level</a:t>
             </a:r>
-            <a:endParaRPr lang="en-US"/>
           </a:p>
         </p:txBody>
       </p:sp>
@@ -2584,7 +2581,7 @@
           <a:p>
             <a:pPr lvl="0"/>
             <a:r>
-              <a:rPr lang="en-US" smtClean="0"/>
+              <a:rPr lang="en-US"/>
               <a:t>Click to edit Master text styles</a:t>
             </a:r>
           </a:p>
@@ -2607,7 +2604,7 @@
           <a:p>
             <a:fld id="{78C97017-6FC3-485B-9764-EAC9E56C1D49}" type="datetimeFigureOut">
               <a:rPr lang="en-US" smtClean="0"/>
-              <a:t>10/16/2016</a:t>
+              <a:t>11/12/18</a:t>
             </a:fld>
             <a:endParaRPr lang="en-US"/>
           </a:p>
@@ -2710,10 +2707,9 @@
           </a:lstStyle>
           <a:p>
             <a:r>
-              <a:rPr lang="en-US" smtClean="0"/>
+              <a:rPr lang="en-US"/>
               <a:t>Click to edit Master title style</a:t>
             </a:r>
-            <a:endParaRPr lang="en-US"/>
           </a:p>
         </p:txBody>
       </p:sp>
@@ -2837,7 +2833,7 @@
           <a:p>
             <a:pPr lvl="0"/>
             <a:r>
-              <a:rPr lang="en-US" smtClean="0"/>
+              <a:rPr lang="en-US"/>
               <a:t>Click to edit Master text styles</a:t>
             </a:r>
           </a:p>
@@ -2860,7 +2856,7 @@
           <a:p>
             <a:fld id="{78C97017-6FC3-485B-9764-EAC9E56C1D49}" type="datetimeFigureOut">
               <a:rPr lang="en-US" smtClean="0"/>
-              <a:t>10/16/2016</a:t>
+              <a:t>11/12/18</a:t>
             </a:fld>
             <a:endParaRPr lang="en-US"/>
           </a:p>
@@ -2969,10 +2965,9 @@
           <a:lstStyle/>
           <a:p>
             <a:r>
-              <a:rPr lang="en-US" smtClean="0"/>
+              <a:rPr lang="en-US"/>
               <a:t>Click to edit Master title style</a:t>
             </a:r>
-            <a:endParaRPr lang="en-US"/>
           </a:p>
         </p:txBody>
       </p:sp>
@@ -3003,38 +2998,37 @@
           <a:p>
             <a:pPr lvl="0"/>
             <a:r>
-              <a:rPr lang="en-US" smtClean="0"/>
+              <a:rPr lang="en-US"/>
               <a:t>Click to edit Master text styles</a:t>
             </a:r>
           </a:p>
           <a:p>
             <a:pPr lvl="1"/>
             <a:r>
-              <a:rPr lang="en-US" smtClean="0"/>
+              <a:rPr lang="en-US"/>
               <a:t>Second level</a:t>
             </a:r>
           </a:p>
           <a:p>
             <a:pPr lvl="2"/>
             <a:r>
-              <a:rPr lang="en-US" smtClean="0"/>
+              <a:rPr lang="en-US"/>
               <a:t>Third level</a:t>
             </a:r>
           </a:p>
           <a:p>
             <a:pPr lvl="3"/>
             <a:r>
-              <a:rPr lang="en-US" smtClean="0"/>
+              <a:rPr lang="en-US"/>
               <a:t>Fourth level</a:t>
             </a:r>
           </a:p>
           <a:p>
             <a:pPr lvl="4"/>
             <a:r>
-              <a:rPr lang="en-US" smtClean="0"/>
+              <a:rPr lang="en-US"/>
               <a:t>Fifth level</a:t>
             </a:r>
-            <a:endParaRPr lang="en-US"/>
           </a:p>
         </p:txBody>
       </p:sp>
@@ -3073,7 +3067,7 @@
           <a:p>
             <a:fld id="{78C97017-6FC3-485B-9764-EAC9E56C1D49}" type="datetimeFigureOut">
               <a:rPr lang="en-US" smtClean="0"/>
-              <a:t>10/16/2016</a:t>
+              <a:t>11/12/18</a:t>
             </a:fld>
             <a:endParaRPr lang="en-US"/>
           </a:p>
@@ -3492,7 +3486,7 @@
           <a:p>
             <a:pPr algn="ctr"/>
             <a:r>
-              <a:rPr lang="en-US" sz="1600" dirty="0" smtClean="0">
+              <a:rPr lang="en-US" sz="1600" dirty="0">
                 <a:solidFill>
                   <a:schemeClr val="bg1"/>
                 </a:solidFill>
@@ -3856,7 +3850,7 @@
           <a:p>
             <a:pPr algn="ctr"/>
             <a:r>
-              <a:rPr lang="en-US" sz="1600" dirty="0" smtClean="0">
+              <a:rPr lang="en-US" sz="1600" dirty="0">
                 <a:solidFill>
                   <a:schemeClr val="bg1"/>
                 </a:solidFill>
@@ -4003,7 +3997,7 @@
           <a:p>
             <a:pPr algn="ctr"/>
             <a:r>
-              <a:rPr lang="en-US" sz="1600" dirty="0" smtClean="0">
+              <a:rPr lang="en-US" sz="1600" dirty="0">
                 <a:solidFill>
                   <a:schemeClr val="bg1"/>
                 </a:solidFill>
@@ -4151,7 +4145,7 @@
         <p:spPr>
           <a:xfrm>
             <a:off x="466818" y="1345880"/>
-            <a:ext cx="860170" cy="215444"/>
+            <a:ext cx="860170" cy="184666"/>
           </a:xfrm>
           <a:prstGeom prst="rect">
             <a:avLst/>
@@ -4165,10 +4159,9 @@
           <a:lstStyle/>
           <a:p>
             <a:r>
-              <a:rPr lang="en-US" sz="1400" dirty="0" smtClean="0"/>
+              <a:rPr lang="en-US" sz="1200" dirty="0"/>
               <a:t>delete 1</a:t>
             </a:r>
-            <a:endParaRPr lang="en-US" sz="1400" dirty="0"/>
           </a:p>
         </p:txBody>
       </p:sp>
@@ -4217,7 +4210,7 @@
         <p:spPr>
           <a:xfrm>
             <a:off x="2166172" y="1453379"/>
-            <a:ext cx="1424846" cy="215444"/>
+            <a:ext cx="1424846" cy="184666"/>
           </a:xfrm>
           <a:prstGeom prst="rect">
             <a:avLst/>
@@ -4231,18 +4224,13 @@
           <a:lstStyle/>
           <a:p>
             <a:r>
-              <a:rPr lang="en-US" sz="1400" dirty="0" smtClean="0">
+              <a:rPr lang="en-US" sz="1200" dirty="0">
                 <a:solidFill>
                   <a:srgbClr val="0070C0"/>
                 </a:solidFill>
               </a:rPr>
               <a:t>execute(“delete 1”)</a:t>
             </a:r>
-            <a:endParaRPr lang="en-US" sz="1400" dirty="0">
-              <a:solidFill>
-                <a:srgbClr val="0070C0"/>
-              </a:solidFill>
-            </a:endParaRPr>
           </a:p>
         </p:txBody>
       </p:sp>
@@ -4291,7 +4279,7 @@
         <p:spPr>
           <a:xfrm>
             <a:off x="4299772" y="1542583"/>
-            <a:ext cx="1424846" cy="215444"/>
+            <a:ext cx="1424846" cy="184666"/>
           </a:xfrm>
           <a:prstGeom prst="rect">
             <a:avLst/>
@@ -4305,7 +4293,7 @@
           <a:lstStyle/>
           <a:p>
             <a:r>
-              <a:rPr lang="en-US" sz="1400" dirty="0" err="1" smtClean="0">
+              <a:rPr lang="en-US" sz="1200" dirty="0" err="1">
                 <a:solidFill>
                   <a:srgbClr val="7030A0"/>
                 </a:solidFill>
@@ -4313,18 +4301,13 @@
               <a:t>deletePerson</a:t>
             </a:r>
             <a:r>
-              <a:rPr lang="en-US" sz="1400" dirty="0" smtClean="0">
+              <a:rPr lang="en-US" sz="1200" dirty="0">
                 <a:solidFill>
                   <a:srgbClr val="7030A0"/>
                 </a:solidFill>
               </a:rPr>
               <a:t>(p)</a:t>
             </a:r>
-            <a:endParaRPr lang="en-US" sz="1400" dirty="0">
-              <a:solidFill>
-                <a:srgbClr val="7030A0"/>
-              </a:solidFill>
-            </a:endParaRPr>
           </a:p>
         </p:txBody>
       </p:sp>
@@ -4336,8 +4319,8 @@
         </p:nvSpPr>
         <p:spPr>
           <a:xfrm>
-            <a:off x="6074030" y="1687656"/>
-            <a:ext cx="2438400" cy="215444"/>
+            <a:off x="6056000" y="1686472"/>
+            <a:ext cx="2438400" cy="184666"/>
           </a:xfrm>
           <a:prstGeom prst="rect">
             <a:avLst/>
@@ -4351,7 +4334,7 @@
           <a:lstStyle/>
           <a:p>
             <a:r>
-              <a:rPr lang="en-US" sz="1400" dirty="0" smtClean="0">
+              <a:rPr lang="en-US" sz="1200" dirty="0">
                 <a:solidFill>
                   <a:schemeClr val="accent5">
                     <a:lumMod val="75000"/>
@@ -4361,17 +4344,17 @@
               <a:t>post(</a:t>
             </a:r>
             <a:r>
-              <a:rPr lang="en-US" sz="1400" dirty="0" err="1" smtClean="0">
+              <a:rPr lang="en-US" sz="1200" dirty="0" err="1">
                 <a:solidFill>
                   <a:schemeClr val="accent5">
                     <a:lumMod val="75000"/>
                   </a:schemeClr>
                 </a:solidFill>
               </a:rPr>
-              <a:t>AddressBookChangedEvent</a:t>
-            </a:r>
-            <a:r>
-              <a:rPr lang="en-US" sz="1400" dirty="0" smtClean="0">
+              <a:t>MeetingBookChangedEvent</a:t>
+            </a:r>
+            <a:r>
+              <a:rPr lang="en-US" sz="1200" dirty="0">
                 <a:solidFill>
                   <a:schemeClr val="accent5">
                     <a:lumMod val="75000"/>
@@ -4380,13 +4363,6 @@
               </a:rPr>
               <a:t>)</a:t>
             </a:r>
-            <a:endParaRPr lang="en-US" sz="1400" dirty="0">
-              <a:solidFill>
-                <a:schemeClr val="accent5">
-                  <a:lumMod val="75000"/>
-                </a:schemeClr>
-              </a:solidFill>
-            </a:endParaRPr>
           </a:p>
         </p:txBody>
       </p:sp>
@@ -4552,7 +4528,7 @@
           <a:p>
             <a:pPr algn="ctr"/>
             <a:r>
-              <a:rPr lang="en-US" sz="1600" dirty="0" smtClean="0">
+              <a:rPr lang="en-US" sz="1600" dirty="0">
                 <a:solidFill>
                   <a:schemeClr val="bg1"/>
                 </a:solidFill>
@@ -4560,7 +4536,7 @@
               <a:t>:</a:t>
             </a:r>
             <a:r>
-              <a:rPr lang="en-US" sz="1600" dirty="0" err="1" smtClean="0">
+              <a:rPr lang="en-US" sz="1600" dirty="0" err="1">
                 <a:solidFill>
                   <a:schemeClr val="bg1"/>
                 </a:solidFill>
@@ -4793,7 +4769,7 @@
           <a:p>
             <a:pPr algn="ctr"/>
             <a:r>
-              <a:rPr lang="en-US" sz="1600" dirty="0" smtClean="0">
+              <a:rPr lang="en-US" sz="1600" dirty="0">
                 <a:solidFill>
                   <a:schemeClr val="bg1"/>
                 </a:solidFill>
@@ -4911,7 +4887,7 @@
         <p:spPr>
           <a:xfrm>
             <a:off x="1810094" y="4797674"/>
-            <a:ext cx="2716635" cy="215444"/>
+            <a:ext cx="2716635" cy="184666"/>
           </a:xfrm>
           <a:prstGeom prst="rect">
             <a:avLst/>
@@ -4925,7 +4901,7 @@
           <a:lstStyle/>
           <a:p>
             <a:r>
-              <a:rPr lang="en-US" sz="1400" dirty="0" smtClean="0">
+              <a:rPr lang="en-US" sz="1200" dirty="0">
                 <a:solidFill>
                   <a:schemeClr val="accent5">
                     <a:lumMod val="75000"/>
@@ -4935,17 +4911,17 @@
               <a:t>post(</a:t>
             </a:r>
             <a:r>
-              <a:rPr lang="en-US" sz="1400" dirty="0" err="1" smtClean="0">
+              <a:rPr lang="en-US" sz="1200" dirty="0" err="1">
                 <a:solidFill>
                   <a:schemeClr val="accent5">
                     <a:lumMod val="75000"/>
                   </a:schemeClr>
                 </a:solidFill>
               </a:rPr>
-              <a:t>AddressBookChangedEvent</a:t>
-            </a:r>
-            <a:r>
-              <a:rPr lang="en-US" sz="1400" dirty="0" smtClean="0">
+              <a:t>MeetingBookChangedEvent</a:t>
+            </a:r>
+            <a:r>
+              <a:rPr lang="en-US" sz="1200" dirty="0">
                 <a:solidFill>
                   <a:schemeClr val="accent5">
                     <a:lumMod val="75000"/>
@@ -4954,13 +4930,6 @@
               </a:rPr>
               <a:t>)</a:t>
             </a:r>
-            <a:endParaRPr lang="en-US" sz="1400" dirty="0">
-              <a:solidFill>
-                <a:schemeClr val="accent5">
-                  <a:lumMod val="75000"/>
-                </a:schemeClr>
-              </a:solidFill>
-            </a:endParaRPr>
           </a:p>
         </p:txBody>
       </p:sp>
@@ -5052,7 +5021,7 @@
           <a:p>
             <a:pPr algn="ctr"/>
             <a:r>
-              <a:rPr lang="en-US" sz="1600" dirty="0" smtClean="0">
+              <a:rPr lang="en-US" sz="1600" dirty="0">
                 <a:solidFill>
                   <a:schemeClr val="bg1"/>
                 </a:solidFill>
@@ -5060,7 +5029,7 @@
               <a:t>:</a:t>
             </a:r>
             <a:r>
-              <a:rPr lang="en-US" sz="1600" dirty="0" err="1" smtClean="0">
+              <a:rPr lang="en-US" sz="1600" dirty="0" err="1">
                 <a:solidFill>
                   <a:schemeClr val="bg1"/>
                 </a:solidFill>
@@ -5293,7 +5262,7 @@
         <p:spPr>
           <a:xfrm>
             <a:off x="5036330" y="5065911"/>
-            <a:ext cx="2659870" cy="215444"/>
+            <a:ext cx="2659870" cy="184666"/>
           </a:xfrm>
           <a:prstGeom prst="rect">
             <a:avLst/>
@@ -5307,17 +5276,17 @@
           <a:lstStyle/>
           <a:p>
             <a:r>
-              <a:rPr lang="en-US" sz="1400" dirty="0" err="1" smtClean="0">
+              <a:rPr lang="en-US" sz="1200" dirty="0" err="1">
                 <a:solidFill>
                   <a:schemeClr val="accent6">
                     <a:lumMod val="75000"/>
                   </a:schemeClr>
                 </a:solidFill>
               </a:rPr>
-              <a:t>handleAddresssBookChangedEvent</a:t>
-            </a:r>
-            <a:r>
-              <a:rPr lang="en-US" sz="1400" dirty="0" smtClean="0">
+              <a:t>handleMeetingBookChangedEvent</a:t>
+            </a:r>
+            <a:r>
+              <a:rPr lang="en-US" sz="1200" dirty="0">
                 <a:solidFill>
                   <a:schemeClr val="accent6">
                     <a:lumMod val="75000"/>
@@ -5326,13 +5295,6 @@
               </a:rPr>
               <a:t>()</a:t>
             </a:r>
-            <a:endParaRPr lang="en-US" sz="1400" dirty="0">
-              <a:solidFill>
-                <a:schemeClr val="accent6">
-                  <a:lumMod val="75000"/>
-                </a:schemeClr>
-              </a:solidFill>
-            </a:endParaRPr>
           </a:p>
         </p:txBody>
       </p:sp>
@@ -5417,7 +5379,7 @@
           <a:p>
             <a:pPr algn="ctr"/>
             <a:r>
-              <a:rPr lang="en-US" sz="1600" dirty="0" smtClean="0">
+              <a:rPr lang="en-US" sz="1600" dirty="0">
                 <a:solidFill>
                   <a:schemeClr val="bg1"/>
                 </a:solidFill>
@@ -5606,7 +5568,7 @@
         <p:spPr>
           <a:xfrm>
             <a:off x="1416276" y="5395369"/>
-            <a:ext cx="2659870" cy="215444"/>
+            <a:ext cx="2659870" cy="184666"/>
           </a:xfrm>
           <a:prstGeom prst="rect">
             <a:avLst/>
@@ -5620,26 +5582,21 @@
           <a:lstStyle/>
           <a:p>
             <a:r>
-              <a:rPr lang="en-US" sz="1400" dirty="0" err="1" smtClean="0">
+              <a:rPr lang="en-US" sz="1200" dirty="0" err="1">
                 <a:solidFill>
                   <a:srgbClr val="00B050"/>
                 </a:solidFill>
               </a:rPr>
-              <a:t>handleAddresssBookChangedEvent</a:t>
-            </a:r>
-            <a:r>
-              <a:rPr lang="en-US" sz="1400" dirty="0" smtClean="0">
+              <a:t>handleMeetingBookChangedEvent</a:t>
+            </a:r>
+            <a:r>
+              <a:rPr lang="en-US" sz="1200" dirty="0">
                 <a:solidFill>
                   <a:srgbClr val="00B050"/>
                 </a:solidFill>
               </a:rPr>
               <a:t>()</a:t>
             </a:r>
-            <a:endParaRPr lang="en-US" sz="1400" dirty="0">
-              <a:solidFill>
-                <a:srgbClr val="00B050"/>
-              </a:solidFill>
-            </a:endParaRPr>
           </a:p>
         </p:txBody>
       </p:sp>
@@ -5826,18 +5783,13 @@
           <a:p>
             <a:pPr algn="r"/>
             <a:r>
-              <a:rPr lang="en-US" sz="1400" dirty="0" smtClean="0">
+              <a:rPr lang="en-US" sz="1400" dirty="0">
                 <a:solidFill>
                   <a:srgbClr val="00B050"/>
                 </a:solidFill>
               </a:rPr>
               <a:t>Update status bar</a:t>
             </a:r>
-            <a:endParaRPr lang="en-US" sz="1400" dirty="0">
-              <a:solidFill>
-                <a:srgbClr val="00B050"/>
-              </a:solidFill>
-            </a:endParaRPr>
           </a:p>
         </p:txBody>
       </p:sp>
@@ -6027,7 +5979,7 @@
           <a:lstStyle/>
           <a:p>
             <a:r>
-              <a:rPr lang="en-US" sz="1400" dirty="0" smtClean="0">
+              <a:rPr lang="en-US" sz="1400" dirty="0">
                 <a:solidFill>
                   <a:schemeClr val="accent6">
                     <a:lumMod val="75000"/>
@@ -6037,7 +5989,7 @@
               <a:t>Save </a:t>
             </a:r>
             <a:br>
-              <a:rPr lang="en-US" sz="1400" dirty="0" smtClean="0">
+              <a:rPr lang="en-US" sz="1400" dirty="0">
                 <a:solidFill>
                   <a:schemeClr val="accent6">
                     <a:lumMod val="75000"/>
@@ -6046,7 +5998,7 @@
               </a:rPr>
             </a:br>
             <a:r>
-              <a:rPr lang="en-US" sz="1400" dirty="0" smtClean="0">
+              <a:rPr lang="en-US" sz="1400" dirty="0">
                 <a:solidFill>
                   <a:schemeClr val="accent6">
                     <a:lumMod val="75000"/>
@@ -6055,13 +6007,6 @@
               </a:rPr>
               <a:t>to file</a:t>
             </a:r>
-            <a:endParaRPr lang="en-US" sz="1400" dirty="0">
-              <a:solidFill>
-                <a:schemeClr val="accent6">
-                  <a:lumMod val="75000"/>
-                </a:schemeClr>
-              </a:solidFill>
-            </a:endParaRPr>
           </a:p>
         </p:txBody>
       </p:sp>

</xml_diff>

<commit_message>
Minor fixes on DeveloperGuide and comments (#240)
Changes made:

1. Delete a few obsolete lines.
2. Changed Address Book to HealthBase in the text and some diagrams.
3. Reordered manual testing sections.
</commit_message>
<xml_diff>
--- a/docs/diagrams/HighLevelSequenceDiagrams.pptx
+++ b/docs/diagrams/HighLevelSequenceDiagrams.pptx
@@ -107,6 +107,22 @@
       </a:defRPr>
     </a:lvl9pPr>
   </p:defaultTextStyle>
+  <p:extLst>
+    <p:ext uri="{EFAFB233-063F-42B5-8137-9DF3F51BA10A}">
+      <p15:sldGuideLst xmlns:p15="http://schemas.microsoft.com/office/powerpoint/2012/main">
+        <p15:guide id="1" orient="horz" pos="1488">
+          <p15:clr>
+            <a:srgbClr val="A4A3A4"/>
+          </p15:clr>
+        </p15:guide>
+        <p15:guide id="2" pos="2880">
+          <p15:clr>
+            <a:srgbClr val="A4A3A4"/>
+          </p15:clr>
+        </p15:guide>
+      </p15:sldGuideLst>
+    </p:ext>
+  </p:extLst>
 </p:presentation>
 </file>
 
@@ -192,7 +208,7 @@
           <a:p>
             <a:fld id="{F5CC4B3F-88C1-4FFA-B1B6-F41C21DC6924}" type="datetimeFigureOut">
               <a:rPr lang="en-US" smtClean="0"/>
-              <a:t>10/16/2016</a:t>
+              <a:t>11/13/2018</a:t>
             </a:fld>
             <a:endParaRPr lang="en-US"/>
           </a:p>
@@ -256,38 +272,37 @@
           <a:p>
             <a:pPr lvl="0"/>
             <a:r>
-              <a:rPr lang="en-US" smtClean="0"/>
+              <a:rPr lang="en-US"/>
               <a:t>Click to edit Master text styles</a:t>
             </a:r>
           </a:p>
           <a:p>
             <a:pPr lvl="1"/>
             <a:r>
-              <a:rPr lang="en-US" smtClean="0"/>
+              <a:rPr lang="en-US"/>
               <a:t>Second level</a:t>
             </a:r>
           </a:p>
           <a:p>
             <a:pPr lvl="2"/>
             <a:r>
-              <a:rPr lang="en-US" smtClean="0"/>
+              <a:rPr lang="en-US"/>
               <a:t>Third level</a:t>
             </a:r>
           </a:p>
           <a:p>
             <a:pPr lvl="3"/>
             <a:r>
-              <a:rPr lang="en-US" smtClean="0"/>
+              <a:rPr lang="en-US"/>
               <a:t>Fourth level</a:t>
             </a:r>
           </a:p>
           <a:p>
             <a:pPr lvl="4"/>
             <a:r>
-              <a:rPr lang="en-US" smtClean="0"/>
+              <a:rPr lang="en-US"/>
               <a:t>Fifth level</a:t>
             </a:r>
-            <a:endParaRPr lang="en-US"/>
           </a:p>
         </p:txBody>
       </p:sp>
@@ -498,10 +513,9 @@
           <a:lstStyle/>
           <a:p>
             <a:r>
-              <a:rPr lang="en-US" smtClean="0"/>
+              <a:rPr lang="en-US"/>
               <a:t>Click to edit Master title style</a:t>
             </a:r>
-            <a:endParaRPr lang="en-US"/>
           </a:p>
         </p:txBody>
       </p:sp>
@@ -617,10 +631,9 @@
           </a:lstStyle>
           <a:p>
             <a:r>
-              <a:rPr lang="en-US" smtClean="0"/>
+              <a:rPr lang="en-US"/>
               <a:t>Click to edit Master subtitle style</a:t>
             </a:r>
-            <a:endParaRPr lang="en-US"/>
           </a:p>
         </p:txBody>
       </p:sp>
@@ -641,7 +654,7 @@
           <a:p>
             <a:fld id="{78C97017-6FC3-485B-9764-EAC9E56C1D49}" type="datetimeFigureOut">
               <a:rPr lang="en-US" smtClean="0"/>
-              <a:t>10/16/2016</a:t>
+              <a:t>11/13/2018</a:t>
             </a:fld>
             <a:endParaRPr lang="en-US"/>
           </a:p>
@@ -735,10 +748,9 @@
           <a:lstStyle/>
           <a:p>
             <a:r>
-              <a:rPr lang="en-US" smtClean="0"/>
+              <a:rPr lang="en-US"/>
               <a:t>Click to edit Master title style</a:t>
             </a:r>
-            <a:endParaRPr lang="en-US"/>
           </a:p>
         </p:txBody>
       </p:sp>
@@ -759,38 +771,37 @@
           <a:p>
             <a:pPr lvl="0"/>
             <a:r>
-              <a:rPr lang="en-US" smtClean="0"/>
+              <a:rPr lang="en-US"/>
               <a:t>Click to edit Master text styles</a:t>
             </a:r>
           </a:p>
           <a:p>
             <a:pPr lvl="1"/>
             <a:r>
-              <a:rPr lang="en-US" smtClean="0"/>
+              <a:rPr lang="en-US"/>
               <a:t>Second level</a:t>
             </a:r>
           </a:p>
           <a:p>
             <a:pPr lvl="2"/>
             <a:r>
-              <a:rPr lang="en-US" smtClean="0"/>
+              <a:rPr lang="en-US"/>
               <a:t>Third level</a:t>
             </a:r>
           </a:p>
           <a:p>
             <a:pPr lvl="3"/>
             <a:r>
-              <a:rPr lang="en-US" smtClean="0"/>
+              <a:rPr lang="en-US"/>
               <a:t>Fourth level</a:t>
             </a:r>
           </a:p>
           <a:p>
             <a:pPr lvl="4"/>
             <a:r>
-              <a:rPr lang="en-US" smtClean="0"/>
+              <a:rPr lang="en-US"/>
               <a:t>Fifth level</a:t>
             </a:r>
-            <a:endParaRPr lang="en-US"/>
           </a:p>
         </p:txBody>
       </p:sp>
@@ -811,7 +822,7 @@
           <a:p>
             <a:fld id="{78C97017-6FC3-485B-9764-EAC9E56C1D49}" type="datetimeFigureOut">
               <a:rPr lang="en-US" smtClean="0"/>
-              <a:t>10/16/2016</a:t>
+              <a:t>11/13/2018</a:t>
             </a:fld>
             <a:endParaRPr lang="en-US"/>
           </a:p>
@@ -910,10 +921,9 @@
           <a:lstStyle/>
           <a:p>
             <a:r>
-              <a:rPr lang="en-US" smtClean="0"/>
+              <a:rPr lang="en-US"/>
               <a:t>Click to edit Master title style</a:t>
             </a:r>
-            <a:endParaRPr lang="en-US"/>
           </a:p>
         </p:txBody>
       </p:sp>
@@ -939,38 +949,37 @@
           <a:p>
             <a:pPr lvl="0"/>
             <a:r>
-              <a:rPr lang="en-US" smtClean="0"/>
+              <a:rPr lang="en-US"/>
               <a:t>Click to edit Master text styles</a:t>
             </a:r>
           </a:p>
           <a:p>
             <a:pPr lvl="1"/>
             <a:r>
-              <a:rPr lang="en-US" smtClean="0"/>
+              <a:rPr lang="en-US"/>
               <a:t>Second level</a:t>
             </a:r>
           </a:p>
           <a:p>
             <a:pPr lvl="2"/>
             <a:r>
-              <a:rPr lang="en-US" smtClean="0"/>
+              <a:rPr lang="en-US"/>
               <a:t>Third level</a:t>
             </a:r>
           </a:p>
           <a:p>
             <a:pPr lvl="3"/>
             <a:r>
-              <a:rPr lang="en-US" smtClean="0"/>
+              <a:rPr lang="en-US"/>
               <a:t>Fourth level</a:t>
             </a:r>
           </a:p>
           <a:p>
             <a:pPr lvl="4"/>
             <a:r>
-              <a:rPr lang="en-US" smtClean="0"/>
+              <a:rPr lang="en-US"/>
               <a:t>Fifth level</a:t>
             </a:r>
-            <a:endParaRPr lang="en-US"/>
           </a:p>
         </p:txBody>
       </p:sp>
@@ -991,7 +1000,7 @@
           <a:p>
             <a:fld id="{78C97017-6FC3-485B-9764-EAC9E56C1D49}" type="datetimeFigureOut">
               <a:rPr lang="en-US" smtClean="0"/>
-              <a:t>10/16/2016</a:t>
+              <a:t>11/13/2018</a:t>
             </a:fld>
             <a:endParaRPr lang="en-US"/>
           </a:p>
@@ -1085,10 +1094,9 @@
           <a:lstStyle/>
           <a:p>
             <a:r>
-              <a:rPr lang="en-US" smtClean="0"/>
+              <a:rPr lang="en-US"/>
               <a:t>Click to edit Master title style</a:t>
             </a:r>
-            <a:endParaRPr lang="en-US"/>
           </a:p>
         </p:txBody>
       </p:sp>
@@ -1109,38 +1117,37 @@
           <a:p>
             <a:pPr lvl="0"/>
             <a:r>
-              <a:rPr lang="en-US" smtClean="0"/>
+              <a:rPr lang="en-US"/>
               <a:t>Click to edit Master text styles</a:t>
             </a:r>
           </a:p>
           <a:p>
             <a:pPr lvl="1"/>
             <a:r>
-              <a:rPr lang="en-US" smtClean="0"/>
+              <a:rPr lang="en-US"/>
               <a:t>Second level</a:t>
             </a:r>
           </a:p>
           <a:p>
             <a:pPr lvl="2"/>
             <a:r>
-              <a:rPr lang="en-US" smtClean="0"/>
+              <a:rPr lang="en-US"/>
               <a:t>Third level</a:t>
             </a:r>
           </a:p>
           <a:p>
             <a:pPr lvl="3"/>
             <a:r>
-              <a:rPr lang="en-US" smtClean="0"/>
+              <a:rPr lang="en-US"/>
               <a:t>Fourth level</a:t>
             </a:r>
           </a:p>
           <a:p>
             <a:pPr lvl="4"/>
             <a:r>
-              <a:rPr lang="en-US" smtClean="0"/>
+              <a:rPr lang="en-US"/>
               <a:t>Fifth level</a:t>
             </a:r>
-            <a:endParaRPr lang="en-US"/>
           </a:p>
         </p:txBody>
       </p:sp>
@@ -1161,7 +1168,7 @@
           <a:p>
             <a:fld id="{78C97017-6FC3-485B-9764-EAC9E56C1D49}" type="datetimeFigureOut">
               <a:rPr lang="en-US" smtClean="0"/>
-              <a:t>10/16/2016</a:t>
+              <a:t>11/13/2018</a:t>
             </a:fld>
             <a:endParaRPr lang="en-US"/>
           </a:p>
@@ -1264,10 +1271,9 @@
           </a:lstStyle>
           <a:p>
             <a:r>
-              <a:rPr lang="en-US" smtClean="0"/>
+              <a:rPr lang="en-US"/>
               <a:t>Click to edit Master title style</a:t>
             </a:r>
-            <a:endParaRPr lang="en-US"/>
           </a:p>
         </p:txBody>
       </p:sp>
@@ -1384,7 +1390,7 @@
           <a:p>
             <a:pPr lvl="0"/>
             <a:r>
-              <a:rPr lang="en-US" smtClean="0"/>
+              <a:rPr lang="en-US"/>
               <a:t>Click to edit Master text styles</a:t>
             </a:r>
           </a:p>
@@ -1407,7 +1413,7 @@
           <a:p>
             <a:fld id="{78C97017-6FC3-485B-9764-EAC9E56C1D49}" type="datetimeFigureOut">
               <a:rPr lang="en-US" smtClean="0"/>
-              <a:t>10/16/2016</a:t>
+              <a:t>11/13/2018</a:t>
             </a:fld>
             <a:endParaRPr lang="en-US"/>
           </a:p>
@@ -1501,10 +1507,9 @@
           <a:lstStyle/>
           <a:p>
             <a:r>
-              <a:rPr lang="en-US" smtClean="0"/>
+              <a:rPr lang="en-US"/>
               <a:t>Click to edit Master title style</a:t>
             </a:r>
-            <a:endParaRPr lang="en-US"/>
           </a:p>
         </p:txBody>
       </p:sp>
@@ -1558,38 +1563,37 @@
           <a:p>
             <a:pPr lvl="0"/>
             <a:r>
-              <a:rPr lang="en-US" smtClean="0"/>
+              <a:rPr lang="en-US"/>
               <a:t>Click to edit Master text styles</a:t>
             </a:r>
           </a:p>
           <a:p>
             <a:pPr lvl="1"/>
             <a:r>
-              <a:rPr lang="en-US" smtClean="0"/>
+              <a:rPr lang="en-US"/>
               <a:t>Second level</a:t>
             </a:r>
           </a:p>
           <a:p>
             <a:pPr lvl="2"/>
             <a:r>
-              <a:rPr lang="en-US" smtClean="0"/>
+              <a:rPr lang="en-US"/>
               <a:t>Third level</a:t>
             </a:r>
           </a:p>
           <a:p>
             <a:pPr lvl="3"/>
             <a:r>
-              <a:rPr lang="en-US" smtClean="0"/>
+              <a:rPr lang="en-US"/>
               <a:t>Fourth level</a:t>
             </a:r>
           </a:p>
           <a:p>
             <a:pPr lvl="4"/>
             <a:r>
-              <a:rPr lang="en-US" smtClean="0"/>
+              <a:rPr lang="en-US"/>
               <a:t>Fifth level</a:t>
             </a:r>
-            <a:endParaRPr lang="en-US"/>
           </a:p>
         </p:txBody>
       </p:sp>
@@ -1643,38 +1647,37 @@
           <a:p>
             <a:pPr lvl="0"/>
             <a:r>
-              <a:rPr lang="en-US" smtClean="0"/>
+              <a:rPr lang="en-US"/>
               <a:t>Click to edit Master text styles</a:t>
             </a:r>
           </a:p>
           <a:p>
             <a:pPr lvl="1"/>
             <a:r>
-              <a:rPr lang="en-US" smtClean="0"/>
+              <a:rPr lang="en-US"/>
               <a:t>Second level</a:t>
             </a:r>
           </a:p>
           <a:p>
             <a:pPr lvl="2"/>
             <a:r>
-              <a:rPr lang="en-US" smtClean="0"/>
+              <a:rPr lang="en-US"/>
               <a:t>Third level</a:t>
             </a:r>
           </a:p>
           <a:p>
             <a:pPr lvl="3"/>
             <a:r>
-              <a:rPr lang="en-US" smtClean="0"/>
+              <a:rPr lang="en-US"/>
               <a:t>Fourth level</a:t>
             </a:r>
           </a:p>
           <a:p>
             <a:pPr lvl="4"/>
             <a:r>
-              <a:rPr lang="en-US" smtClean="0"/>
+              <a:rPr lang="en-US"/>
               <a:t>Fifth level</a:t>
             </a:r>
-            <a:endParaRPr lang="en-US"/>
           </a:p>
         </p:txBody>
       </p:sp>
@@ -1695,7 +1698,7 @@
           <a:p>
             <a:fld id="{78C97017-6FC3-485B-9764-EAC9E56C1D49}" type="datetimeFigureOut">
               <a:rPr lang="en-US" smtClean="0"/>
-              <a:t>10/16/2016</a:t>
+              <a:t>11/13/2018</a:t>
             </a:fld>
             <a:endParaRPr lang="en-US"/>
           </a:p>
@@ -1793,10 +1796,9 @@
           </a:lstStyle>
           <a:p>
             <a:r>
-              <a:rPr lang="en-US" smtClean="0"/>
+              <a:rPr lang="en-US"/>
               <a:t>Click to edit Master title style</a:t>
             </a:r>
-            <a:endParaRPr lang="en-US"/>
           </a:p>
         </p:txBody>
       </p:sp>
@@ -1859,7 +1861,7 @@
           <a:p>
             <a:pPr lvl="0"/>
             <a:r>
-              <a:rPr lang="en-US" smtClean="0"/>
+              <a:rPr lang="en-US"/>
               <a:t>Click to edit Master text styles</a:t>
             </a:r>
           </a:p>
@@ -1915,38 +1917,37 @@
           <a:p>
             <a:pPr lvl="0"/>
             <a:r>
-              <a:rPr lang="en-US" smtClean="0"/>
+              <a:rPr lang="en-US"/>
               <a:t>Click to edit Master text styles</a:t>
             </a:r>
           </a:p>
           <a:p>
             <a:pPr lvl="1"/>
             <a:r>
-              <a:rPr lang="en-US" smtClean="0"/>
+              <a:rPr lang="en-US"/>
               <a:t>Second level</a:t>
             </a:r>
           </a:p>
           <a:p>
             <a:pPr lvl="2"/>
             <a:r>
-              <a:rPr lang="en-US" smtClean="0"/>
+              <a:rPr lang="en-US"/>
               <a:t>Third level</a:t>
             </a:r>
           </a:p>
           <a:p>
             <a:pPr lvl="3"/>
             <a:r>
-              <a:rPr lang="en-US" smtClean="0"/>
+              <a:rPr lang="en-US"/>
               <a:t>Fourth level</a:t>
             </a:r>
           </a:p>
           <a:p>
             <a:pPr lvl="4"/>
             <a:r>
-              <a:rPr lang="en-US" smtClean="0"/>
+              <a:rPr lang="en-US"/>
               <a:t>Fifth level</a:t>
             </a:r>
-            <a:endParaRPr lang="en-US"/>
           </a:p>
         </p:txBody>
       </p:sp>
@@ -2009,7 +2010,7 @@
           <a:p>
             <a:pPr lvl="0"/>
             <a:r>
-              <a:rPr lang="en-US" smtClean="0"/>
+              <a:rPr lang="en-US"/>
               <a:t>Click to edit Master text styles</a:t>
             </a:r>
           </a:p>
@@ -2065,38 +2066,37 @@
           <a:p>
             <a:pPr lvl="0"/>
             <a:r>
-              <a:rPr lang="en-US" smtClean="0"/>
+              <a:rPr lang="en-US"/>
               <a:t>Click to edit Master text styles</a:t>
             </a:r>
           </a:p>
           <a:p>
             <a:pPr lvl="1"/>
             <a:r>
-              <a:rPr lang="en-US" smtClean="0"/>
+              <a:rPr lang="en-US"/>
               <a:t>Second level</a:t>
             </a:r>
           </a:p>
           <a:p>
             <a:pPr lvl="2"/>
             <a:r>
-              <a:rPr lang="en-US" smtClean="0"/>
+              <a:rPr lang="en-US"/>
               <a:t>Third level</a:t>
             </a:r>
           </a:p>
           <a:p>
             <a:pPr lvl="3"/>
             <a:r>
-              <a:rPr lang="en-US" smtClean="0"/>
+              <a:rPr lang="en-US"/>
               <a:t>Fourth level</a:t>
             </a:r>
           </a:p>
           <a:p>
             <a:pPr lvl="4"/>
             <a:r>
-              <a:rPr lang="en-US" smtClean="0"/>
+              <a:rPr lang="en-US"/>
               <a:t>Fifth level</a:t>
             </a:r>
-            <a:endParaRPr lang="en-US"/>
           </a:p>
         </p:txBody>
       </p:sp>
@@ -2117,7 +2117,7 @@
           <a:p>
             <a:fld id="{78C97017-6FC3-485B-9764-EAC9E56C1D49}" type="datetimeFigureOut">
               <a:rPr lang="en-US" smtClean="0"/>
-              <a:t>10/16/2016</a:t>
+              <a:t>11/13/2018</a:t>
             </a:fld>
             <a:endParaRPr lang="en-US"/>
           </a:p>
@@ -2211,10 +2211,9 @@
           <a:lstStyle/>
           <a:p>
             <a:r>
-              <a:rPr lang="en-US" smtClean="0"/>
+              <a:rPr lang="en-US"/>
               <a:t>Click to edit Master title style</a:t>
             </a:r>
-            <a:endParaRPr lang="en-US"/>
           </a:p>
         </p:txBody>
       </p:sp>
@@ -2235,7 +2234,7 @@
           <a:p>
             <a:fld id="{78C97017-6FC3-485B-9764-EAC9E56C1D49}" type="datetimeFigureOut">
               <a:rPr lang="en-US" smtClean="0"/>
-              <a:t>10/16/2016</a:t>
+              <a:t>11/13/2018</a:t>
             </a:fld>
             <a:endParaRPr lang="en-US"/>
           </a:p>
@@ -2330,7 +2329,7 @@
           <a:p>
             <a:fld id="{78C97017-6FC3-485B-9764-EAC9E56C1D49}" type="datetimeFigureOut">
               <a:rPr lang="en-US" smtClean="0"/>
-              <a:t>10/16/2016</a:t>
+              <a:t>11/13/2018</a:t>
             </a:fld>
             <a:endParaRPr lang="en-US"/>
           </a:p>
@@ -2433,10 +2432,9 @@
           </a:lstStyle>
           <a:p>
             <a:r>
-              <a:rPr lang="en-US" smtClean="0"/>
+              <a:rPr lang="en-US"/>
               <a:t>Click to edit Master title style</a:t>
             </a:r>
-            <a:endParaRPr lang="en-US"/>
           </a:p>
         </p:txBody>
       </p:sp>
@@ -2490,38 +2488,37 @@
           <a:p>
             <a:pPr lvl="0"/>
             <a:r>
-              <a:rPr lang="en-US" smtClean="0"/>
+              <a:rPr lang="en-US"/>
               <a:t>Click to edit Master text styles</a:t>
             </a:r>
           </a:p>
           <a:p>
             <a:pPr lvl="1"/>
             <a:r>
-              <a:rPr lang="en-US" smtClean="0"/>
+              <a:rPr lang="en-US"/>
               <a:t>Second level</a:t>
             </a:r>
           </a:p>
           <a:p>
             <a:pPr lvl="2"/>
             <a:r>
-              <a:rPr lang="en-US" smtClean="0"/>
+              <a:rPr lang="en-US"/>
               <a:t>Third level</a:t>
             </a:r>
           </a:p>
           <a:p>
             <a:pPr lvl="3"/>
             <a:r>
-              <a:rPr lang="en-US" smtClean="0"/>
+              <a:rPr lang="en-US"/>
               <a:t>Fourth level</a:t>
             </a:r>
           </a:p>
           <a:p>
             <a:pPr lvl="4"/>
             <a:r>
-              <a:rPr lang="en-US" smtClean="0"/>
+              <a:rPr lang="en-US"/>
               <a:t>Fifth level</a:t>
             </a:r>
-            <a:endParaRPr lang="en-US"/>
           </a:p>
         </p:txBody>
       </p:sp>
@@ -2584,7 +2581,7 @@
           <a:p>
             <a:pPr lvl="0"/>
             <a:r>
-              <a:rPr lang="en-US" smtClean="0"/>
+              <a:rPr lang="en-US"/>
               <a:t>Click to edit Master text styles</a:t>
             </a:r>
           </a:p>
@@ -2607,7 +2604,7 @@
           <a:p>
             <a:fld id="{78C97017-6FC3-485B-9764-EAC9E56C1D49}" type="datetimeFigureOut">
               <a:rPr lang="en-US" smtClean="0"/>
-              <a:t>10/16/2016</a:t>
+              <a:t>11/13/2018</a:t>
             </a:fld>
             <a:endParaRPr lang="en-US"/>
           </a:p>
@@ -2710,10 +2707,9 @@
           </a:lstStyle>
           <a:p>
             <a:r>
-              <a:rPr lang="en-US" smtClean="0"/>
+              <a:rPr lang="en-US"/>
               <a:t>Click to edit Master title style</a:t>
             </a:r>
-            <a:endParaRPr lang="en-US"/>
           </a:p>
         </p:txBody>
       </p:sp>
@@ -2837,7 +2833,7 @@
           <a:p>
             <a:pPr lvl="0"/>
             <a:r>
-              <a:rPr lang="en-US" smtClean="0"/>
+              <a:rPr lang="en-US"/>
               <a:t>Click to edit Master text styles</a:t>
             </a:r>
           </a:p>
@@ -2860,7 +2856,7 @@
           <a:p>
             <a:fld id="{78C97017-6FC3-485B-9764-EAC9E56C1D49}" type="datetimeFigureOut">
               <a:rPr lang="en-US" smtClean="0"/>
-              <a:t>10/16/2016</a:t>
+              <a:t>11/13/2018</a:t>
             </a:fld>
             <a:endParaRPr lang="en-US"/>
           </a:p>
@@ -2969,10 +2965,9 @@
           <a:lstStyle/>
           <a:p>
             <a:r>
-              <a:rPr lang="en-US" smtClean="0"/>
+              <a:rPr lang="en-US"/>
               <a:t>Click to edit Master title style</a:t>
             </a:r>
-            <a:endParaRPr lang="en-US"/>
           </a:p>
         </p:txBody>
       </p:sp>
@@ -3003,38 +2998,37 @@
           <a:p>
             <a:pPr lvl="0"/>
             <a:r>
-              <a:rPr lang="en-US" smtClean="0"/>
+              <a:rPr lang="en-US"/>
               <a:t>Click to edit Master text styles</a:t>
             </a:r>
           </a:p>
           <a:p>
             <a:pPr lvl="1"/>
             <a:r>
-              <a:rPr lang="en-US" smtClean="0"/>
+              <a:rPr lang="en-US"/>
               <a:t>Second level</a:t>
             </a:r>
           </a:p>
           <a:p>
             <a:pPr lvl="2"/>
             <a:r>
-              <a:rPr lang="en-US" smtClean="0"/>
+              <a:rPr lang="en-US"/>
               <a:t>Third level</a:t>
             </a:r>
           </a:p>
           <a:p>
             <a:pPr lvl="3"/>
             <a:r>
-              <a:rPr lang="en-US" smtClean="0"/>
+              <a:rPr lang="en-US"/>
               <a:t>Fourth level</a:t>
             </a:r>
           </a:p>
           <a:p>
             <a:pPr lvl="4"/>
             <a:r>
-              <a:rPr lang="en-US" smtClean="0"/>
+              <a:rPr lang="en-US"/>
               <a:t>Fifth level</a:t>
             </a:r>
-            <a:endParaRPr lang="en-US"/>
           </a:p>
         </p:txBody>
       </p:sp>
@@ -3073,7 +3067,7 @@
           <a:p>
             <a:fld id="{78C97017-6FC3-485B-9764-EAC9E56C1D49}" type="datetimeFigureOut">
               <a:rPr lang="en-US" smtClean="0"/>
-              <a:t>10/16/2016</a:t>
+              <a:t>11/13/2018</a:t>
             </a:fld>
             <a:endParaRPr lang="en-US"/>
           </a:p>
@@ -3492,7 +3486,7 @@
           <a:p>
             <a:pPr algn="ctr"/>
             <a:r>
-              <a:rPr lang="en-US" sz="1600" dirty="0" smtClean="0">
+              <a:rPr lang="en-US" sz="1600" dirty="0">
                 <a:solidFill>
                   <a:schemeClr val="bg1"/>
                 </a:solidFill>
@@ -3856,7 +3850,7 @@
           <a:p>
             <a:pPr algn="ctr"/>
             <a:r>
-              <a:rPr lang="en-US" sz="1600" dirty="0" smtClean="0">
+              <a:rPr lang="en-US" sz="1600" dirty="0">
                 <a:solidFill>
                   <a:schemeClr val="bg1"/>
                 </a:solidFill>
@@ -4003,7 +3997,7 @@
           <a:p>
             <a:pPr algn="ctr"/>
             <a:r>
-              <a:rPr lang="en-US" sz="1600" dirty="0" smtClean="0">
+              <a:rPr lang="en-US" sz="1600" dirty="0">
                 <a:solidFill>
                   <a:schemeClr val="bg1"/>
                 </a:solidFill>
@@ -4165,10 +4159,9 @@
           <a:lstStyle/>
           <a:p>
             <a:r>
-              <a:rPr lang="en-US" sz="1400" dirty="0" smtClean="0"/>
+              <a:rPr lang="en-US" sz="1400" dirty="0"/>
               <a:t>delete 1</a:t>
             </a:r>
-            <a:endParaRPr lang="en-US" sz="1400" dirty="0"/>
           </a:p>
         </p:txBody>
       </p:sp>
@@ -4231,18 +4224,13 @@
           <a:lstStyle/>
           <a:p>
             <a:r>
-              <a:rPr lang="en-US" sz="1400" dirty="0" smtClean="0">
+              <a:rPr lang="en-US" sz="1400" dirty="0">
                 <a:solidFill>
                   <a:srgbClr val="0070C0"/>
                 </a:solidFill>
               </a:rPr>
               <a:t>execute(“delete 1”)</a:t>
             </a:r>
-            <a:endParaRPr lang="en-US" sz="1400" dirty="0">
-              <a:solidFill>
-                <a:srgbClr val="0070C0"/>
-              </a:solidFill>
-            </a:endParaRPr>
           </a:p>
         </p:txBody>
       </p:sp>
@@ -4305,7 +4293,7 @@
           <a:lstStyle/>
           <a:p>
             <a:r>
-              <a:rPr lang="en-US" sz="1400" dirty="0" err="1" smtClean="0">
+              <a:rPr lang="en-US" sz="1400" dirty="0" err="1">
                 <a:solidFill>
                   <a:srgbClr val="7030A0"/>
                 </a:solidFill>
@@ -4313,18 +4301,13 @@
               <a:t>deletePerson</a:t>
             </a:r>
             <a:r>
-              <a:rPr lang="en-US" sz="1400" dirty="0" smtClean="0">
+              <a:rPr lang="en-US" sz="1400" dirty="0">
                 <a:solidFill>
                   <a:srgbClr val="7030A0"/>
                 </a:solidFill>
               </a:rPr>
               <a:t>(p)</a:t>
             </a:r>
-            <a:endParaRPr lang="en-US" sz="1400" dirty="0">
-              <a:solidFill>
-                <a:srgbClr val="7030A0"/>
-              </a:solidFill>
-            </a:endParaRPr>
           </a:p>
         </p:txBody>
       </p:sp>
@@ -4351,7 +4334,7 @@
           <a:lstStyle/>
           <a:p>
             <a:r>
-              <a:rPr lang="en-US" sz="1400" dirty="0" smtClean="0">
+              <a:rPr lang="en-US" sz="1400" dirty="0">
                 <a:solidFill>
                   <a:schemeClr val="accent5">
                     <a:lumMod val="75000"/>
@@ -4361,17 +4344,17 @@
               <a:t>post(</a:t>
             </a:r>
             <a:r>
-              <a:rPr lang="en-US" sz="1400" dirty="0" err="1" smtClean="0">
+              <a:rPr lang="en-US" sz="1400" dirty="0" err="1">
                 <a:solidFill>
                   <a:schemeClr val="accent5">
                     <a:lumMod val="75000"/>
                   </a:schemeClr>
                 </a:solidFill>
               </a:rPr>
-              <a:t>AddressBookChangedEvent</a:t>
-            </a:r>
-            <a:r>
-              <a:rPr lang="en-US" sz="1400" dirty="0" smtClean="0">
+              <a:t>HealthBaseChangedEvent</a:t>
+            </a:r>
+            <a:r>
+              <a:rPr lang="en-US" sz="1400" dirty="0">
                 <a:solidFill>
                   <a:schemeClr val="accent5">
                     <a:lumMod val="75000"/>
@@ -4380,13 +4363,6 @@
               </a:rPr>
               <a:t>)</a:t>
             </a:r>
-            <a:endParaRPr lang="en-US" sz="1400" dirty="0">
-              <a:solidFill>
-                <a:schemeClr val="accent5">
-                  <a:lumMod val="75000"/>
-                </a:schemeClr>
-              </a:solidFill>
-            </a:endParaRPr>
           </a:p>
         </p:txBody>
       </p:sp>
@@ -4552,7 +4528,7 @@
           <a:p>
             <a:pPr algn="ctr"/>
             <a:r>
-              <a:rPr lang="en-US" sz="1600" dirty="0" smtClean="0">
+              <a:rPr lang="en-US" sz="1600" dirty="0">
                 <a:solidFill>
                   <a:schemeClr val="bg1"/>
                 </a:solidFill>
@@ -4560,7 +4536,7 @@
               <a:t>:</a:t>
             </a:r>
             <a:r>
-              <a:rPr lang="en-US" sz="1600" dirty="0" err="1" smtClean="0">
+              <a:rPr lang="en-US" sz="1600" dirty="0" err="1">
                 <a:solidFill>
                   <a:schemeClr val="bg1"/>
                 </a:solidFill>
@@ -4793,7 +4769,7 @@
           <a:p>
             <a:pPr algn="ctr"/>
             <a:r>
-              <a:rPr lang="en-US" sz="1600" dirty="0" smtClean="0">
+              <a:rPr lang="en-US" sz="1600" dirty="0">
                 <a:solidFill>
                   <a:schemeClr val="bg1"/>
                 </a:solidFill>
@@ -4925,7 +4901,7 @@
           <a:lstStyle/>
           <a:p>
             <a:r>
-              <a:rPr lang="en-US" sz="1400" dirty="0" smtClean="0">
+              <a:rPr lang="en-US" sz="1400" dirty="0">
                 <a:solidFill>
                   <a:schemeClr val="accent5">
                     <a:lumMod val="75000"/>
@@ -4935,17 +4911,17 @@
               <a:t>post(</a:t>
             </a:r>
             <a:r>
-              <a:rPr lang="en-US" sz="1400" dirty="0" err="1" smtClean="0">
+              <a:rPr lang="en-US" sz="1400" dirty="0" err="1">
                 <a:solidFill>
                   <a:schemeClr val="accent5">
                     <a:lumMod val="75000"/>
                   </a:schemeClr>
                 </a:solidFill>
               </a:rPr>
-              <a:t>AddressBookChangedEvent</a:t>
-            </a:r>
-            <a:r>
-              <a:rPr lang="en-US" sz="1400" dirty="0" smtClean="0">
+              <a:t>HealthBaseChangedEvent</a:t>
+            </a:r>
+            <a:r>
+              <a:rPr lang="en-US" sz="1400" dirty="0">
                 <a:solidFill>
                   <a:schemeClr val="accent5">
                     <a:lumMod val="75000"/>
@@ -4954,13 +4930,6 @@
               </a:rPr>
               <a:t>)</a:t>
             </a:r>
-            <a:endParaRPr lang="en-US" sz="1400" dirty="0">
-              <a:solidFill>
-                <a:schemeClr val="accent5">
-                  <a:lumMod val="75000"/>
-                </a:schemeClr>
-              </a:solidFill>
-            </a:endParaRPr>
           </a:p>
         </p:txBody>
       </p:sp>
@@ -5052,7 +5021,7 @@
           <a:p>
             <a:pPr algn="ctr"/>
             <a:r>
-              <a:rPr lang="en-US" sz="1600" dirty="0" smtClean="0">
+              <a:rPr lang="en-US" sz="1600" dirty="0">
                 <a:solidFill>
                   <a:schemeClr val="bg1"/>
                 </a:solidFill>
@@ -5060,7 +5029,7 @@
               <a:t>:</a:t>
             </a:r>
             <a:r>
-              <a:rPr lang="en-US" sz="1600" dirty="0" err="1" smtClean="0">
+              <a:rPr lang="en-US" sz="1600" dirty="0" err="1">
                 <a:solidFill>
                   <a:schemeClr val="bg1"/>
                 </a:solidFill>
@@ -5307,17 +5276,17 @@
           <a:lstStyle/>
           <a:p>
             <a:r>
-              <a:rPr lang="en-US" sz="1400" dirty="0" err="1" smtClean="0">
+              <a:rPr lang="en-US" sz="1400" dirty="0" err="1">
                 <a:solidFill>
                   <a:schemeClr val="accent6">
                     <a:lumMod val="75000"/>
                   </a:schemeClr>
                 </a:solidFill>
               </a:rPr>
-              <a:t>handleAddresssBookChangedEvent</a:t>
-            </a:r>
-            <a:r>
-              <a:rPr lang="en-US" sz="1400" dirty="0" smtClean="0">
+              <a:t>handleHealthBaseChangedEvent</a:t>
+            </a:r>
+            <a:r>
+              <a:rPr lang="en-US" sz="1400" dirty="0">
                 <a:solidFill>
                   <a:schemeClr val="accent6">
                     <a:lumMod val="75000"/>
@@ -5326,13 +5295,6 @@
               </a:rPr>
               <a:t>()</a:t>
             </a:r>
-            <a:endParaRPr lang="en-US" sz="1400" dirty="0">
-              <a:solidFill>
-                <a:schemeClr val="accent6">
-                  <a:lumMod val="75000"/>
-                </a:schemeClr>
-              </a:solidFill>
-            </a:endParaRPr>
           </a:p>
         </p:txBody>
       </p:sp>
@@ -5417,7 +5379,7 @@
           <a:p>
             <a:pPr algn="ctr"/>
             <a:r>
-              <a:rPr lang="en-US" sz="1600" dirty="0" smtClean="0">
+              <a:rPr lang="en-US" sz="1600" dirty="0">
                 <a:solidFill>
                   <a:schemeClr val="bg1"/>
                 </a:solidFill>
@@ -5620,26 +5582,21 @@
           <a:lstStyle/>
           <a:p>
             <a:r>
-              <a:rPr lang="en-US" sz="1400" dirty="0" err="1" smtClean="0">
+              <a:rPr lang="en-US" sz="1400" dirty="0" err="1">
                 <a:solidFill>
                   <a:srgbClr val="00B050"/>
                 </a:solidFill>
               </a:rPr>
-              <a:t>handleAddresssBookChangedEvent</a:t>
-            </a:r>
-            <a:r>
-              <a:rPr lang="en-US" sz="1400" dirty="0" smtClean="0">
+              <a:t>handleHealthBaseChangedEvent</a:t>
+            </a:r>
+            <a:r>
+              <a:rPr lang="en-US" sz="1400" dirty="0">
                 <a:solidFill>
                   <a:srgbClr val="00B050"/>
                 </a:solidFill>
               </a:rPr>
               <a:t>()</a:t>
             </a:r>
-            <a:endParaRPr lang="en-US" sz="1400" dirty="0">
-              <a:solidFill>
-                <a:srgbClr val="00B050"/>
-              </a:solidFill>
-            </a:endParaRPr>
           </a:p>
         </p:txBody>
       </p:sp>
@@ -5826,18 +5783,13 @@
           <a:p>
             <a:pPr algn="r"/>
             <a:r>
-              <a:rPr lang="en-US" sz="1400" dirty="0" smtClean="0">
+              <a:rPr lang="en-US" sz="1400" dirty="0">
                 <a:solidFill>
                   <a:srgbClr val="00B050"/>
                 </a:solidFill>
               </a:rPr>
               <a:t>Update status bar</a:t>
             </a:r>
-            <a:endParaRPr lang="en-US" sz="1400" dirty="0">
-              <a:solidFill>
-                <a:srgbClr val="00B050"/>
-              </a:solidFill>
-            </a:endParaRPr>
           </a:p>
         </p:txBody>
       </p:sp>
@@ -6027,7 +5979,7 @@
           <a:lstStyle/>
           <a:p>
             <a:r>
-              <a:rPr lang="en-US" sz="1400" dirty="0" smtClean="0">
+              <a:rPr lang="en-US" sz="1400" dirty="0">
                 <a:solidFill>
                   <a:schemeClr val="accent6">
                     <a:lumMod val="75000"/>
@@ -6037,7 +5989,7 @@
               <a:t>Save </a:t>
             </a:r>
             <a:br>
-              <a:rPr lang="en-US" sz="1400" dirty="0" smtClean="0">
+              <a:rPr lang="en-US" sz="1400" dirty="0">
                 <a:solidFill>
                   <a:schemeClr val="accent6">
                     <a:lumMod val="75000"/>
@@ -6046,7 +5998,7 @@
               </a:rPr>
             </a:br>
             <a:r>
-              <a:rPr lang="en-US" sz="1400" dirty="0" smtClean="0">
+              <a:rPr lang="en-US" sz="1400" dirty="0">
                 <a:solidFill>
                   <a:schemeClr val="accent6">
                     <a:lumMod val="75000"/>
@@ -6055,13 +6007,6 @@
               </a:rPr>
               <a:t>to file</a:t>
             </a:r>
-            <a:endParaRPr lang="en-US" sz="1400" dirty="0">
-              <a:solidFill>
-                <a:schemeClr val="accent6">
-                  <a:lumMod val="75000"/>
-                </a:schemeClr>
-              </a:solidFill>
-            </a:endParaRPr>
           </a:p>
         </p:txBody>
       </p:sp>

</xml_diff>